<commit_message>
Add support to select query customizations
</commit_message>
<xml_diff>
--- a/docs/select.pptx
+++ b/docs/select.pptx
@@ -255,7 +255,7 @@
           <a:p>
             <a:fld id="{064700E2-490F-4419-AC2C-49136718AF20}" type="datetimeFigureOut">
               <a:rPr lang="es-ES" smtClean="0"/>
-              <a:t>21/5/21</a:t>
+              <a:t>7/6/21</a:t>
             </a:fld>
             <a:endParaRPr lang="es-ES"/>
           </a:p>
@@ -425,7 +425,7 @@
           <a:p>
             <a:fld id="{064700E2-490F-4419-AC2C-49136718AF20}" type="datetimeFigureOut">
               <a:rPr lang="es-ES" smtClean="0"/>
-              <a:t>21/5/21</a:t>
+              <a:t>7/6/21</a:t>
             </a:fld>
             <a:endParaRPr lang="es-ES"/>
           </a:p>
@@ -605,7 +605,7 @@
           <a:p>
             <a:fld id="{064700E2-490F-4419-AC2C-49136718AF20}" type="datetimeFigureOut">
               <a:rPr lang="es-ES" smtClean="0"/>
-              <a:t>21/5/21</a:t>
+              <a:t>7/6/21</a:t>
             </a:fld>
             <a:endParaRPr lang="es-ES"/>
           </a:p>
@@ -775,7 +775,7 @@
           <a:p>
             <a:fld id="{064700E2-490F-4419-AC2C-49136718AF20}" type="datetimeFigureOut">
               <a:rPr lang="es-ES" smtClean="0"/>
-              <a:t>21/5/21</a:t>
+              <a:t>7/6/21</a:t>
             </a:fld>
             <a:endParaRPr lang="es-ES"/>
           </a:p>
@@ -1021,7 +1021,7 @@
           <a:p>
             <a:fld id="{064700E2-490F-4419-AC2C-49136718AF20}" type="datetimeFigureOut">
               <a:rPr lang="es-ES" smtClean="0"/>
-              <a:t>21/5/21</a:t>
+              <a:t>7/6/21</a:t>
             </a:fld>
             <a:endParaRPr lang="es-ES"/>
           </a:p>
@@ -1253,7 +1253,7 @@
           <a:p>
             <a:fld id="{064700E2-490F-4419-AC2C-49136718AF20}" type="datetimeFigureOut">
               <a:rPr lang="es-ES" smtClean="0"/>
-              <a:t>21/5/21</a:t>
+              <a:t>7/6/21</a:t>
             </a:fld>
             <a:endParaRPr lang="es-ES"/>
           </a:p>
@@ -1620,7 +1620,7 @@
           <a:p>
             <a:fld id="{064700E2-490F-4419-AC2C-49136718AF20}" type="datetimeFigureOut">
               <a:rPr lang="es-ES" smtClean="0"/>
-              <a:t>21/5/21</a:t>
+              <a:t>7/6/21</a:t>
             </a:fld>
             <a:endParaRPr lang="es-ES"/>
           </a:p>
@@ -1738,7 +1738,7 @@
           <a:p>
             <a:fld id="{064700E2-490F-4419-AC2C-49136718AF20}" type="datetimeFigureOut">
               <a:rPr lang="es-ES" smtClean="0"/>
-              <a:t>21/5/21</a:t>
+              <a:t>7/6/21</a:t>
             </a:fld>
             <a:endParaRPr lang="es-ES"/>
           </a:p>
@@ -1833,7 +1833,7 @@
           <a:p>
             <a:fld id="{064700E2-490F-4419-AC2C-49136718AF20}" type="datetimeFigureOut">
               <a:rPr lang="es-ES" smtClean="0"/>
-              <a:t>21/5/21</a:t>
+              <a:t>7/6/21</a:t>
             </a:fld>
             <a:endParaRPr lang="es-ES"/>
           </a:p>
@@ -2110,7 +2110,7 @@
           <a:p>
             <a:fld id="{064700E2-490F-4419-AC2C-49136718AF20}" type="datetimeFigureOut">
               <a:rPr lang="es-ES" smtClean="0"/>
-              <a:t>21/5/21</a:t>
+              <a:t>7/6/21</a:t>
             </a:fld>
             <a:endParaRPr lang="es-ES"/>
           </a:p>
@@ -2367,7 +2367,7 @@
           <a:p>
             <a:fld id="{064700E2-490F-4419-AC2C-49136718AF20}" type="datetimeFigureOut">
               <a:rPr lang="es-ES" smtClean="0"/>
-              <a:t>21/5/21</a:t>
+              <a:t>7/6/21</a:t>
             </a:fld>
             <a:endParaRPr lang="es-ES"/>
           </a:p>
@@ -2580,7 +2580,7 @@
           <a:p>
             <a:fld id="{064700E2-490F-4419-AC2C-49136718AF20}" type="datetimeFigureOut">
               <a:rPr lang="es-ES" smtClean="0"/>
-              <a:t>21/5/21</a:t>
+              <a:t>7/6/21</a:t>
             </a:fld>
             <a:endParaRPr lang="es-ES"/>
           </a:p>
@@ -3742,7 +3742,7 @@
         </p:nvSpPr>
         <p:spPr>
           <a:xfrm>
-            <a:off x="9444243" y="759184"/>
+            <a:off x="9444243" y="632572"/>
             <a:ext cx="1609736" cy="246221"/>
           </a:xfrm>
           <a:prstGeom prst="rect">
@@ -3981,14 +3981,13 @@
           <p:cNvCxnSpPr>
             <a:cxnSpLocks/>
             <a:stCxn id="72" idx="0"/>
-            <a:endCxn id="65" idx="2"/>
           </p:cNvCxnSpPr>
           <p:nvPr/>
         </p:nvCxnSpPr>
         <p:spPr>
           <a:xfrm flipH="1" flipV="1">
-            <a:off x="10249111" y="1005405"/>
-            <a:ext cx="809983" cy="672167"/>
+            <a:off x="10647500" y="1412142"/>
+            <a:ext cx="411594" cy="265430"/>
           </a:xfrm>
           <a:prstGeom prst="straightConnector1">
             <a:avLst/>
@@ -4026,7 +4025,7 @@
         </p:nvSpPr>
         <p:spPr>
           <a:xfrm>
-            <a:off x="10653927" y="1265348"/>
+            <a:off x="10783062" y="1391045"/>
             <a:ext cx="367408" cy="184666"/>
           </a:xfrm>
           <a:prstGeom prst="rect">
@@ -4708,13 +4707,14 @@
           </p:cNvPr>
           <p:cNvCxnSpPr>
             <a:cxnSpLocks/>
+            <a:stCxn id="114" idx="2"/>
           </p:cNvCxnSpPr>
           <p:nvPr/>
         </p:nvCxnSpPr>
         <p:spPr>
           <a:xfrm flipH="1">
-            <a:off x="9056623" y="1019711"/>
-            <a:ext cx="670689" cy="653844"/>
+            <a:off x="9056626" y="1396956"/>
+            <a:ext cx="917797" cy="276599"/>
           </a:xfrm>
           <a:prstGeom prst="straightConnector1">
             <a:avLst/>
@@ -4747,13 +4747,16 @@
               </a:ext>
             </a:extLst>
           </p:cNvPr>
-          <p:cNvCxnSpPr/>
+          <p:cNvCxnSpPr>
+            <a:cxnSpLocks/>
+            <a:stCxn id="114" idx="2"/>
+          </p:cNvCxnSpPr>
           <p:nvPr/>
         </p:nvCxnSpPr>
         <p:spPr>
           <a:xfrm>
-            <a:off x="9727312" y="1019711"/>
-            <a:ext cx="802095" cy="606380"/>
+            <a:off x="9974423" y="1396956"/>
+            <a:ext cx="554984" cy="229135"/>
           </a:xfrm>
           <a:prstGeom prst="straightConnector1">
             <a:avLst/>
@@ -5270,15 +5273,15 @@
             </a:extLst>
           </p:cNvPr>
           <p:cNvCxnSpPr>
-            <a:stCxn id="186" idx="3"/>
-            <a:endCxn id="65" idx="1"/>
+            <a:cxnSpLocks/>
+            <a:endCxn id="114" idx="1"/>
           </p:cNvCxnSpPr>
           <p:nvPr/>
         </p:nvCxnSpPr>
         <p:spPr>
           <a:xfrm>
-            <a:off x="8769378" y="332366"/>
-            <a:ext cx="674865" cy="549929"/>
+            <a:off x="8230236" y="509091"/>
+            <a:ext cx="859970" cy="764755"/>
           </a:xfrm>
           <a:prstGeom prst="straightConnector1">
             <a:avLst/>
@@ -5316,7 +5319,7 @@
         </p:nvSpPr>
         <p:spPr>
           <a:xfrm>
-            <a:off x="9056538" y="463890"/>
+            <a:off x="8573187" y="715331"/>
             <a:ext cx="405880" cy="184666"/>
           </a:xfrm>
           <a:prstGeom prst="rect">
@@ -7118,14 +7121,13 @@
           <p:cNvCxnSpPr>
             <a:cxnSpLocks/>
             <a:stCxn id="104" idx="2"/>
-            <a:endCxn id="65" idx="0"/>
           </p:cNvCxnSpPr>
           <p:nvPr/>
         </p:nvCxnSpPr>
         <p:spPr>
           <a:xfrm>
             <a:off x="9993952" y="332097"/>
-            <a:ext cx="255159" cy="427087"/>
+            <a:ext cx="92760" cy="316459"/>
           </a:xfrm>
           <a:prstGeom prst="straightConnector1">
             <a:avLst/>
@@ -7163,7 +7165,7 @@
         </p:nvSpPr>
         <p:spPr>
           <a:xfrm>
-            <a:off x="12405433" y="771883"/>
+            <a:off x="12405433" y="645271"/>
             <a:ext cx="266700" cy="246221"/>
           </a:xfrm>
           <a:prstGeom prst="ellipse">
@@ -7215,7 +7217,7 @@
         </p:nvCxnSpPr>
         <p:spPr>
           <a:xfrm flipV="1">
-            <a:off x="11020163" y="894994"/>
+            <a:off x="11020163" y="768382"/>
             <a:ext cx="1385270" cy="1"/>
           </a:xfrm>
           <a:prstGeom prst="straightConnector1">
@@ -7254,7 +7256,7 @@
         </p:nvSpPr>
         <p:spPr>
           <a:xfrm>
-            <a:off x="11037406" y="720107"/>
+            <a:off x="11037406" y="593495"/>
             <a:ext cx="721672" cy="184666"/>
           </a:xfrm>
           <a:prstGeom prst="rect">
@@ -7271,6 +7273,400 @@
             <a:r>
               <a:rPr lang="es-ES" sz="600" dirty="0" err="1"/>
               <a:t>forUseInQueryAs</a:t>
+            </a:r>
+            <a:endParaRPr lang="es-ES" sz="600" dirty="0"/>
+          </a:p>
+        </p:txBody>
+      </p:sp>
+      <p:sp>
+        <p:nvSpPr>
+          <p:cNvPr id="114" name="CuadroTexto 113">
+            <a:extLst>
+              <a:ext uri="{FF2B5EF4-FFF2-40B4-BE49-F238E27FC236}">
+                <a16:creationId xmlns:a16="http://schemas.microsoft.com/office/drawing/2014/main" id="{372AB421-DD83-E24B-8D1F-9DBF6E43C11A}"/>
+              </a:ext>
+            </a:extLst>
+          </p:cNvPr>
+          <p:cNvSpPr txBox="1"/>
+          <p:nvPr/>
+        </p:nvSpPr>
+        <p:spPr>
+          <a:xfrm>
+            <a:off x="9090206" y="1150735"/>
+            <a:ext cx="1768433" cy="246221"/>
+          </a:xfrm>
+          <a:prstGeom prst="rect">
+            <a:avLst/>
+          </a:prstGeom>
+          <a:noFill/>
+        </p:spPr>
+        <p:txBody>
+          <a:bodyPr wrap="none" rtlCol="0">
+            <a:spAutoFit/>
+          </a:bodyPr>
+          <a:lstStyle/>
+          <a:p>
+            <a:r>
+              <a:rPr lang="es-ES_tradnl" sz="1000" dirty="0" err="1"/>
+              <a:t>CustomizableExecutableSelect</a:t>
+            </a:r>
+            <a:endParaRPr lang="es-ES_tradnl" sz="1000" dirty="0"/>
+          </a:p>
+        </p:txBody>
+      </p:sp>
+      <p:cxnSp>
+        <p:nvCxnSpPr>
+          <p:cNvPr id="132" name="Conector recto de flecha 131">
+            <a:extLst>
+              <a:ext uri="{FF2B5EF4-FFF2-40B4-BE49-F238E27FC236}">
+                <a16:creationId xmlns:a16="http://schemas.microsoft.com/office/drawing/2014/main" id="{2E1A19AF-80E4-E84D-99EC-86BF6201316A}"/>
+              </a:ext>
+            </a:extLst>
+          </p:cNvPr>
+          <p:cNvCxnSpPr>
+            <a:cxnSpLocks/>
+            <a:stCxn id="65" idx="2"/>
+            <a:endCxn id="114" idx="0"/>
+          </p:cNvCxnSpPr>
+          <p:nvPr/>
+        </p:nvCxnSpPr>
+        <p:spPr>
+          <a:xfrm flipH="1">
+            <a:off x="9974423" y="878793"/>
+            <a:ext cx="274688" cy="271942"/>
+          </a:xfrm>
+          <a:prstGeom prst="straightConnector1">
+            <a:avLst/>
+          </a:prstGeom>
+          <a:ln>
+            <a:tailEnd type="triangle"/>
+          </a:ln>
+        </p:spPr>
+        <p:style>
+          <a:lnRef idx="3">
+            <a:schemeClr val="accent2"/>
+          </a:lnRef>
+          <a:fillRef idx="0">
+            <a:schemeClr val="accent2"/>
+          </a:fillRef>
+          <a:effectRef idx="2">
+            <a:schemeClr val="accent2"/>
+          </a:effectRef>
+          <a:fontRef idx="minor">
+            <a:schemeClr val="tx1"/>
+          </a:fontRef>
+        </p:style>
+      </p:cxnSp>
+      <p:cxnSp>
+        <p:nvCxnSpPr>
+          <p:cNvPr id="133" name="Conector recto de flecha 132">
+            <a:extLst>
+              <a:ext uri="{FF2B5EF4-FFF2-40B4-BE49-F238E27FC236}">
+                <a16:creationId xmlns:a16="http://schemas.microsoft.com/office/drawing/2014/main" id="{101E8191-9F29-8F4B-9370-B1C5B98D4C27}"/>
+              </a:ext>
+            </a:extLst>
+          </p:cNvPr>
+          <p:cNvCxnSpPr>
+            <a:cxnSpLocks/>
+          </p:cNvCxnSpPr>
+          <p:nvPr/>
+        </p:nvCxnSpPr>
+        <p:spPr>
+          <a:xfrm flipV="1">
+            <a:off x="10595133" y="889314"/>
+            <a:ext cx="144398" cy="276607"/>
+          </a:xfrm>
+          <a:prstGeom prst="straightConnector1">
+            <a:avLst/>
+          </a:prstGeom>
+          <a:ln>
+            <a:tailEnd type="triangle"/>
+          </a:ln>
+        </p:spPr>
+        <p:style>
+          <a:lnRef idx="1">
+            <a:schemeClr val="accent1"/>
+          </a:lnRef>
+          <a:fillRef idx="0">
+            <a:schemeClr val="accent1"/>
+          </a:fillRef>
+          <a:effectRef idx="0">
+            <a:schemeClr val="accent1"/>
+          </a:effectRef>
+          <a:fontRef idx="minor">
+            <a:schemeClr val="tx1"/>
+          </a:fontRef>
+        </p:style>
+      </p:cxnSp>
+      <p:sp>
+        <p:nvSpPr>
+          <p:cNvPr id="134" name="CuadroTexto 133">
+            <a:extLst>
+              <a:ext uri="{FF2B5EF4-FFF2-40B4-BE49-F238E27FC236}">
+                <a16:creationId xmlns:a16="http://schemas.microsoft.com/office/drawing/2014/main" id="{C5F23C8C-0979-7344-B8D9-3A4FEB1DEE57}"/>
+              </a:ext>
+            </a:extLst>
+          </p:cNvPr>
+          <p:cNvSpPr txBox="1"/>
+          <p:nvPr/>
+        </p:nvSpPr>
+        <p:spPr>
+          <a:xfrm>
+            <a:off x="10641932" y="945193"/>
+            <a:ext cx="692818" cy="184666"/>
+          </a:xfrm>
+          <a:prstGeom prst="rect">
+            <a:avLst/>
+          </a:prstGeom>
+          <a:noFill/>
+        </p:spPr>
+        <p:txBody>
+          <a:bodyPr wrap="none" rtlCol="0">
+            <a:spAutoFit/>
+          </a:bodyPr>
+          <a:lstStyle/>
+          <a:p>
+            <a:r>
+              <a:rPr lang="es-ES" sz="600" dirty="0" err="1"/>
+              <a:t>customizeQuery</a:t>
+            </a:r>
+            <a:endParaRPr lang="es-ES" sz="600" dirty="0"/>
+          </a:p>
+        </p:txBody>
+      </p:sp>
+      <p:sp>
+        <p:nvSpPr>
+          <p:cNvPr id="136" name="CuadroTexto 135">
+            <a:extLst>
+              <a:ext uri="{FF2B5EF4-FFF2-40B4-BE49-F238E27FC236}">
+                <a16:creationId xmlns:a16="http://schemas.microsoft.com/office/drawing/2014/main" id="{88C09B90-45BE-9543-9009-FFF45F506AC2}"/>
+              </a:ext>
+            </a:extLst>
+          </p:cNvPr>
+          <p:cNvSpPr txBox="1"/>
+          <p:nvPr/>
+        </p:nvSpPr>
+        <p:spPr>
+          <a:xfrm>
+            <a:off x="9862530" y="3316457"/>
+            <a:ext cx="3033203" cy="246221"/>
+          </a:xfrm>
+          <a:prstGeom prst="rect">
+            <a:avLst/>
+          </a:prstGeom>
+          <a:noFill/>
+        </p:spPr>
+        <p:txBody>
+          <a:bodyPr wrap="none" rtlCol="0">
+            <a:spAutoFit/>
+          </a:bodyPr>
+          <a:lstStyle/>
+          <a:p>
+            <a:pPr algn="ctr"/>
+            <a:r>
+              <a:rPr lang="es-ES_tradnl" sz="1000" dirty="0" err="1"/>
+              <a:t>CustomizedCompoundableExecutableSelectExpression</a:t>
+            </a:r>
+            <a:endParaRPr lang="es-ES_tradnl" sz="1000" dirty="0"/>
+          </a:p>
+        </p:txBody>
+      </p:sp>
+      <p:cxnSp>
+        <p:nvCxnSpPr>
+          <p:cNvPr id="137" name="Conector recto de flecha 136">
+            <a:extLst>
+              <a:ext uri="{FF2B5EF4-FFF2-40B4-BE49-F238E27FC236}">
+                <a16:creationId xmlns:a16="http://schemas.microsoft.com/office/drawing/2014/main" id="{C55E0D6B-6D18-CB49-A8E5-62EF18CA2868}"/>
+              </a:ext>
+            </a:extLst>
+          </p:cNvPr>
+          <p:cNvCxnSpPr>
+            <a:cxnSpLocks/>
+          </p:cNvCxnSpPr>
+          <p:nvPr/>
+        </p:nvCxnSpPr>
+        <p:spPr>
+          <a:xfrm>
+            <a:off x="10497192" y="900498"/>
+            <a:ext cx="479540" cy="2415959"/>
+          </a:xfrm>
+          <a:prstGeom prst="straightConnector1">
+            <a:avLst/>
+          </a:prstGeom>
+          <a:ln>
+            <a:tailEnd type="triangle"/>
+          </a:ln>
+        </p:spPr>
+        <p:style>
+          <a:lnRef idx="3">
+            <a:schemeClr val="accent2"/>
+          </a:lnRef>
+          <a:fillRef idx="0">
+            <a:schemeClr val="accent2"/>
+          </a:fillRef>
+          <a:effectRef idx="2">
+            <a:schemeClr val="accent2"/>
+          </a:effectRef>
+          <a:fontRef idx="minor">
+            <a:schemeClr val="tx1"/>
+          </a:fontRef>
+        </p:style>
+      </p:cxnSp>
+      <p:cxnSp>
+        <p:nvCxnSpPr>
+          <p:cNvPr id="138" name="Conector recto de flecha 137">
+            <a:extLst>
+              <a:ext uri="{FF2B5EF4-FFF2-40B4-BE49-F238E27FC236}">
+                <a16:creationId xmlns:a16="http://schemas.microsoft.com/office/drawing/2014/main" id="{A69D6A43-D210-9946-B5CF-8E348F01D273}"/>
+              </a:ext>
+            </a:extLst>
+          </p:cNvPr>
+          <p:cNvCxnSpPr>
+            <a:cxnSpLocks/>
+            <a:endCxn id="121" idx="2"/>
+          </p:cNvCxnSpPr>
+          <p:nvPr/>
+        </p:nvCxnSpPr>
+        <p:spPr>
+          <a:xfrm flipV="1">
+            <a:off x="12465820" y="3013624"/>
+            <a:ext cx="0" cy="368350"/>
+          </a:xfrm>
+          <a:prstGeom prst="straightConnector1">
+            <a:avLst/>
+          </a:prstGeom>
+          <a:ln>
+            <a:tailEnd type="triangle"/>
+          </a:ln>
+        </p:spPr>
+        <p:style>
+          <a:lnRef idx="1">
+            <a:schemeClr val="accent1"/>
+          </a:lnRef>
+          <a:fillRef idx="0">
+            <a:schemeClr val="accent1"/>
+          </a:fillRef>
+          <a:effectRef idx="0">
+            <a:schemeClr val="accent1"/>
+          </a:effectRef>
+          <a:fontRef idx="minor">
+            <a:schemeClr val="tx1"/>
+          </a:fontRef>
+        </p:style>
+      </p:cxnSp>
+      <p:sp>
+        <p:nvSpPr>
+          <p:cNvPr id="140" name="CuadroTexto 139">
+            <a:extLst>
+              <a:ext uri="{FF2B5EF4-FFF2-40B4-BE49-F238E27FC236}">
+                <a16:creationId xmlns:a16="http://schemas.microsoft.com/office/drawing/2014/main" id="{50E00967-1BCA-E34F-B8C0-F224805D6559}"/>
+              </a:ext>
+            </a:extLst>
+          </p:cNvPr>
+          <p:cNvSpPr txBox="1"/>
+          <p:nvPr/>
+        </p:nvSpPr>
+        <p:spPr>
+          <a:xfrm>
+            <a:off x="12488454" y="3071017"/>
+            <a:ext cx="486030" cy="184666"/>
+          </a:xfrm>
+          <a:prstGeom prst="rect">
+            <a:avLst/>
+          </a:prstGeom>
+          <a:noFill/>
+        </p:spPr>
+        <p:txBody>
+          <a:bodyPr wrap="none" rtlCol="0">
+            <a:spAutoFit/>
+          </a:bodyPr>
+          <a:lstStyle/>
+          <a:p>
+            <a:r>
+              <a:rPr lang="es-ES_tradnl" sz="600" dirty="0" err="1"/>
+              <a:t>union</a:t>
+            </a:r>
+            <a:r>
+              <a:rPr lang="es-ES_tradnl" sz="600" dirty="0"/>
+              <a:t> | …</a:t>
+            </a:r>
+            <a:endParaRPr lang="es-ES" sz="600" dirty="0"/>
+          </a:p>
+        </p:txBody>
+      </p:sp>
+      <p:cxnSp>
+        <p:nvCxnSpPr>
+          <p:cNvPr id="142" name="Conector recto de flecha 141">
+            <a:extLst>
+              <a:ext uri="{FF2B5EF4-FFF2-40B4-BE49-F238E27FC236}">
+                <a16:creationId xmlns:a16="http://schemas.microsoft.com/office/drawing/2014/main" id="{2AE6ACAA-02F6-554C-A7D7-334B6FEB1BF8}"/>
+              </a:ext>
+            </a:extLst>
+          </p:cNvPr>
+          <p:cNvCxnSpPr>
+            <a:cxnSpLocks/>
+            <a:endCxn id="136" idx="1"/>
+          </p:cNvCxnSpPr>
+          <p:nvPr/>
+        </p:nvCxnSpPr>
+        <p:spPr>
+          <a:xfrm>
+            <a:off x="9250605" y="3031862"/>
+            <a:ext cx="611925" cy="407706"/>
+          </a:xfrm>
+          <a:prstGeom prst="straightConnector1">
+            <a:avLst/>
+          </a:prstGeom>
+          <a:ln>
+            <a:tailEnd type="triangle"/>
+          </a:ln>
+        </p:spPr>
+        <p:style>
+          <a:lnRef idx="1">
+            <a:schemeClr val="accent1"/>
+          </a:lnRef>
+          <a:fillRef idx="0">
+            <a:schemeClr val="accent1"/>
+          </a:fillRef>
+          <a:effectRef idx="0">
+            <a:schemeClr val="accent1"/>
+          </a:effectRef>
+          <a:fontRef idx="minor">
+            <a:schemeClr val="tx1"/>
+          </a:fontRef>
+        </p:style>
+      </p:cxnSp>
+      <p:sp>
+        <p:nvSpPr>
+          <p:cNvPr id="143" name="CuadroTexto 142">
+            <a:extLst>
+              <a:ext uri="{FF2B5EF4-FFF2-40B4-BE49-F238E27FC236}">
+                <a16:creationId xmlns:a16="http://schemas.microsoft.com/office/drawing/2014/main" id="{A3EF31AE-C37D-B746-86E1-4DA19529F98D}"/>
+              </a:ext>
+            </a:extLst>
+          </p:cNvPr>
+          <p:cNvSpPr txBox="1"/>
+          <p:nvPr/>
+        </p:nvSpPr>
+        <p:spPr>
+          <a:xfrm>
+            <a:off x="9484581" y="3053554"/>
+            <a:ext cx="692818" cy="184666"/>
+          </a:xfrm>
+          <a:prstGeom prst="rect">
+            <a:avLst/>
+          </a:prstGeom>
+          <a:noFill/>
+        </p:spPr>
+        <p:txBody>
+          <a:bodyPr wrap="none" rtlCol="0">
+            <a:spAutoFit/>
+          </a:bodyPr>
+          <a:lstStyle/>
+          <a:p>
+            <a:r>
+              <a:rPr lang="es-ES" sz="600" dirty="0" err="1"/>
+              <a:t>customizeQuery</a:t>
             </a:r>
             <a:endParaRPr lang="es-ES" sz="600" dirty="0"/>
           </a:p>

</xml_diff>

<commit_message>
Add more options to organize the select clauses, making in this way easier to create functions that return queries partially constructed
</commit_message>
<xml_diff>
--- a/docs/select.pptx
+++ b/docs/select.pptx
@@ -255,7 +255,7 @@
           <a:p>
             <a:fld id="{064700E2-490F-4419-AC2C-49136718AF20}" type="datetimeFigureOut">
               <a:rPr lang="es-ES" smtClean="0"/>
-              <a:t>7/6/21</a:t>
+              <a:t>21/8/21</a:t>
             </a:fld>
             <a:endParaRPr lang="es-ES"/>
           </a:p>
@@ -425,7 +425,7 @@
           <a:p>
             <a:fld id="{064700E2-490F-4419-AC2C-49136718AF20}" type="datetimeFigureOut">
               <a:rPr lang="es-ES" smtClean="0"/>
-              <a:t>7/6/21</a:t>
+              <a:t>21/8/21</a:t>
             </a:fld>
             <a:endParaRPr lang="es-ES"/>
           </a:p>
@@ -605,7 +605,7 @@
           <a:p>
             <a:fld id="{064700E2-490F-4419-AC2C-49136718AF20}" type="datetimeFigureOut">
               <a:rPr lang="es-ES" smtClean="0"/>
-              <a:t>7/6/21</a:t>
+              <a:t>21/8/21</a:t>
             </a:fld>
             <a:endParaRPr lang="es-ES"/>
           </a:p>
@@ -775,7 +775,7 @@
           <a:p>
             <a:fld id="{064700E2-490F-4419-AC2C-49136718AF20}" type="datetimeFigureOut">
               <a:rPr lang="es-ES" smtClean="0"/>
-              <a:t>7/6/21</a:t>
+              <a:t>21/8/21</a:t>
             </a:fld>
             <a:endParaRPr lang="es-ES"/>
           </a:p>
@@ -1021,7 +1021,7 @@
           <a:p>
             <a:fld id="{064700E2-490F-4419-AC2C-49136718AF20}" type="datetimeFigureOut">
               <a:rPr lang="es-ES" smtClean="0"/>
-              <a:t>7/6/21</a:t>
+              <a:t>21/8/21</a:t>
             </a:fld>
             <a:endParaRPr lang="es-ES"/>
           </a:p>
@@ -1253,7 +1253,7 @@
           <a:p>
             <a:fld id="{064700E2-490F-4419-AC2C-49136718AF20}" type="datetimeFigureOut">
               <a:rPr lang="es-ES" smtClean="0"/>
-              <a:t>7/6/21</a:t>
+              <a:t>21/8/21</a:t>
             </a:fld>
             <a:endParaRPr lang="es-ES"/>
           </a:p>
@@ -1620,7 +1620,7 @@
           <a:p>
             <a:fld id="{064700E2-490F-4419-AC2C-49136718AF20}" type="datetimeFigureOut">
               <a:rPr lang="es-ES" smtClean="0"/>
-              <a:t>7/6/21</a:t>
+              <a:t>21/8/21</a:t>
             </a:fld>
             <a:endParaRPr lang="es-ES"/>
           </a:p>
@@ -1738,7 +1738,7 @@
           <a:p>
             <a:fld id="{064700E2-490F-4419-AC2C-49136718AF20}" type="datetimeFigureOut">
               <a:rPr lang="es-ES" smtClean="0"/>
-              <a:t>7/6/21</a:t>
+              <a:t>21/8/21</a:t>
             </a:fld>
             <a:endParaRPr lang="es-ES"/>
           </a:p>
@@ -1833,7 +1833,7 @@
           <a:p>
             <a:fld id="{064700E2-490F-4419-AC2C-49136718AF20}" type="datetimeFigureOut">
               <a:rPr lang="es-ES" smtClean="0"/>
-              <a:t>7/6/21</a:t>
+              <a:t>21/8/21</a:t>
             </a:fld>
             <a:endParaRPr lang="es-ES"/>
           </a:p>
@@ -2110,7 +2110,7 @@
           <a:p>
             <a:fld id="{064700E2-490F-4419-AC2C-49136718AF20}" type="datetimeFigureOut">
               <a:rPr lang="es-ES" smtClean="0"/>
-              <a:t>7/6/21</a:t>
+              <a:t>21/8/21</a:t>
             </a:fld>
             <a:endParaRPr lang="es-ES"/>
           </a:p>
@@ -2367,7 +2367,7 @@
           <a:p>
             <a:fld id="{064700E2-490F-4419-AC2C-49136718AF20}" type="datetimeFigureOut">
               <a:rPr lang="es-ES" smtClean="0"/>
-              <a:t>7/6/21</a:t>
+              <a:t>21/8/21</a:t>
             </a:fld>
             <a:endParaRPr lang="es-ES"/>
           </a:p>
@@ -2580,7 +2580,7 @@
           <a:p>
             <a:fld id="{064700E2-490F-4419-AC2C-49136718AF20}" type="datetimeFigureOut">
               <a:rPr lang="es-ES" smtClean="0"/>
-              <a:t>7/6/21</a:t>
+              <a:t>21/8/21</a:t>
             </a:fld>
             <a:endParaRPr lang="es-ES"/>
           </a:p>
@@ -3201,7 +3201,7 @@
           <a:lstStyle/>
           <a:p>
             <a:r>
-              <a:rPr lang="es-ES_tradnl" sz="600" dirty="0" err="1"/>
+              <a:rPr lang="es-ES_tradnl" sz="600" dirty="0"/>
               <a:t>from</a:t>
             </a:r>
             <a:endParaRPr lang="es-ES" sz="600" dirty="0"/>
@@ -3324,12 +3324,8 @@
           <a:lstStyle/>
           <a:p>
             <a:r>
-              <a:rPr lang="es-ES_tradnl" sz="600" dirty="0" err="1"/>
-              <a:t>select</a:t>
-            </a:r>
-            <a:r>
               <a:rPr lang="es-ES_tradnl" sz="600" dirty="0"/>
-              <a:t>*</a:t>
+              <a:t>select*</a:t>
             </a:r>
             <a:endParaRPr lang="es-ES" sz="600" dirty="0"/>
           </a:p>
@@ -3444,11 +3440,7 @@
           <a:p>
             <a:r>
               <a:rPr lang="es-ES_tradnl" sz="600" dirty="0"/>
-              <a:t>*</a:t>
-            </a:r>
-            <a:r>
-              <a:rPr lang="es-ES_tradnl" sz="600" dirty="0" err="1"/>
-              <a:t>where</a:t>
+              <a:t>*where</a:t>
             </a:r>
             <a:endParaRPr lang="es-ES" sz="600" dirty="0"/>
           </a:p>
@@ -3529,7 +3521,7 @@
           <a:lstStyle/>
           <a:p>
             <a:r>
-              <a:rPr lang="es-ES_tradnl" sz="600" dirty="0" err="1"/>
+              <a:rPr lang="es-ES_tradnl" sz="600" dirty="0"/>
               <a:t>from</a:t>
             </a:r>
             <a:endParaRPr lang="es-ES" sz="600" dirty="0"/>
@@ -4241,12 +4233,8 @@
           <a:lstStyle/>
           <a:p>
             <a:r>
-              <a:rPr lang="es-ES_tradnl" sz="600" dirty="0" err="1"/>
-              <a:t>select</a:t>
-            </a:r>
-            <a:r>
               <a:rPr lang="es-ES_tradnl" sz="600" dirty="0"/>
-              <a:t>*</a:t>
+              <a:t>select*</a:t>
             </a:r>
             <a:endParaRPr lang="es-ES" sz="600" dirty="0"/>
           </a:p>
@@ -4621,15 +4609,14 @@
           </p:cNvPr>
           <p:cNvCxnSpPr>
             <a:cxnSpLocks/>
-            <a:stCxn id="66" idx="2"/>
-            <a:endCxn id="12" idx="0"/>
+            <a:stCxn id="47" idx="2"/>
           </p:cNvCxnSpPr>
           <p:nvPr/>
         </p:nvCxnSpPr>
         <p:spPr>
           <a:xfrm flipH="1">
-            <a:off x="7016439" y="6093591"/>
-            <a:ext cx="1739637" cy="738353"/>
+            <a:off x="7840243" y="3028693"/>
+            <a:ext cx="879613" cy="3790036"/>
           </a:xfrm>
           <a:prstGeom prst="straightConnector1">
             <a:avLst/>
@@ -4935,18 +4922,9 @@
           <a:lstStyle/>
           <a:p>
             <a:r>
-              <a:rPr lang="es-ES_tradnl" sz="600" dirty="0" err="1"/>
-              <a:t>select</a:t>
-            </a:r>
-            <a:r>
               <a:rPr lang="es-ES_tradnl" sz="600" dirty="0"/>
-              <a:t>*</a:t>
-            </a:r>
-            <a:r>
-              <a:rPr lang="es-ES_tradnl" sz="600" dirty="0" err="1"/>
-              <a:t>from</a:t>
-            </a:r>
-            <a:endParaRPr lang="es-ES_tradnl" sz="600" dirty="0"/>
+              <a:t>select*from</a:t>
+            </a:r>
           </a:p>
           <a:p>
             <a:endParaRPr lang="es-ES" sz="600" dirty="0"/>
@@ -5143,7 +5121,7 @@
           <a:lstStyle/>
           <a:p>
             <a:r>
-              <a:rPr lang="es-ES_tradnl" sz="600" dirty="0" err="1"/>
+              <a:rPr lang="es-ES_tradnl" sz="600" dirty="0"/>
               <a:t>from</a:t>
             </a:r>
             <a:endParaRPr lang="es-ES" sz="600" dirty="0"/>
@@ -5334,12 +5312,8 @@
           <a:lstStyle/>
           <a:p>
             <a:r>
-              <a:rPr lang="es-ES_tradnl" sz="600" dirty="0" err="1"/>
-              <a:t>select</a:t>
-            </a:r>
-            <a:r>
               <a:rPr lang="es-ES_tradnl" sz="600" dirty="0"/>
-              <a:t>*</a:t>
+              <a:t>select*</a:t>
             </a:r>
             <a:endParaRPr lang="es-ES" sz="600" dirty="0"/>
           </a:p>
@@ -5452,11 +5426,7 @@
           <a:p>
             <a:r>
               <a:rPr lang="es-ES_tradnl" sz="600" dirty="0"/>
-              <a:t>*</a:t>
-            </a:r>
-            <a:r>
-              <a:rPr lang="es-ES_tradnl" sz="600" dirty="0" err="1"/>
-              <a:t>where</a:t>
+              <a:t>*where</a:t>
             </a:r>
             <a:endParaRPr lang="es-ES" sz="600" dirty="0"/>
           </a:p>
@@ -6142,10 +6112,9 @@
           <a:p>
             <a:pPr algn="ctr"/>
             <a:r>
-              <a:rPr lang="es-ES_tradnl" sz="1000" dirty="0" err="1"/>
+              <a:rPr lang="es-ES_tradnl" sz="1000" dirty="0"/>
               <a:t>GroupByOrderHavingByExpressionWithoutSelect</a:t>
             </a:r>
-            <a:endParaRPr lang="es-ES_tradnl" sz="1000" dirty="0"/>
           </a:p>
         </p:txBody>
       </p:sp>
@@ -6199,7 +6168,7 @@
         </p:nvSpPr>
         <p:spPr>
           <a:xfrm>
-            <a:off x="4793240" y="3824579"/>
+            <a:off x="4653540" y="3824579"/>
             <a:ext cx="2294218" cy="246221"/>
           </a:xfrm>
           <a:prstGeom prst="rect">
@@ -6214,10 +6183,9 @@
           <a:lstStyle/>
           <a:p>
             <a:r>
-              <a:rPr lang="es-ES_tradnl" sz="1000" dirty="0" err="1"/>
+              <a:rPr lang="es-ES_tradnl" sz="1000" dirty="0"/>
               <a:t>DynamicHavingExpressionWithoutSelect</a:t>
             </a:r>
-            <a:endParaRPr lang="es-ES_tradnl" sz="1000" dirty="0"/>
           </a:p>
         </p:txBody>
       </p:sp>
@@ -6239,7 +6207,7 @@
         </p:nvCxnSpPr>
         <p:spPr>
           <a:xfrm rot="10800000" flipH="1">
-            <a:off x="4793239" y="3824580"/>
+            <a:off x="4653539" y="3824580"/>
             <a:ext cx="1147109" cy="123111"/>
           </a:xfrm>
           <a:prstGeom prst="bentConnector4">
@@ -6313,14 +6281,15 @@
             </a:extLst>
           </p:cNvPr>
           <p:cNvCxnSpPr>
-            <a:stCxn id="103" idx="3"/>
+            <a:cxnSpLocks/>
+            <a:endCxn id="159" idx="1"/>
           </p:cNvCxnSpPr>
           <p:nvPr/>
         </p:nvCxnSpPr>
         <p:spPr>
-          <a:xfrm flipV="1">
-            <a:off x="8078744" y="3028693"/>
-            <a:ext cx="530749" cy="1998497"/>
+          <a:xfrm>
+            <a:off x="7096616" y="5156995"/>
+            <a:ext cx="2151406" cy="2797882"/>
           </a:xfrm>
           <a:prstGeom prst="straightConnector1">
             <a:avLst/>
@@ -6354,14 +6323,16 @@
             </a:extLst>
           </p:cNvPr>
           <p:cNvCxnSpPr>
+            <a:cxnSpLocks/>
             <a:stCxn id="106" idx="3"/>
+            <a:endCxn id="159" idx="1"/>
           </p:cNvCxnSpPr>
           <p:nvPr/>
         </p:nvCxnSpPr>
         <p:spPr>
-          <a:xfrm flipV="1">
-            <a:off x="7087458" y="3028693"/>
-            <a:ext cx="1446942" cy="918997"/>
+          <a:xfrm>
+            <a:off x="6947758" y="3947690"/>
+            <a:ext cx="2300264" cy="4007187"/>
           </a:xfrm>
           <a:prstGeom prst="straightConnector1">
             <a:avLst/>
@@ -6486,7 +6457,7 @@
         </p:nvSpPr>
         <p:spPr>
           <a:xfrm>
-            <a:off x="7898827" y="4179665"/>
+            <a:off x="6921957" y="5335318"/>
             <a:ext cx="405880" cy="184666"/>
           </a:xfrm>
           <a:prstGeom prst="rect">
@@ -6501,12 +6472,8 @@
           <a:lstStyle/>
           <a:p>
             <a:r>
-              <a:rPr lang="es-ES_tradnl" sz="600" dirty="0" err="1"/>
-              <a:t>select</a:t>
-            </a:r>
-            <a:r>
               <a:rPr lang="es-ES_tradnl" sz="600" dirty="0"/>
-              <a:t>*</a:t>
+              <a:t>select*</a:t>
             </a:r>
             <a:endParaRPr lang="es-ES" sz="600" dirty="0"/>
           </a:p>
@@ -6526,7 +6493,7 @@
         </p:nvSpPr>
         <p:spPr>
           <a:xfrm>
-            <a:off x="7192444" y="3400885"/>
+            <a:off x="6925605" y="4430840"/>
             <a:ext cx="405880" cy="184666"/>
           </a:xfrm>
           <a:prstGeom prst="rect">
@@ -6541,12 +6508,8 @@
           <a:lstStyle/>
           <a:p>
             <a:r>
-              <a:rPr lang="es-ES_tradnl" sz="600" dirty="0" err="1"/>
-              <a:t>select</a:t>
-            </a:r>
-            <a:r>
               <a:rPr lang="es-ES_tradnl" sz="600" dirty="0"/>
-              <a:t>*</a:t>
+              <a:t>select*</a:t>
             </a:r>
             <a:endParaRPr lang="es-ES" sz="600" dirty="0"/>
           </a:p>
@@ -7667,6 +7630,1150 @@
             <a:r>
               <a:rPr lang="es-ES" sz="600" dirty="0" err="1"/>
               <a:t>customizeQuery</a:t>
+            </a:r>
+            <a:endParaRPr lang="es-ES" sz="600" dirty="0"/>
+          </a:p>
+        </p:txBody>
+      </p:sp>
+      <p:sp>
+        <p:nvSpPr>
+          <p:cNvPr id="145" name="CuadroTexto 144">
+            <a:extLst>
+              <a:ext uri="{FF2B5EF4-FFF2-40B4-BE49-F238E27FC236}">
+                <a16:creationId xmlns:a16="http://schemas.microsoft.com/office/drawing/2014/main" id="{23DF8151-5C12-2E4F-A8B4-3A4A797C55AA}"/>
+              </a:ext>
+            </a:extLst>
+          </p:cNvPr>
+          <p:cNvSpPr txBox="1"/>
+          <p:nvPr/>
+        </p:nvSpPr>
+        <p:spPr>
+          <a:xfrm>
+            <a:off x="8121140" y="7870829"/>
+            <a:ext cx="445956" cy="184666"/>
+          </a:xfrm>
+          <a:prstGeom prst="rect">
+            <a:avLst/>
+          </a:prstGeom>
+          <a:noFill/>
+        </p:spPr>
+        <p:txBody>
+          <a:bodyPr wrap="none" rtlCol="0">
+            <a:spAutoFit/>
+          </a:bodyPr>
+          <a:lstStyle/>
+          <a:p>
+            <a:r>
+              <a:rPr lang="es-ES_tradnl" sz="600" dirty="0" err="1"/>
+              <a:t>groupBy</a:t>
+            </a:r>
+            <a:endParaRPr lang="es-ES" sz="600" dirty="0"/>
+          </a:p>
+        </p:txBody>
+      </p:sp>
+      <p:sp>
+        <p:nvSpPr>
+          <p:cNvPr id="146" name="CuadroTexto 145">
+            <a:extLst>
+              <a:ext uri="{FF2B5EF4-FFF2-40B4-BE49-F238E27FC236}">
+                <a16:creationId xmlns:a16="http://schemas.microsoft.com/office/drawing/2014/main" id="{7C54D2B3-5D8F-BC4F-8AAB-890481E32556}"/>
+              </a:ext>
+            </a:extLst>
+          </p:cNvPr>
+          <p:cNvSpPr txBox="1"/>
+          <p:nvPr/>
+        </p:nvSpPr>
+        <p:spPr>
+          <a:xfrm>
+            <a:off x="7790612" y="9032555"/>
+            <a:ext cx="3656771" cy="246221"/>
+          </a:xfrm>
+          <a:prstGeom prst="rect">
+            <a:avLst/>
+          </a:prstGeom>
+          <a:noFill/>
+        </p:spPr>
+        <p:txBody>
+          <a:bodyPr wrap="none" rtlCol="0">
+            <a:spAutoFit/>
+          </a:bodyPr>
+          <a:lstStyle/>
+          <a:p>
+            <a:pPr algn="ctr"/>
+            <a:r>
+              <a:rPr lang="es-ES_tradnl" sz="1000" dirty="0" err="1"/>
+              <a:t>GroupByOrderByHavingExecutableSelectExpressionWithoutWhere</a:t>
+            </a:r>
+            <a:endParaRPr lang="es-ES_tradnl" sz="1000" dirty="0"/>
+          </a:p>
+        </p:txBody>
+      </p:sp>
+      <p:cxnSp>
+        <p:nvCxnSpPr>
+          <p:cNvPr id="147" name="Conector recto de flecha 146">
+            <a:extLst>
+              <a:ext uri="{FF2B5EF4-FFF2-40B4-BE49-F238E27FC236}">
+                <a16:creationId xmlns:a16="http://schemas.microsoft.com/office/drawing/2014/main" id="{F4A7E3FB-5025-4044-AACC-9BA2500E07BB}"/>
+              </a:ext>
+            </a:extLst>
+          </p:cNvPr>
+          <p:cNvCxnSpPr>
+            <a:cxnSpLocks/>
+            <a:stCxn id="12" idx="2"/>
+          </p:cNvCxnSpPr>
+          <p:nvPr/>
+        </p:nvCxnSpPr>
+        <p:spPr>
+          <a:xfrm>
+            <a:off x="7016439" y="7078165"/>
+            <a:ext cx="2024657" cy="1982983"/>
+          </a:xfrm>
+          <a:prstGeom prst="straightConnector1">
+            <a:avLst/>
+          </a:prstGeom>
+          <a:ln>
+            <a:tailEnd type="triangle"/>
+          </a:ln>
+        </p:spPr>
+        <p:style>
+          <a:lnRef idx="1">
+            <a:schemeClr val="accent1"/>
+          </a:lnRef>
+          <a:fillRef idx="0">
+            <a:schemeClr val="accent1"/>
+          </a:fillRef>
+          <a:effectRef idx="0">
+            <a:schemeClr val="accent1"/>
+          </a:effectRef>
+          <a:fontRef idx="minor">
+            <a:schemeClr val="tx1"/>
+          </a:fontRef>
+        </p:style>
+      </p:cxnSp>
+      <p:cxnSp>
+        <p:nvCxnSpPr>
+          <p:cNvPr id="148" name="Conector recto de flecha 32">
+            <a:extLst>
+              <a:ext uri="{FF2B5EF4-FFF2-40B4-BE49-F238E27FC236}">
+                <a16:creationId xmlns:a16="http://schemas.microsoft.com/office/drawing/2014/main" id="{46B87395-26FC-D44E-BBF9-12438E17FF5C}"/>
+              </a:ext>
+            </a:extLst>
+          </p:cNvPr>
+          <p:cNvCxnSpPr>
+            <a:cxnSpLocks/>
+            <a:stCxn id="146" idx="3"/>
+            <a:endCxn id="146" idx="0"/>
+          </p:cNvCxnSpPr>
+          <p:nvPr/>
+        </p:nvCxnSpPr>
+        <p:spPr>
+          <a:xfrm flipH="1" flipV="1">
+            <a:off x="9618998" y="9032555"/>
+            <a:ext cx="1828385" cy="123111"/>
+          </a:xfrm>
+          <a:prstGeom prst="bentConnector4">
+            <a:avLst>
+              <a:gd name="adj1" fmla="val -12503"/>
+              <a:gd name="adj2" fmla="val 285686"/>
+            </a:avLst>
+          </a:prstGeom>
+          <a:ln>
+            <a:tailEnd type="triangle"/>
+          </a:ln>
+        </p:spPr>
+        <p:style>
+          <a:lnRef idx="1">
+            <a:schemeClr val="accent1"/>
+          </a:lnRef>
+          <a:fillRef idx="0">
+            <a:schemeClr val="accent1"/>
+          </a:fillRef>
+          <a:effectRef idx="0">
+            <a:schemeClr val="accent1"/>
+          </a:effectRef>
+          <a:fontRef idx="minor">
+            <a:schemeClr val="tx1"/>
+          </a:fontRef>
+        </p:style>
+      </p:cxnSp>
+      <p:sp>
+        <p:nvSpPr>
+          <p:cNvPr id="149" name="CuadroTexto 148">
+            <a:extLst>
+              <a:ext uri="{FF2B5EF4-FFF2-40B4-BE49-F238E27FC236}">
+                <a16:creationId xmlns:a16="http://schemas.microsoft.com/office/drawing/2014/main" id="{E80E2582-0F32-464A-8125-67FE19D6E683}"/>
+              </a:ext>
+            </a:extLst>
+          </p:cNvPr>
+          <p:cNvSpPr txBox="1"/>
+          <p:nvPr/>
+        </p:nvSpPr>
+        <p:spPr>
+          <a:xfrm>
+            <a:off x="10706300" y="8623368"/>
+            <a:ext cx="405880" cy="184666"/>
+          </a:xfrm>
+          <a:prstGeom prst="rect">
+            <a:avLst/>
+          </a:prstGeom>
+          <a:noFill/>
+        </p:spPr>
+        <p:txBody>
+          <a:bodyPr wrap="none" rtlCol="0">
+            <a:spAutoFit/>
+          </a:bodyPr>
+          <a:lstStyle/>
+          <a:p>
+            <a:r>
+              <a:rPr lang="es-ES_tradnl" sz="600" dirty="0" err="1"/>
+              <a:t>grouBy</a:t>
+            </a:r>
+            <a:endParaRPr lang="es-ES_tradnl" sz="600" dirty="0"/>
+          </a:p>
+        </p:txBody>
+      </p:sp>
+      <p:sp>
+        <p:nvSpPr>
+          <p:cNvPr id="151" name="CuadroTexto 150">
+            <a:extLst>
+              <a:ext uri="{FF2B5EF4-FFF2-40B4-BE49-F238E27FC236}">
+                <a16:creationId xmlns:a16="http://schemas.microsoft.com/office/drawing/2014/main" id="{ECE0FB15-09BB-194B-A79F-B21F3A6CE97E}"/>
+              </a:ext>
+            </a:extLst>
+          </p:cNvPr>
+          <p:cNvSpPr txBox="1"/>
+          <p:nvPr/>
+        </p:nvSpPr>
+        <p:spPr>
+          <a:xfrm>
+            <a:off x="12103390" y="9032555"/>
+            <a:ext cx="3217547" cy="246221"/>
+          </a:xfrm>
+          <a:prstGeom prst="rect">
+            <a:avLst/>
+          </a:prstGeom>
+          <a:noFill/>
+        </p:spPr>
+        <p:txBody>
+          <a:bodyPr wrap="none" rtlCol="0">
+            <a:spAutoFit/>
+          </a:bodyPr>
+          <a:lstStyle/>
+          <a:p>
+            <a:r>
+              <a:rPr lang="es-ES_tradnl" sz="1000" dirty="0" err="1"/>
+              <a:t>DynamicHavingExecutableSelectExpressionWithoutWhere</a:t>
+            </a:r>
+            <a:endParaRPr lang="es-ES_tradnl" sz="1000" dirty="0"/>
+          </a:p>
+        </p:txBody>
+      </p:sp>
+      <p:cxnSp>
+        <p:nvCxnSpPr>
+          <p:cNvPr id="153" name="Conector recto de flecha 152">
+            <a:extLst>
+              <a:ext uri="{FF2B5EF4-FFF2-40B4-BE49-F238E27FC236}">
+                <a16:creationId xmlns:a16="http://schemas.microsoft.com/office/drawing/2014/main" id="{4F52899A-C5BD-5140-9C8B-E9BB418F2453}"/>
+              </a:ext>
+            </a:extLst>
+          </p:cNvPr>
+          <p:cNvCxnSpPr>
+            <a:stCxn id="146" idx="3"/>
+            <a:endCxn id="151" idx="1"/>
+          </p:cNvCxnSpPr>
+          <p:nvPr/>
+        </p:nvCxnSpPr>
+        <p:spPr>
+          <a:xfrm>
+            <a:off x="11447383" y="9155666"/>
+            <a:ext cx="656007" cy="0"/>
+          </a:xfrm>
+          <a:prstGeom prst="straightConnector1">
+            <a:avLst/>
+          </a:prstGeom>
+          <a:ln>
+            <a:tailEnd type="triangle"/>
+          </a:ln>
+        </p:spPr>
+        <p:style>
+          <a:lnRef idx="1">
+            <a:schemeClr val="accent1"/>
+          </a:lnRef>
+          <a:fillRef idx="0">
+            <a:schemeClr val="accent1"/>
+          </a:fillRef>
+          <a:effectRef idx="0">
+            <a:schemeClr val="accent1"/>
+          </a:effectRef>
+          <a:fontRef idx="minor">
+            <a:schemeClr val="tx1"/>
+          </a:fontRef>
+        </p:style>
+      </p:cxnSp>
+      <p:sp>
+        <p:nvSpPr>
+          <p:cNvPr id="155" name="CuadroTexto 154">
+            <a:extLst>
+              <a:ext uri="{FF2B5EF4-FFF2-40B4-BE49-F238E27FC236}">
+                <a16:creationId xmlns:a16="http://schemas.microsoft.com/office/drawing/2014/main" id="{A9ED3E79-43B6-6A4E-81D7-D9BB0CD67AB6}"/>
+              </a:ext>
+            </a:extLst>
+          </p:cNvPr>
+          <p:cNvSpPr txBox="1"/>
+          <p:nvPr/>
+        </p:nvSpPr>
+        <p:spPr>
+          <a:xfrm>
+            <a:off x="11657434" y="8968815"/>
+            <a:ext cx="429926" cy="184666"/>
+          </a:xfrm>
+          <a:prstGeom prst="rect">
+            <a:avLst/>
+          </a:prstGeom>
+          <a:noFill/>
+        </p:spPr>
+        <p:txBody>
+          <a:bodyPr wrap="none" rtlCol="0">
+            <a:spAutoFit/>
+          </a:bodyPr>
+          <a:lstStyle/>
+          <a:p>
+            <a:r>
+              <a:rPr lang="es-ES_tradnl" sz="600" dirty="0"/>
+              <a:t>*</a:t>
+            </a:r>
+            <a:r>
+              <a:rPr lang="es-ES_tradnl" sz="600" dirty="0" err="1"/>
+              <a:t>having</a:t>
+            </a:r>
+            <a:endParaRPr lang="es-ES" sz="600" dirty="0"/>
+          </a:p>
+        </p:txBody>
+      </p:sp>
+      <p:cxnSp>
+        <p:nvCxnSpPr>
+          <p:cNvPr id="156" name="Conector recto de flecha 37">
+            <a:extLst>
+              <a:ext uri="{FF2B5EF4-FFF2-40B4-BE49-F238E27FC236}">
+                <a16:creationId xmlns:a16="http://schemas.microsoft.com/office/drawing/2014/main" id="{E2F3AC81-0581-B447-8896-45B89F1BA4CA}"/>
+              </a:ext>
+            </a:extLst>
+          </p:cNvPr>
+          <p:cNvCxnSpPr>
+            <a:stCxn id="151" idx="3"/>
+            <a:endCxn id="151" idx="2"/>
+          </p:cNvCxnSpPr>
+          <p:nvPr/>
+        </p:nvCxnSpPr>
+        <p:spPr>
+          <a:xfrm flipH="1">
+            <a:off x="13712164" y="9155666"/>
+            <a:ext cx="1608773" cy="123110"/>
+          </a:xfrm>
+          <a:prstGeom prst="bentConnector4">
+            <a:avLst>
+              <a:gd name="adj1" fmla="val -14210"/>
+              <a:gd name="adj2" fmla="val 285688"/>
+            </a:avLst>
+          </a:prstGeom>
+          <a:ln>
+            <a:tailEnd type="triangle"/>
+          </a:ln>
+        </p:spPr>
+        <p:style>
+          <a:lnRef idx="1">
+            <a:schemeClr val="accent1"/>
+          </a:lnRef>
+          <a:fillRef idx="0">
+            <a:schemeClr val="accent1"/>
+          </a:fillRef>
+          <a:effectRef idx="0">
+            <a:schemeClr val="accent1"/>
+          </a:effectRef>
+          <a:fontRef idx="minor">
+            <a:schemeClr val="tx1"/>
+          </a:fontRef>
+        </p:style>
+      </p:cxnSp>
+      <p:sp>
+        <p:nvSpPr>
+          <p:cNvPr id="157" name="CuadroTexto 156">
+            <a:extLst>
+              <a:ext uri="{FF2B5EF4-FFF2-40B4-BE49-F238E27FC236}">
+                <a16:creationId xmlns:a16="http://schemas.microsoft.com/office/drawing/2014/main" id="{C2477D8F-84FC-A14F-BDCC-276CEF89D10F}"/>
+              </a:ext>
+            </a:extLst>
+          </p:cNvPr>
+          <p:cNvSpPr txBox="1"/>
+          <p:nvPr/>
+        </p:nvSpPr>
+        <p:spPr>
+          <a:xfrm>
+            <a:off x="13891995" y="9345734"/>
+            <a:ext cx="404278" cy="184666"/>
+          </a:xfrm>
+          <a:prstGeom prst="rect">
+            <a:avLst/>
+          </a:prstGeom>
+          <a:noFill/>
+        </p:spPr>
+        <p:txBody>
+          <a:bodyPr wrap="none" rtlCol="0">
+            <a:spAutoFit/>
+          </a:bodyPr>
+          <a:lstStyle/>
+          <a:p>
+            <a:r>
+              <a:rPr lang="es-ES_tradnl" sz="600" dirty="0" err="1"/>
+              <a:t>and|or</a:t>
+            </a:r>
+            <a:endParaRPr lang="es-ES" sz="600" dirty="0"/>
+          </a:p>
+        </p:txBody>
+      </p:sp>
+      <p:sp>
+        <p:nvSpPr>
+          <p:cNvPr id="159" name="CuadroTexto 158">
+            <a:extLst>
+              <a:ext uri="{FF2B5EF4-FFF2-40B4-BE49-F238E27FC236}">
+                <a16:creationId xmlns:a16="http://schemas.microsoft.com/office/drawing/2014/main" id="{4F629735-9A8E-FE41-95EB-8D73FF63E095}"/>
+              </a:ext>
+            </a:extLst>
+          </p:cNvPr>
+          <p:cNvSpPr txBox="1"/>
+          <p:nvPr/>
+        </p:nvSpPr>
+        <p:spPr>
+          <a:xfrm>
+            <a:off x="9248022" y="7831766"/>
+            <a:ext cx="2909771" cy="246221"/>
+          </a:xfrm>
+          <a:prstGeom prst="rect">
+            <a:avLst/>
+          </a:prstGeom>
+          <a:noFill/>
+        </p:spPr>
+        <p:txBody>
+          <a:bodyPr wrap="none" rtlCol="0">
+            <a:spAutoFit/>
+          </a:bodyPr>
+          <a:lstStyle/>
+          <a:p>
+            <a:r>
+              <a:rPr lang="es-ES_tradnl" sz="1000" dirty="0"/>
+              <a:t>WhereableExecutableSelectExpressionWithGroupBy</a:t>
+            </a:r>
+          </a:p>
+        </p:txBody>
+      </p:sp>
+      <p:sp>
+        <p:nvSpPr>
+          <p:cNvPr id="160" name="CuadroTexto 159">
+            <a:extLst>
+              <a:ext uri="{FF2B5EF4-FFF2-40B4-BE49-F238E27FC236}">
+                <a16:creationId xmlns:a16="http://schemas.microsoft.com/office/drawing/2014/main" id="{3DA9CF23-4E5E-A144-932B-28A3BB892D51}"/>
+              </a:ext>
+            </a:extLst>
+          </p:cNvPr>
+          <p:cNvSpPr txBox="1"/>
+          <p:nvPr/>
+        </p:nvSpPr>
+        <p:spPr>
+          <a:xfrm>
+            <a:off x="13070490" y="7831766"/>
+            <a:ext cx="3139001" cy="246221"/>
+          </a:xfrm>
+          <a:prstGeom prst="rect">
+            <a:avLst/>
+          </a:prstGeom>
+          <a:noFill/>
+        </p:spPr>
+        <p:txBody>
+          <a:bodyPr wrap="none" rtlCol="0">
+            <a:spAutoFit/>
+          </a:bodyPr>
+          <a:lstStyle/>
+          <a:p>
+            <a:r>
+              <a:rPr lang="es-ES_tradnl" sz="1000" dirty="0" err="1"/>
+              <a:t>DynamicWhereExecutableSelectExpressionWithGroupBy</a:t>
+            </a:r>
+            <a:endParaRPr lang="es-ES_tradnl" sz="1000" dirty="0"/>
+          </a:p>
+        </p:txBody>
+      </p:sp>
+      <p:cxnSp>
+        <p:nvCxnSpPr>
+          <p:cNvPr id="161" name="Conector recto de flecha 160">
+            <a:extLst>
+              <a:ext uri="{FF2B5EF4-FFF2-40B4-BE49-F238E27FC236}">
+                <a16:creationId xmlns:a16="http://schemas.microsoft.com/office/drawing/2014/main" id="{8B205D2E-AF1C-8645-9262-22E254357806}"/>
+              </a:ext>
+            </a:extLst>
+          </p:cNvPr>
+          <p:cNvCxnSpPr>
+            <a:cxnSpLocks/>
+            <a:endCxn id="160" idx="1"/>
+          </p:cNvCxnSpPr>
+          <p:nvPr/>
+        </p:nvCxnSpPr>
+        <p:spPr>
+          <a:xfrm>
+            <a:off x="12190198" y="7954876"/>
+            <a:ext cx="880292" cy="1"/>
+          </a:xfrm>
+          <a:prstGeom prst="straightConnector1">
+            <a:avLst/>
+          </a:prstGeom>
+          <a:ln>
+            <a:tailEnd type="triangle"/>
+          </a:ln>
+        </p:spPr>
+        <p:style>
+          <a:lnRef idx="1">
+            <a:schemeClr val="accent1"/>
+          </a:lnRef>
+          <a:fillRef idx="0">
+            <a:schemeClr val="accent1"/>
+          </a:fillRef>
+          <a:effectRef idx="0">
+            <a:schemeClr val="accent1"/>
+          </a:effectRef>
+          <a:fontRef idx="minor">
+            <a:schemeClr val="tx1"/>
+          </a:fontRef>
+        </p:style>
+      </p:cxnSp>
+      <p:sp>
+        <p:nvSpPr>
+          <p:cNvPr id="162" name="CuadroTexto 161">
+            <a:extLst>
+              <a:ext uri="{FF2B5EF4-FFF2-40B4-BE49-F238E27FC236}">
+                <a16:creationId xmlns:a16="http://schemas.microsoft.com/office/drawing/2014/main" id="{A3D213D5-13D6-1648-BDD9-C3FAEF3E5DE1}"/>
+              </a:ext>
+            </a:extLst>
+          </p:cNvPr>
+          <p:cNvSpPr txBox="1"/>
+          <p:nvPr/>
+        </p:nvSpPr>
+        <p:spPr>
+          <a:xfrm>
+            <a:off x="14818452" y="8147586"/>
+            <a:ext cx="404278" cy="184666"/>
+          </a:xfrm>
+          <a:prstGeom prst="rect">
+            <a:avLst/>
+          </a:prstGeom>
+          <a:noFill/>
+        </p:spPr>
+        <p:txBody>
+          <a:bodyPr wrap="none" rtlCol="0">
+            <a:spAutoFit/>
+          </a:bodyPr>
+          <a:lstStyle/>
+          <a:p>
+            <a:r>
+              <a:rPr lang="es-ES_tradnl" sz="600" dirty="0" err="1"/>
+              <a:t>and|or</a:t>
+            </a:r>
+            <a:endParaRPr lang="es-ES" sz="600" dirty="0"/>
+          </a:p>
+        </p:txBody>
+      </p:sp>
+      <p:sp>
+        <p:nvSpPr>
+          <p:cNvPr id="164" name="CuadroTexto 163">
+            <a:extLst>
+              <a:ext uri="{FF2B5EF4-FFF2-40B4-BE49-F238E27FC236}">
+                <a16:creationId xmlns:a16="http://schemas.microsoft.com/office/drawing/2014/main" id="{6CE47456-B416-4042-B849-55791A9621DB}"/>
+              </a:ext>
+            </a:extLst>
+          </p:cNvPr>
+          <p:cNvSpPr txBox="1"/>
+          <p:nvPr/>
+        </p:nvSpPr>
+        <p:spPr>
+          <a:xfrm>
+            <a:off x="12366678" y="7792399"/>
+            <a:ext cx="421910" cy="184666"/>
+          </a:xfrm>
+          <a:prstGeom prst="rect">
+            <a:avLst/>
+          </a:prstGeom>
+          <a:noFill/>
+        </p:spPr>
+        <p:txBody>
+          <a:bodyPr wrap="none" rtlCol="0">
+            <a:spAutoFit/>
+          </a:bodyPr>
+          <a:lstStyle/>
+          <a:p>
+            <a:r>
+              <a:rPr lang="es-ES_tradnl" sz="600" dirty="0"/>
+              <a:t>*where</a:t>
+            </a:r>
+            <a:endParaRPr lang="es-ES" sz="600" dirty="0"/>
+          </a:p>
+        </p:txBody>
+      </p:sp>
+      <p:cxnSp>
+        <p:nvCxnSpPr>
+          <p:cNvPr id="166" name="Conector recto de flecha 194">
+            <a:extLst>
+              <a:ext uri="{FF2B5EF4-FFF2-40B4-BE49-F238E27FC236}">
+                <a16:creationId xmlns:a16="http://schemas.microsoft.com/office/drawing/2014/main" id="{C53716D0-6C23-514C-BA8C-FE3AAE29E102}"/>
+              </a:ext>
+            </a:extLst>
+          </p:cNvPr>
+          <p:cNvCxnSpPr>
+            <a:stCxn id="160" idx="3"/>
+            <a:endCxn id="160" idx="2"/>
+          </p:cNvCxnSpPr>
+          <p:nvPr/>
+        </p:nvCxnSpPr>
+        <p:spPr>
+          <a:xfrm flipH="1">
+            <a:off x="14639991" y="7954877"/>
+            <a:ext cx="1569500" cy="123110"/>
+          </a:xfrm>
+          <a:prstGeom prst="bentConnector4">
+            <a:avLst>
+              <a:gd name="adj1" fmla="val -14565"/>
+              <a:gd name="adj2" fmla="val 285688"/>
+            </a:avLst>
+          </a:prstGeom>
+          <a:ln>
+            <a:tailEnd type="triangle"/>
+          </a:ln>
+        </p:spPr>
+        <p:style>
+          <a:lnRef idx="1">
+            <a:schemeClr val="accent1"/>
+          </a:lnRef>
+          <a:fillRef idx="0">
+            <a:schemeClr val="accent1"/>
+          </a:fillRef>
+          <a:effectRef idx="0">
+            <a:schemeClr val="accent1"/>
+          </a:effectRef>
+          <a:fontRef idx="minor">
+            <a:schemeClr val="tx1"/>
+          </a:fontRef>
+        </p:style>
+      </p:cxnSp>
+      <p:cxnSp>
+        <p:nvCxnSpPr>
+          <p:cNvPr id="169" name="Conector recto de flecha 168">
+            <a:extLst>
+              <a:ext uri="{FF2B5EF4-FFF2-40B4-BE49-F238E27FC236}">
+                <a16:creationId xmlns:a16="http://schemas.microsoft.com/office/drawing/2014/main" id="{42726494-2612-A14E-8541-03BFBD701822}"/>
+              </a:ext>
+            </a:extLst>
+          </p:cNvPr>
+          <p:cNvCxnSpPr>
+            <a:cxnSpLocks/>
+            <a:stCxn id="159" idx="2"/>
+          </p:cNvCxnSpPr>
+          <p:nvPr/>
+        </p:nvCxnSpPr>
+        <p:spPr>
+          <a:xfrm flipH="1">
+            <a:off x="10574048" y="8077987"/>
+            <a:ext cx="128860" cy="1014122"/>
+          </a:xfrm>
+          <a:prstGeom prst="straightConnector1">
+            <a:avLst/>
+          </a:prstGeom>
+          <a:ln>
+            <a:tailEnd type="triangle"/>
+          </a:ln>
+        </p:spPr>
+        <p:style>
+          <a:lnRef idx="3">
+            <a:schemeClr val="accent2"/>
+          </a:lnRef>
+          <a:fillRef idx="0">
+            <a:schemeClr val="accent2"/>
+          </a:fillRef>
+          <a:effectRef idx="2">
+            <a:schemeClr val="accent2"/>
+          </a:effectRef>
+          <a:fontRef idx="minor">
+            <a:schemeClr val="tx1"/>
+          </a:fontRef>
+        </p:style>
+      </p:cxnSp>
+      <p:cxnSp>
+        <p:nvCxnSpPr>
+          <p:cNvPr id="170" name="Conector recto de flecha 169">
+            <a:extLst>
+              <a:ext uri="{FF2B5EF4-FFF2-40B4-BE49-F238E27FC236}">
+                <a16:creationId xmlns:a16="http://schemas.microsoft.com/office/drawing/2014/main" id="{66DAA61C-B820-1848-B85D-FEFC3D0B631D}"/>
+              </a:ext>
+            </a:extLst>
+          </p:cNvPr>
+          <p:cNvCxnSpPr>
+            <a:cxnSpLocks/>
+            <a:stCxn id="159" idx="2"/>
+            <a:endCxn id="151" idx="0"/>
+          </p:cNvCxnSpPr>
+          <p:nvPr/>
+        </p:nvCxnSpPr>
+        <p:spPr>
+          <a:xfrm>
+            <a:off x="10702908" y="8077987"/>
+            <a:ext cx="3009256" cy="954568"/>
+          </a:xfrm>
+          <a:prstGeom prst="straightConnector1">
+            <a:avLst/>
+          </a:prstGeom>
+          <a:ln>
+            <a:tailEnd type="triangle"/>
+          </a:ln>
+        </p:spPr>
+        <p:style>
+          <a:lnRef idx="3">
+            <a:schemeClr val="accent2"/>
+          </a:lnRef>
+          <a:fillRef idx="0">
+            <a:schemeClr val="accent2"/>
+          </a:fillRef>
+          <a:effectRef idx="2">
+            <a:schemeClr val="accent2"/>
+          </a:effectRef>
+          <a:fontRef idx="minor">
+            <a:schemeClr val="tx1"/>
+          </a:fontRef>
+        </p:style>
+      </p:cxnSp>
+      <p:cxnSp>
+        <p:nvCxnSpPr>
+          <p:cNvPr id="172" name="Conector recto de flecha 171">
+            <a:extLst>
+              <a:ext uri="{FF2B5EF4-FFF2-40B4-BE49-F238E27FC236}">
+                <a16:creationId xmlns:a16="http://schemas.microsoft.com/office/drawing/2014/main" id="{881ED28E-5D49-D449-9DE0-24E20F4AD064}"/>
+              </a:ext>
+            </a:extLst>
+          </p:cNvPr>
+          <p:cNvCxnSpPr>
+            <a:cxnSpLocks/>
+            <a:stCxn id="47" idx="2"/>
+          </p:cNvCxnSpPr>
+          <p:nvPr/>
+        </p:nvCxnSpPr>
+        <p:spPr>
+          <a:xfrm>
+            <a:off x="8719856" y="3028693"/>
+            <a:ext cx="2377522" cy="4842136"/>
+          </a:xfrm>
+          <a:prstGeom prst="straightConnector1">
+            <a:avLst/>
+          </a:prstGeom>
+          <a:ln>
+            <a:tailEnd type="triangle"/>
+          </a:ln>
+        </p:spPr>
+        <p:style>
+          <a:lnRef idx="3">
+            <a:schemeClr val="accent2"/>
+          </a:lnRef>
+          <a:fillRef idx="0">
+            <a:schemeClr val="accent2"/>
+          </a:fillRef>
+          <a:effectRef idx="2">
+            <a:schemeClr val="accent2"/>
+          </a:effectRef>
+          <a:fontRef idx="minor">
+            <a:schemeClr val="tx1"/>
+          </a:fontRef>
+        </p:style>
+      </p:cxnSp>
+      <p:cxnSp>
+        <p:nvCxnSpPr>
+          <p:cNvPr id="173" name="Conector recto de flecha 172">
+            <a:extLst>
+              <a:ext uri="{FF2B5EF4-FFF2-40B4-BE49-F238E27FC236}">
+                <a16:creationId xmlns:a16="http://schemas.microsoft.com/office/drawing/2014/main" id="{05840492-4293-F243-868A-A9704255FCCA}"/>
+              </a:ext>
+            </a:extLst>
+          </p:cNvPr>
+          <p:cNvCxnSpPr>
+            <a:cxnSpLocks/>
+            <a:stCxn id="47" idx="2"/>
+            <a:endCxn id="160" idx="0"/>
+          </p:cNvCxnSpPr>
+          <p:nvPr/>
+        </p:nvCxnSpPr>
+        <p:spPr>
+          <a:xfrm>
+            <a:off x="8719856" y="3028693"/>
+            <a:ext cx="5920135" cy="4803073"/>
+          </a:xfrm>
+          <a:prstGeom prst="straightConnector1">
+            <a:avLst/>
+          </a:prstGeom>
+          <a:ln>
+            <a:tailEnd type="triangle"/>
+          </a:ln>
+        </p:spPr>
+        <p:style>
+          <a:lnRef idx="3">
+            <a:schemeClr val="accent2"/>
+          </a:lnRef>
+          <a:fillRef idx="0">
+            <a:schemeClr val="accent2"/>
+          </a:fillRef>
+          <a:effectRef idx="2">
+            <a:schemeClr val="accent2"/>
+          </a:effectRef>
+          <a:fontRef idx="minor">
+            <a:schemeClr val="tx1"/>
+          </a:fontRef>
+        </p:style>
+      </p:cxnSp>
+      <p:sp>
+        <p:nvSpPr>
+          <p:cNvPr id="174" name="CuadroTexto 173">
+            <a:extLst>
+              <a:ext uri="{FF2B5EF4-FFF2-40B4-BE49-F238E27FC236}">
+                <a16:creationId xmlns:a16="http://schemas.microsoft.com/office/drawing/2014/main" id="{9EA9E9F1-A7BA-444B-9D3C-0E68CFDDE716}"/>
+              </a:ext>
+            </a:extLst>
+          </p:cNvPr>
+          <p:cNvSpPr txBox="1"/>
+          <p:nvPr/>
+        </p:nvSpPr>
+        <p:spPr>
+          <a:xfrm>
+            <a:off x="3685132" y="1516117"/>
+            <a:ext cx="2606804" cy="246221"/>
+          </a:xfrm>
+          <a:prstGeom prst="rect">
+            <a:avLst/>
+          </a:prstGeom>
+          <a:noFill/>
+        </p:spPr>
+        <p:txBody>
+          <a:bodyPr wrap="none" rtlCol="0">
+            <a:spAutoFit/>
+          </a:bodyPr>
+          <a:lstStyle/>
+          <a:p>
+            <a:r>
+              <a:rPr lang="es-ES_tradnl" sz="1000" dirty="0"/>
+              <a:t>DynamicWhereSelectExpressionWithoutSelect</a:t>
+            </a:r>
+          </a:p>
+        </p:txBody>
+      </p:sp>
+      <p:cxnSp>
+        <p:nvCxnSpPr>
+          <p:cNvPr id="176" name="Conector recto de flecha 175">
+            <a:extLst>
+              <a:ext uri="{FF2B5EF4-FFF2-40B4-BE49-F238E27FC236}">
+                <a16:creationId xmlns:a16="http://schemas.microsoft.com/office/drawing/2014/main" id="{18463A6A-55B2-2941-9921-0033251B5629}"/>
+              </a:ext>
+            </a:extLst>
+          </p:cNvPr>
+          <p:cNvCxnSpPr>
+            <a:cxnSpLocks/>
+          </p:cNvCxnSpPr>
+          <p:nvPr/>
+        </p:nvCxnSpPr>
+        <p:spPr>
+          <a:xfrm flipH="1" flipV="1">
+            <a:off x="6084143" y="1810757"/>
+            <a:ext cx="315557" cy="2013823"/>
+          </a:xfrm>
+          <a:prstGeom prst="straightConnector1">
+            <a:avLst/>
+          </a:prstGeom>
+          <a:ln>
+            <a:tailEnd type="triangle"/>
+          </a:ln>
+        </p:spPr>
+        <p:style>
+          <a:lnRef idx="1">
+            <a:schemeClr val="accent1"/>
+          </a:lnRef>
+          <a:fillRef idx="0">
+            <a:schemeClr val="accent1"/>
+          </a:fillRef>
+          <a:effectRef idx="0">
+            <a:schemeClr val="accent1"/>
+          </a:effectRef>
+          <a:fontRef idx="minor">
+            <a:schemeClr val="tx1"/>
+          </a:fontRef>
+        </p:style>
+      </p:cxnSp>
+      <p:sp>
+        <p:nvSpPr>
+          <p:cNvPr id="177" name="CuadroTexto 176">
+            <a:extLst>
+              <a:ext uri="{FF2B5EF4-FFF2-40B4-BE49-F238E27FC236}">
+                <a16:creationId xmlns:a16="http://schemas.microsoft.com/office/drawing/2014/main" id="{68E07FEA-14A6-D24D-A463-E354A0AD6A65}"/>
+              </a:ext>
+            </a:extLst>
+          </p:cNvPr>
+          <p:cNvSpPr txBox="1"/>
+          <p:nvPr/>
+        </p:nvSpPr>
+        <p:spPr>
+          <a:xfrm>
+            <a:off x="5644233" y="1081621"/>
+            <a:ext cx="404278" cy="184666"/>
+          </a:xfrm>
+          <a:prstGeom prst="rect">
+            <a:avLst/>
+          </a:prstGeom>
+          <a:noFill/>
+        </p:spPr>
+        <p:txBody>
+          <a:bodyPr wrap="none" rtlCol="0">
+            <a:spAutoFit/>
+          </a:bodyPr>
+          <a:lstStyle/>
+          <a:p>
+            <a:r>
+              <a:rPr lang="es-ES_tradnl" sz="600" dirty="0"/>
+              <a:t>and|or</a:t>
+            </a:r>
+            <a:endParaRPr lang="es-ES" sz="600" dirty="0"/>
+          </a:p>
+        </p:txBody>
+      </p:sp>
+      <p:sp>
+        <p:nvSpPr>
+          <p:cNvPr id="179" name="CuadroTexto 178">
+            <a:extLst>
+              <a:ext uri="{FF2B5EF4-FFF2-40B4-BE49-F238E27FC236}">
+                <a16:creationId xmlns:a16="http://schemas.microsoft.com/office/drawing/2014/main" id="{F0036B11-B361-F743-A2B4-C3032415AAAA}"/>
+              </a:ext>
+            </a:extLst>
+          </p:cNvPr>
+          <p:cNvSpPr txBox="1"/>
+          <p:nvPr/>
+        </p:nvSpPr>
+        <p:spPr>
+          <a:xfrm>
+            <a:off x="6344929" y="3462372"/>
+            <a:ext cx="421910" cy="184666"/>
+          </a:xfrm>
+          <a:prstGeom prst="rect">
+            <a:avLst/>
+          </a:prstGeom>
+          <a:noFill/>
+        </p:spPr>
+        <p:txBody>
+          <a:bodyPr wrap="none" rtlCol="0">
+            <a:spAutoFit/>
+          </a:bodyPr>
+          <a:lstStyle/>
+          <a:p>
+            <a:r>
+              <a:rPr lang="es-ES_tradnl" sz="600" dirty="0"/>
+              <a:t>*where</a:t>
+            </a:r>
+            <a:endParaRPr lang="es-ES" sz="600" dirty="0"/>
+          </a:p>
+        </p:txBody>
+      </p:sp>
+      <p:cxnSp>
+        <p:nvCxnSpPr>
+          <p:cNvPr id="182" name="Conector recto de flecha 194">
+            <a:extLst>
+              <a:ext uri="{FF2B5EF4-FFF2-40B4-BE49-F238E27FC236}">
+                <a16:creationId xmlns:a16="http://schemas.microsoft.com/office/drawing/2014/main" id="{AF65D9CB-0B6E-6346-A3A2-EB51AC7945C6}"/>
+              </a:ext>
+            </a:extLst>
+          </p:cNvPr>
+          <p:cNvCxnSpPr>
+            <a:cxnSpLocks/>
+            <a:stCxn id="174" idx="3"/>
+            <a:endCxn id="174" idx="0"/>
+          </p:cNvCxnSpPr>
+          <p:nvPr/>
+        </p:nvCxnSpPr>
+        <p:spPr>
+          <a:xfrm flipH="1" flipV="1">
+            <a:off x="4988534" y="1516117"/>
+            <a:ext cx="1303402" cy="123111"/>
+          </a:xfrm>
+          <a:prstGeom prst="bentConnector4">
+            <a:avLst>
+              <a:gd name="adj1" fmla="val -17539"/>
+              <a:gd name="adj2" fmla="val 285686"/>
+            </a:avLst>
+          </a:prstGeom>
+          <a:ln>
+            <a:tailEnd type="triangle"/>
+          </a:ln>
+        </p:spPr>
+        <p:style>
+          <a:lnRef idx="1">
+            <a:schemeClr val="accent1"/>
+          </a:lnRef>
+          <a:fillRef idx="0">
+            <a:schemeClr val="accent1"/>
+          </a:fillRef>
+          <a:effectRef idx="0">
+            <a:schemeClr val="accent1"/>
+          </a:effectRef>
+          <a:fontRef idx="minor">
+            <a:schemeClr val="tx1"/>
+          </a:fontRef>
+        </p:style>
+      </p:cxnSp>
+      <p:cxnSp>
+        <p:nvCxnSpPr>
+          <p:cNvPr id="183" name="Conector recto de flecha 182">
+            <a:extLst>
+              <a:ext uri="{FF2B5EF4-FFF2-40B4-BE49-F238E27FC236}">
+                <a16:creationId xmlns:a16="http://schemas.microsoft.com/office/drawing/2014/main" id="{E06343C5-CB8C-9045-8725-068ADBDE63E1}"/>
+              </a:ext>
+            </a:extLst>
+          </p:cNvPr>
+          <p:cNvCxnSpPr>
+            <a:cxnSpLocks/>
+          </p:cNvCxnSpPr>
+          <p:nvPr/>
+        </p:nvCxnSpPr>
+        <p:spPr>
+          <a:xfrm>
+            <a:off x="6315218" y="1771900"/>
+            <a:ext cx="2060952" cy="995504"/>
+          </a:xfrm>
+          <a:prstGeom prst="straightConnector1">
+            <a:avLst/>
+          </a:prstGeom>
+          <a:ln>
+            <a:tailEnd type="triangle"/>
+          </a:ln>
+        </p:spPr>
+        <p:style>
+          <a:lnRef idx="1">
+            <a:schemeClr val="accent1"/>
+          </a:lnRef>
+          <a:fillRef idx="0">
+            <a:schemeClr val="accent1"/>
+          </a:fillRef>
+          <a:effectRef idx="0">
+            <a:schemeClr val="accent1"/>
+          </a:effectRef>
+          <a:fontRef idx="minor">
+            <a:schemeClr val="tx1"/>
+          </a:fontRef>
+        </p:style>
+      </p:cxnSp>
+      <p:sp>
+        <p:nvSpPr>
+          <p:cNvPr id="187" name="CuadroTexto 186">
+            <a:extLst>
+              <a:ext uri="{FF2B5EF4-FFF2-40B4-BE49-F238E27FC236}">
+                <a16:creationId xmlns:a16="http://schemas.microsoft.com/office/drawing/2014/main" id="{18341F12-A6C5-8744-AB3D-A347AF6BAD4A}"/>
+              </a:ext>
+            </a:extLst>
+          </p:cNvPr>
+          <p:cNvSpPr txBox="1"/>
+          <p:nvPr/>
+        </p:nvSpPr>
+        <p:spPr>
+          <a:xfrm>
+            <a:off x="7587672" y="2259260"/>
+            <a:ext cx="405880" cy="184666"/>
+          </a:xfrm>
+          <a:prstGeom prst="rect">
+            <a:avLst/>
+          </a:prstGeom>
+          <a:noFill/>
+        </p:spPr>
+        <p:txBody>
+          <a:bodyPr wrap="none" rtlCol="0">
+            <a:spAutoFit/>
+          </a:bodyPr>
+          <a:lstStyle/>
+          <a:p>
+            <a:r>
+              <a:rPr lang="es-ES_tradnl" sz="600" dirty="0"/>
+              <a:t>select*</a:t>
+            </a:r>
+            <a:endParaRPr lang="es-ES" sz="600" dirty="0"/>
+          </a:p>
+        </p:txBody>
+      </p:sp>
+      <p:cxnSp>
+        <p:nvCxnSpPr>
+          <p:cNvPr id="190" name="Conector recto de flecha 189">
+            <a:extLst>
+              <a:ext uri="{FF2B5EF4-FFF2-40B4-BE49-F238E27FC236}">
+                <a16:creationId xmlns:a16="http://schemas.microsoft.com/office/drawing/2014/main" id="{1C0CC2B1-F944-E646-98E8-0FDD5D681736}"/>
+              </a:ext>
+            </a:extLst>
+          </p:cNvPr>
+          <p:cNvCxnSpPr>
+            <a:cxnSpLocks/>
+          </p:cNvCxnSpPr>
+          <p:nvPr/>
+        </p:nvCxnSpPr>
+        <p:spPr>
+          <a:xfrm flipH="1" flipV="1">
+            <a:off x="6192534" y="1800683"/>
+            <a:ext cx="1590924" cy="3117366"/>
+          </a:xfrm>
+          <a:prstGeom prst="straightConnector1">
+            <a:avLst/>
+          </a:prstGeom>
+          <a:ln>
+            <a:tailEnd type="triangle"/>
+          </a:ln>
+        </p:spPr>
+        <p:style>
+          <a:lnRef idx="1">
+            <a:schemeClr val="accent1"/>
+          </a:lnRef>
+          <a:fillRef idx="0">
+            <a:schemeClr val="accent1"/>
+          </a:fillRef>
+          <a:effectRef idx="0">
+            <a:schemeClr val="accent1"/>
+          </a:effectRef>
+          <a:fontRef idx="minor">
+            <a:schemeClr val="tx1"/>
+          </a:fontRef>
+        </p:style>
+      </p:cxnSp>
+      <p:sp>
+        <p:nvSpPr>
+          <p:cNvPr id="194" name="CuadroTexto 193">
+            <a:extLst>
+              <a:ext uri="{FF2B5EF4-FFF2-40B4-BE49-F238E27FC236}">
+                <a16:creationId xmlns:a16="http://schemas.microsoft.com/office/drawing/2014/main" id="{434F3D59-3FBE-244C-B8C5-3853BE6DEA7B}"/>
+              </a:ext>
+            </a:extLst>
+          </p:cNvPr>
+          <p:cNvSpPr txBox="1"/>
+          <p:nvPr/>
+        </p:nvSpPr>
+        <p:spPr>
+          <a:xfrm>
+            <a:off x="7208722" y="3786676"/>
+            <a:ext cx="421910" cy="184666"/>
+          </a:xfrm>
+          <a:prstGeom prst="rect">
+            <a:avLst/>
+          </a:prstGeom>
+          <a:noFill/>
+        </p:spPr>
+        <p:txBody>
+          <a:bodyPr wrap="none" rtlCol="0">
+            <a:spAutoFit/>
+          </a:bodyPr>
+          <a:lstStyle/>
+          <a:p>
+            <a:r>
+              <a:rPr lang="es-ES_tradnl" sz="600" dirty="0"/>
+              <a:t>*where</a:t>
             </a:r>
             <a:endParaRPr lang="es-ES" sz="600" dirty="0"/>
           </a:p>

</xml_diff>

<commit_message>
Add support to queries that uses orderBy, limit, offset inside of a compound operator (like union, intersect). With this change now it is possible to use a limit in the inner query, not only in the outer one with the compound operator.
</commit_message>
<xml_diff>
--- a/docs/select.pptx
+++ b/docs/select.pptx
@@ -3530,43 +3530,6 @@
       </p:sp>
       <p:sp>
         <p:nvSpPr>
-          <p:cNvPr id="47" name="CuadroTexto 46">
-            <a:extLst>
-              <a:ext uri="{FF2B5EF4-FFF2-40B4-BE49-F238E27FC236}">
-                <a16:creationId xmlns:a16="http://schemas.microsoft.com/office/drawing/2014/main" id="{209FB9EA-0D30-4329-8263-AB0F1EF40CCF}"/>
-              </a:ext>
-            </a:extLst>
-          </p:cNvPr>
-          <p:cNvSpPr txBox="1"/>
-          <p:nvPr/>
-        </p:nvSpPr>
-        <p:spPr>
-          <a:xfrm>
-            <a:off x="7508626" y="2782472"/>
-            <a:ext cx="2422459" cy="246221"/>
-          </a:xfrm>
-          <a:prstGeom prst="rect">
-            <a:avLst/>
-          </a:prstGeom>
-          <a:noFill/>
-        </p:spPr>
-        <p:txBody>
-          <a:bodyPr wrap="none" rtlCol="0">
-            <a:spAutoFit/>
-          </a:bodyPr>
-          <a:lstStyle/>
-          <a:p>
-            <a:pPr algn="ctr"/>
-            <a:r>
-              <a:rPr lang="es-ES_tradnl" sz="1000" dirty="0" err="1"/>
-              <a:t>CompoundableExecutableSelectExpression</a:t>
-            </a:r>
-            <a:endParaRPr lang="es-ES_tradnl" sz="1000" dirty="0"/>
-          </a:p>
-        </p:txBody>
-      </p:sp>
-      <p:sp>
-        <p:nvSpPr>
           <p:cNvPr id="49" name="CuadroTexto 48">
             <a:extLst>
               <a:ext uri="{FF2B5EF4-FFF2-40B4-BE49-F238E27FC236}">
@@ -3694,7 +3657,7 @@
         </p:nvSpPr>
         <p:spPr>
           <a:xfrm>
-            <a:off x="7951582" y="1267769"/>
+            <a:off x="8688182" y="3769669"/>
             <a:ext cx="473206" cy="184666"/>
           </a:xfrm>
           <a:prstGeom prst="rect">
@@ -3734,8 +3697,8 @@
         </p:nvSpPr>
         <p:spPr>
           <a:xfrm>
-            <a:off x="9444243" y="632572"/>
-            <a:ext cx="1609736" cy="246221"/>
+            <a:off x="9189084" y="619156"/>
+            <a:ext cx="1542410" cy="246221"/>
           </a:xfrm>
           <a:prstGeom prst="rect">
             <a:avLst/>
@@ -3750,7 +3713,7 @@
           <a:p>
             <a:r>
               <a:rPr lang="es-ES_tradnl" sz="1000" dirty="0" err="1"/>
-              <a:t>WithdableExecutableSelect</a:t>
+              <a:t>WithableExecutableSelect</a:t>
             </a:r>
             <a:endParaRPr lang="es-ES_tradnl" sz="1000" dirty="0"/>
           </a:p>
@@ -3861,7 +3824,7 @@
         </p:nvSpPr>
         <p:spPr>
           <a:xfrm>
-            <a:off x="10086712" y="1677572"/>
+            <a:off x="10823312" y="4179472"/>
             <a:ext cx="1944763" cy="246221"/>
           </a:xfrm>
           <a:prstGeom prst="rect">
@@ -3900,7 +3863,7 @@
         </p:nvCxnSpPr>
         <p:spPr>
           <a:xfrm>
-            <a:off x="9749945" y="1800683"/>
+            <a:off x="10486545" y="4302583"/>
             <a:ext cx="336767" cy="0"/>
           </a:xfrm>
           <a:prstGeom prst="straightConnector1">
@@ -3939,7 +3902,7 @@
         </p:nvSpPr>
         <p:spPr>
           <a:xfrm>
-            <a:off x="9745598" y="1626091"/>
+            <a:off x="10482198" y="4127991"/>
             <a:ext cx="324128" cy="184666"/>
           </a:xfrm>
           <a:prstGeom prst="rect">
@@ -3978,8 +3941,8 @@
         </p:nvCxnSpPr>
         <p:spPr>
           <a:xfrm flipH="1" flipV="1">
-            <a:off x="10647500" y="1412142"/>
-            <a:ext cx="411594" cy="265430"/>
+            <a:off x="10654928" y="3466961"/>
+            <a:ext cx="1140766" cy="712511"/>
           </a:xfrm>
           <a:prstGeom prst="straightConnector1">
             <a:avLst/>
@@ -4017,7 +3980,7 @@
         </p:nvSpPr>
         <p:spPr>
           <a:xfrm>
-            <a:off x="10783062" y="1391045"/>
+            <a:off x="11416443" y="3855356"/>
             <a:ext cx="367408" cy="184666"/>
           </a:xfrm>
           <a:prstGeom prst="rect">
@@ -4609,14 +4572,13 @@
           </p:cNvPr>
           <p:cNvCxnSpPr>
             <a:cxnSpLocks/>
-            <a:stCxn id="47" idx="2"/>
           </p:cNvCxnSpPr>
           <p:nvPr/>
         </p:nvCxnSpPr>
         <p:spPr>
           <a:xfrm flipH="1">
-            <a:off x="7840243" y="3028693"/>
-            <a:ext cx="879613" cy="3790036"/>
+            <a:off x="7840244" y="4510835"/>
+            <a:ext cx="1456332" cy="2307894"/>
           </a:xfrm>
           <a:prstGeom prst="straightConnector1">
             <a:avLst/>
@@ -4694,14 +4656,13 @@
           </p:cNvPr>
           <p:cNvCxnSpPr>
             <a:cxnSpLocks/>
-            <a:stCxn id="114" idx="2"/>
           </p:cNvCxnSpPr>
           <p:nvPr/>
         </p:nvCxnSpPr>
         <p:spPr>
-          <a:xfrm flipH="1">
-            <a:off x="9056626" y="1396956"/>
-            <a:ext cx="917797" cy="276599"/>
+          <a:xfrm>
+            <a:off x="10098463" y="3503004"/>
+            <a:ext cx="0" cy="747017"/>
           </a:xfrm>
           <a:prstGeom prst="straightConnector1">
             <a:avLst/>
@@ -4736,14 +4697,13 @@
           </p:cNvPr>
           <p:cNvCxnSpPr>
             <a:cxnSpLocks/>
-            <a:stCxn id="114" idx="2"/>
           </p:cNvCxnSpPr>
           <p:nvPr/>
         </p:nvCxnSpPr>
         <p:spPr>
           <a:xfrm>
-            <a:off x="9974423" y="1396956"/>
-            <a:ext cx="554984" cy="229135"/>
+            <a:off x="10259307" y="3492769"/>
+            <a:ext cx="995283" cy="709373"/>
           </a:xfrm>
           <a:prstGeom prst="straightConnector1">
             <a:avLst/>
@@ -5219,7 +5179,7 @@
         </p:nvSpPr>
         <p:spPr>
           <a:xfrm>
-            <a:off x="7004151" y="209255"/>
+            <a:off x="6838036" y="1734803"/>
             <a:ext cx="1765227" cy="246221"/>
           </a:xfrm>
           <a:prstGeom prst="rect">
@@ -5252,14 +5212,13 @@
           </p:cNvPr>
           <p:cNvCxnSpPr>
             <a:cxnSpLocks/>
-            <a:endCxn id="114" idx="1"/>
           </p:cNvCxnSpPr>
           <p:nvPr/>
         </p:nvCxnSpPr>
         <p:spPr>
           <a:xfrm>
-            <a:off x="8230236" y="509091"/>
-            <a:ext cx="859970" cy="764755"/>
+            <a:off x="8093955" y="2029880"/>
+            <a:ext cx="885112" cy="1177513"/>
           </a:xfrm>
           <a:prstGeom prst="straightConnector1">
             <a:avLst/>
@@ -5297,7 +5256,7 @@
         </p:nvSpPr>
         <p:spPr>
           <a:xfrm>
-            <a:off x="8573187" y="715331"/>
+            <a:off x="8416135" y="2362263"/>
             <a:ext cx="405880" cy="184666"/>
           </a:xfrm>
           <a:prstGeom prst="rect">
@@ -5335,7 +5294,7 @@
         </p:nvCxnSpPr>
         <p:spPr>
           <a:xfrm>
-            <a:off x="5810820" y="332365"/>
+            <a:off x="5644705" y="1857913"/>
             <a:ext cx="1193330" cy="1"/>
           </a:xfrm>
           <a:prstGeom prst="straightConnector1">
@@ -5374,7 +5333,7 @@
         </p:nvSpPr>
         <p:spPr>
           <a:xfrm>
-            <a:off x="5994362" y="140218"/>
+            <a:off x="5828247" y="1665766"/>
             <a:ext cx="790601" cy="184666"/>
           </a:xfrm>
           <a:prstGeom prst="rect">
@@ -5493,7 +5452,7 @@
         </p:nvCxnSpPr>
         <p:spPr>
           <a:xfrm rot="16200000" flipH="1" flipV="1">
-            <a:off x="8143255" y="1224082"/>
+            <a:off x="8879855" y="3725982"/>
             <a:ext cx="123111" cy="1030090"/>
           </a:xfrm>
           <a:prstGeom prst="bentConnector4">
@@ -5569,15 +5528,14 @@
           </p:cNvPr>
           <p:cNvCxnSpPr>
             <a:cxnSpLocks/>
-            <a:stCxn id="47" idx="2"/>
             <a:endCxn id="66" idx="0"/>
           </p:cNvCxnSpPr>
           <p:nvPr/>
         </p:nvCxnSpPr>
         <p:spPr>
-          <a:xfrm>
-            <a:off x="8719856" y="3028693"/>
-            <a:ext cx="36220" cy="2818677"/>
+          <a:xfrm flipH="1">
+            <a:off x="8756076" y="4520988"/>
+            <a:ext cx="577692" cy="1326382"/>
           </a:xfrm>
           <a:prstGeom prst="straightConnector1">
             <a:avLst/>
@@ -5727,14 +5685,13 @@
           </p:cNvPr>
           <p:cNvCxnSpPr>
             <a:cxnSpLocks/>
-            <a:stCxn id="47" idx="2"/>
           </p:cNvCxnSpPr>
           <p:nvPr/>
         </p:nvCxnSpPr>
         <p:spPr>
           <a:xfrm>
-            <a:off x="8719856" y="3028693"/>
-            <a:ext cx="2821459" cy="3292706"/>
+            <a:off x="9349004" y="4520988"/>
+            <a:ext cx="2192311" cy="1800411"/>
           </a:xfrm>
           <a:prstGeom prst="straightConnector1">
             <a:avLst/>
@@ -6050,15 +6007,14 @@
           </p:cNvPr>
           <p:cNvCxnSpPr>
             <a:cxnSpLocks/>
-            <a:stCxn id="47" idx="2"/>
             <a:endCxn id="92" idx="0"/>
           </p:cNvCxnSpPr>
           <p:nvPr/>
         </p:nvCxnSpPr>
         <p:spPr>
           <a:xfrm>
-            <a:off x="8719856" y="3028693"/>
-            <a:ext cx="6557882" cy="3292706"/>
+            <a:off x="9428392" y="4520988"/>
+            <a:ext cx="5849346" cy="1800411"/>
           </a:xfrm>
           <a:prstGeom prst="straightConnector1">
             <a:avLst/>
@@ -6366,14 +6322,13 @@
             </a:extLst>
           </p:cNvPr>
           <p:cNvCxnSpPr>
-            <a:stCxn id="103" idx="0"/>
-            <a:endCxn id="103" idx="1"/>
+            <a:cxnSpLocks/>
           </p:cNvCxnSpPr>
           <p:nvPr/>
         </p:nvCxnSpPr>
         <p:spPr>
           <a:xfrm rot="16200000" flipH="1" flipV="1">
-            <a:off x="5967108" y="4282273"/>
+            <a:off x="5903608" y="4269573"/>
             <a:ext cx="123111" cy="1366721"/>
           </a:xfrm>
           <a:prstGeom prst="bentConnector4">
@@ -6725,7 +6680,7 @@
         </p:nvSpPr>
         <p:spPr>
           <a:xfrm>
-            <a:off x="7667133" y="1677571"/>
+            <a:off x="8403733" y="4179471"/>
             <a:ext cx="2060179" cy="246221"/>
           </a:xfrm>
           <a:prstGeom prst="rect">
@@ -6748,26 +6703,62 @@
           </a:p>
         </p:txBody>
       </p:sp>
+      <p:sp>
+        <p:nvSpPr>
+          <p:cNvPr id="104" name="CuadroTexto 103">
+            <a:extLst>
+              <a:ext uri="{FF2B5EF4-FFF2-40B4-BE49-F238E27FC236}">
+                <a16:creationId xmlns:a16="http://schemas.microsoft.com/office/drawing/2014/main" id="{0B3C48E6-A6A5-A542-A189-AFF2B4F74D04}"/>
+              </a:ext>
+            </a:extLst>
+          </p:cNvPr>
+          <p:cNvSpPr txBox="1"/>
+          <p:nvPr/>
+        </p:nvSpPr>
+        <p:spPr>
+          <a:xfrm>
+            <a:off x="9459991" y="85876"/>
+            <a:ext cx="1067921" cy="246221"/>
+          </a:xfrm>
+          <a:prstGeom prst="rect">
+            <a:avLst/>
+          </a:prstGeom>
+          <a:noFill/>
+        </p:spPr>
+        <p:txBody>
+          <a:bodyPr wrap="none" rtlCol="0">
+            <a:spAutoFit/>
+          </a:bodyPr>
+          <a:lstStyle/>
+          <a:p>
+            <a:r>
+              <a:rPr lang="es-ES_tradnl" sz="1000" dirty="0" err="1"/>
+              <a:t>ExecutableSelect</a:t>
+            </a:r>
+            <a:endParaRPr lang="es-ES_tradnl" sz="1000" dirty="0"/>
+          </a:p>
+        </p:txBody>
+      </p:sp>
       <p:cxnSp>
         <p:nvCxnSpPr>
-          <p:cNvPr id="120" name="Conector recto de flecha 119">
-            <a:extLst>
-              <a:ext uri="{FF2B5EF4-FFF2-40B4-BE49-F238E27FC236}">
-                <a16:creationId xmlns:a16="http://schemas.microsoft.com/office/drawing/2014/main" id="{6B471271-808F-0E4C-890A-420E66C7BFFE}"/>
+          <p:cNvPr id="110" name="Conector recto de flecha 109">
+            <a:extLst>
+              <a:ext uri="{FF2B5EF4-FFF2-40B4-BE49-F238E27FC236}">
+                <a16:creationId xmlns:a16="http://schemas.microsoft.com/office/drawing/2014/main" id="{C751E935-F290-AF47-B34A-C493EE4CA8CA}"/>
               </a:ext>
             </a:extLst>
           </p:cNvPr>
           <p:cNvCxnSpPr>
             <a:cxnSpLocks/>
-            <a:stCxn id="119" idx="2"/>
-            <a:endCxn id="47" idx="0"/>
+            <a:stCxn id="104" idx="2"/>
+            <a:endCxn id="65" idx="0"/>
           </p:cNvCxnSpPr>
           <p:nvPr/>
         </p:nvCxnSpPr>
         <p:spPr>
-          <a:xfrm>
-            <a:off x="8697223" y="1923792"/>
-            <a:ext cx="22633" cy="858680"/>
+          <a:xfrm flipH="1">
+            <a:off x="9960289" y="332097"/>
+            <a:ext cx="33663" cy="287059"/>
           </a:xfrm>
           <a:prstGeom prst="straightConnector1">
             <a:avLst/>
@@ -6793,329 +6784,6 @@
       </p:cxnSp>
       <p:sp>
         <p:nvSpPr>
-          <p:cNvPr id="121" name="CuadroTexto 120">
-            <a:extLst>
-              <a:ext uri="{FF2B5EF4-FFF2-40B4-BE49-F238E27FC236}">
-                <a16:creationId xmlns:a16="http://schemas.microsoft.com/office/drawing/2014/main" id="{6ED72A3D-7756-E742-9806-80A313A52D1F}"/>
-              </a:ext>
-            </a:extLst>
-          </p:cNvPr>
-          <p:cNvSpPr txBox="1"/>
-          <p:nvPr/>
-        </p:nvSpPr>
-        <p:spPr>
-          <a:xfrm>
-            <a:off x="11254590" y="2767403"/>
-            <a:ext cx="2422459" cy="246221"/>
-          </a:xfrm>
-          <a:prstGeom prst="rect">
-            <a:avLst/>
-          </a:prstGeom>
-          <a:noFill/>
-        </p:spPr>
-        <p:txBody>
-          <a:bodyPr wrap="none" rtlCol="0">
-            <a:spAutoFit/>
-          </a:bodyPr>
-          <a:lstStyle/>
-          <a:p>
-            <a:pPr algn="ctr"/>
-            <a:r>
-              <a:rPr lang="es-ES_tradnl" sz="1000" dirty="0" err="1"/>
-              <a:t>CompoundedExecutableSelectExpression</a:t>
-            </a:r>
-            <a:endParaRPr lang="es-ES_tradnl" sz="1000" dirty="0"/>
-          </a:p>
-        </p:txBody>
-      </p:sp>
-      <p:cxnSp>
-        <p:nvCxnSpPr>
-          <p:cNvPr id="122" name="Conector recto de flecha 32">
-            <a:extLst>
-              <a:ext uri="{FF2B5EF4-FFF2-40B4-BE49-F238E27FC236}">
-                <a16:creationId xmlns:a16="http://schemas.microsoft.com/office/drawing/2014/main" id="{4B6D102A-A38D-EB42-A84A-1DE052435C50}"/>
-              </a:ext>
-            </a:extLst>
-          </p:cNvPr>
-          <p:cNvCxnSpPr>
-            <a:cxnSpLocks/>
-          </p:cNvCxnSpPr>
-          <p:nvPr/>
-        </p:nvCxnSpPr>
-        <p:spPr>
-          <a:xfrm flipH="1" flipV="1">
-            <a:off x="12149516" y="2776910"/>
-            <a:ext cx="1435650" cy="123111"/>
-          </a:xfrm>
-          <a:prstGeom prst="bentConnector4">
-            <a:avLst>
-              <a:gd name="adj1" fmla="val -15923"/>
-              <a:gd name="adj2" fmla="val 285686"/>
-            </a:avLst>
-          </a:prstGeom>
-          <a:ln>
-            <a:tailEnd type="triangle"/>
-          </a:ln>
-        </p:spPr>
-        <p:style>
-          <a:lnRef idx="1">
-            <a:schemeClr val="accent1"/>
-          </a:lnRef>
-          <a:fillRef idx="0">
-            <a:schemeClr val="accent1"/>
-          </a:fillRef>
-          <a:effectRef idx="0">
-            <a:schemeClr val="accent1"/>
-          </a:effectRef>
-          <a:fontRef idx="minor">
-            <a:schemeClr val="tx1"/>
-          </a:fontRef>
-        </p:style>
-      </p:cxnSp>
-      <p:cxnSp>
-        <p:nvCxnSpPr>
-          <p:cNvPr id="124" name="Conector recto de flecha 123">
-            <a:extLst>
-              <a:ext uri="{FF2B5EF4-FFF2-40B4-BE49-F238E27FC236}">
-                <a16:creationId xmlns:a16="http://schemas.microsoft.com/office/drawing/2014/main" id="{12AFE6F5-D9F2-1540-B61A-427F09B188AD}"/>
-              </a:ext>
-            </a:extLst>
-          </p:cNvPr>
-          <p:cNvCxnSpPr>
-            <a:cxnSpLocks/>
-            <a:stCxn id="119" idx="2"/>
-          </p:cNvCxnSpPr>
-          <p:nvPr/>
-        </p:nvCxnSpPr>
-        <p:spPr>
-          <a:xfrm>
-            <a:off x="8697223" y="1923792"/>
-            <a:ext cx="3024877" cy="795276"/>
-          </a:xfrm>
-          <a:prstGeom prst="straightConnector1">
-            <a:avLst/>
-          </a:prstGeom>
-          <a:ln>
-            <a:tailEnd type="triangle"/>
-          </a:ln>
-        </p:spPr>
-        <p:style>
-          <a:lnRef idx="3">
-            <a:schemeClr val="accent2"/>
-          </a:lnRef>
-          <a:fillRef idx="0">
-            <a:schemeClr val="accent2"/>
-          </a:fillRef>
-          <a:effectRef idx="2">
-            <a:schemeClr val="accent2"/>
-          </a:effectRef>
-          <a:fontRef idx="minor">
-            <a:schemeClr val="tx1"/>
-          </a:fontRef>
-        </p:style>
-      </p:cxnSp>
-      <p:cxnSp>
-        <p:nvCxnSpPr>
-          <p:cNvPr id="127" name="Conector recto de flecha 126">
-            <a:extLst>
-              <a:ext uri="{FF2B5EF4-FFF2-40B4-BE49-F238E27FC236}">
-                <a16:creationId xmlns:a16="http://schemas.microsoft.com/office/drawing/2014/main" id="{9F0CEA55-2FC6-0E41-BB0F-AFAD1B0BF305}"/>
-              </a:ext>
-            </a:extLst>
-          </p:cNvPr>
-          <p:cNvCxnSpPr>
-            <a:cxnSpLocks/>
-            <a:endCxn id="121" idx="1"/>
-          </p:cNvCxnSpPr>
-          <p:nvPr/>
-        </p:nvCxnSpPr>
-        <p:spPr>
-          <a:xfrm flipV="1">
-            <a:off x="9884114" y="2890514"/>
-            <a:ext cx="1370476" cy="9508"/>
-          </a:xfrm>
-          <a:prstGeom prst="straightConnector1">
-            <a:avLst/>
-          </a:prstGeom>
-          <a:ln>
-            <a:tailEnd type="triangle"/>
-          </a:ln>
-        </p:spPr>
-        <p:style>
-          <a:lnRef idx="1">
-            <a:schemeClr val="accent1"/>
-          </a:lnRef>
-          <a:fillRef idx="0">
-            <a:schemeClr val="accent1"/>
-          </a:fillRef>
-          <a:effectRef idx="0">
-            <a:schemeClr val="accent1"/>
-          </a:effectRef>
-          <a:fontRef idx="minor">
-            <a:schemeClr val="tx1"/>
-          </a:fontRef>
-        </p:style>
-      </p:cxnSp>
-      <p:sp>
-        <p:nvSpPr>
-          <p:cNvPr id="129" name="CuadroTexto 128">
-            <a:extLst>
-              <a:ext uri="{FF2B5EF4-FFF2-40B4-BE49-F238E27FC236}">
-                <a16:creationId xmlns:a16="http://schemas.microsoft.com/office/drawing/2014/main" id="{FFC1E540-BB97-1B42-88B6-143BA7B01343}"/>
-              </a:ext>
-            </a:extLst>
-          </p:cNvPr>
-          <p:cNvSpPr txBox="1"/>
-          <p:nvPr/>
-        </p:nvSpPr>
-        <p:spPr>
-          <a:xfrm>
-            <a:off x="10167902" y="2677658"/>
-            <a:ext cx="486030" cy="184666"/>
-          </a:xfrm>
-          <a:prstGeom prst="rect">
-            <a:avLst/>
-          </a:prstGeom>
-          <a:noFill/>
-        </p:spPr>
-        <p:txBody>
-          <a:bodyPr wrap="none" rtlCol="0">
-            <a:spAutoFit/>
-          </a:bodyPr>
-          <a:lstStyle/>
-          <a:p>
-            <a:r>
-              <a:rPr lang="es-ES_tradnl" sz="600" dirty="0" err="1"/>
-              <a:t>union</a:t>
-            </a:r>
-            <a:r>
-              <a:rPr lang="es-ES_tradnl" sz="600" dirty="0"/>
-              <a:t> | …</a:t>
-            </a:r>
-            <a:endParaRPr lang="es-ES" sz="600" dirty="0"/>
-          </a:p>
-        </p:txBody>
-      </p:sp>
-      <p:sp>
-        <p:nvSpPr>
-          <p:cNvPr id="130" name="CuadroTexto 129">
-            <a:extLst>
-              <a:ext uri="{FF2B5EF4-FFF2-40B4-BE49-F238E27FC236}">
-                <a16:creationId xmlns:a16="http://schemas.microsoft.com/office/drawing/2014/main" id="{FB52353A-2D19-9748-8BA2-17476E8BB852}"/>
-              </a:ext>
-            </a:extLst>
-          </p:cNvPr>
-          <p:cNvSpPr txBox="1"/>
-          <p:nvPr/>
-        </p:nvSpPr>
-        <p:spPr>
-          <a:xfrm>
-            <a:off x="12827475" y="2362394"/>
-            <a:ext cx="486030" cy="184666"/>
-          </a:xfrm>
-          <a:prstGeom prst="rect">
-            <a:avLst/>
-          </a:prstGeom>
-          <a:noFill/>
-        </p:spPr>
-        <p:txBody>
-          <a:bodyPr wrap="none" rtlCol="0">
-            <a:spAutoFit/>
-          </a:bodyPr>
-          <a:lstStyle/>
-          <a:p>
-            <a:r>
-              <a:rPr lang="es-ES_tradnl" sz="600" dirty="0" err="1"/>
-              <a:t>union</a:t>
-            </a:r>
-            <a:r>
-              <a:rPr lang="es-ES_tradnl" sz="600" dirty="0"/>
-              <a:t> | …</a:t>
-            </a:r>
-            <a:endParaRPr lang="es-ES" sz="600" dirty="0"/>
-          </a:p>
-        </p:txBody>
-      </p:sp>
-      <p:sp>
-        <p:nvSpPr>
-          <p:cNvPr id="104" name="CuadroTexto 103">
-            <a:extLst>
-              <a:ext uri="{FF2B5EF4-FFF2-40B4-BE49-F238E27FC236}">
-                <a16:creationId xmlns:a16="http://schemas.microsoft.com/office/drawing/2014/main" id="{0B3C48E6-A6A5-A542-A189-AFF2B4F74D04}"/>
-              </a:ext>
-            </a:extLst>
-          </p:cNvPr>
-          <p:cNvSpPr txBox="1"/>
-          <p:nvPr/>
-        </p:nvSpPr>
-        <p:spPr>
-          <a:xfrm>
-            <a:off x="9459991" y="85876"/>
-            <a:ext cx="1067921" cy="246221"/>
-          </a:xfrm>
-          <a:prstGeom prst="rect">
-            <a:avLst/>
-          </a:prstGeom>
-          <a:noFill/>
-        </p:spPr>
-        <p:txBody>
-          <a:bodyPr wrap="none" rtlCol="0">
-            <a:spAutoFit/>
-          </a:bodyPr>
-          <a:lstStyle/>
-          <a:p>
-            <a:r>
-              <a:rPr lang="es-ES_tradnl" sz="1000" dirty="0" err="1"/>
-              <a:t>ExecutableSelect</a:t>
-            </a:r>
-            <a:endParaRPr lang="es-ES_tradnl" sz="1000" dirty="0"/>
-          </a:p>
-        </p:txBody>
-      </p:sp>
-      <p:cxnSp>
-        <p:nvCxnSpPr>
-          <p:cNvPr id="110" name="Conector recto de flecha 109">
-            <a:extLst>
-              <a:ext uri="{FF2B5EF4-FFF2-40B4-BE49-F238E27FC236}">
-                <a16:creationId xmlns:a16="http://schemas.microsoft.com/office/drawing/2014/main" id="{C751E935-F290-AF47-B34A-C493EE4CA8CA}"/>
-              </a:ext>
-            </a:extLst>
-          </p:cNvPr>
-          <p:cNvCxnSpPr>
-            <a:cxnSpLocks/>
-            <a:stCxn id="104" idx="2"/>
-          </p:cNvCxnSpPr>
-          <p:nvPr/>
-        </p:nvCxnSpPr>
-        <p:spPr>
-          <a:xfrm>
-            <a:off x="9993952" y="332097"/>
-            <a:ext cx="92760" cy="316459"/>
-          </a:xfrm>
-          <a:prstGeom prst="straightConnector1">
-            <a:avLst/>
-          </a:prstGeom>
-          <a:ln>
-            <a:tailEnd type="triangle"/>
-          </a:ln>
-        </p:spPr>
-        <p:style>
-          <a:lnRef idx="3">
-            <a:schemeClr val="accent2"/>
-          </a:lnRef>
-          <a:fillRef idx="0">
-            <a:schemeClr val="accent2"/>
-          </a:fillRef>
-          <a:effectRef idx="2">
-            <a:schemeClr val="accent2"/>
-          </a:effectRef>
-          <a:fontRef idx="minor">
-            <a:schemeClr val="tx1"/>
-          </a:fontRef>
-        </p:style>
-      </p:cxnSp>
-      <p:sp>
-        <p:nvSpPr>
           <p:cNvPr id="111" name="Elipse 110">
             <a:extLst>
               <a:ext uri="{FF2B5EF4-FFF2-40B4-BE49-F238E27FC236}">
@@ -7128,7 +6796,7 @@
         </p:nvSpPr>
         <p:spPr>
           <a:xfrm>
-            <a:off x="12405433" y="645271"/>
+            <a:off x="12138733" y="645271"/>
             <a:ext cx="266700" cy="246221"/>
           </a:xfrm>
           <a:prstGeom prst="ellipse">
@@ -7180,7 +6848,7 @@
         </p:nvCxnSpPr>
         <p:spPr>
           <a:xfrm flipV="1">
-            <a:off x="11020163" y="768382"/>
+            <a:off x="10753463" y="768382"/>
             <a:ext cx="1385270" cy="1"/>
           </a:xfrm>
           <a:prstGeom prst="straightConnector1">
@@ -7219,7 +6887,7 @@
         </p:nvSpPr>
         <p:spPr>
           <a:xfrm>
-            <a:off x="11037406" y="593495"/>
+            <a:off x="10770706" y="593495"/>
             <a:ext cx="721672" cy="184666"/>
           </a:xfrm>
           <a:prstGeom prst="rect">
@@ -7243,10 +6911,10 @@
       </p:sp>
       <p:sp>
         <p:nvSpPr>
-          <p:cNvPr id="114" name="CuadroTexto 113">
-            <a:extLst>
-              <a:ext uri="{FF2B5EF4-FFF2-40B4-BE49-F238E27FC236}">
-                <a16:creationId xmlns:a16="http://schemas.microsoft.com/office/drawing/2014/main" id="{372AB421-DD83-E24B-8D1F-9DBF6E43C11A}"/>
+          <p:cNvPr id="136" name="CuadroTexto 135">
+            <a:extLst>
+              <a:ext uri="{FF2B5EF4-FFF2-40B4-BE49-F238E27FC236}">
+                <a16:creationId xmlns:a16="http://schemas.microsoft.com/office/drawing/2014/main" id="{88C09B90-45BE-9543-9009-FFF45F506AC2}"/>
               </a:ext>
             </a:extLst>
           </p:cNvPr>
@@ -7255,8 +6923,8 @@
         </p:nvSpPr>
         <p:spPr>
           <a:xfrm>
-            <a:off x="9090206" y="1150735"/>
-            <a:ext cx="1768433" cy="246221"/>
+            <a:off x="9934094" y="2539774"/>
+            <a:ext cx="2491388" cy="246221"/>
           </a:xfrm>
           <a:prstGeom prst="rect">
             <a:avLst/>
@@ -7269,369 +6937,12 @@
           </a:bodyPr>
           <a:lstStyle/>
           <a:p>
+            <a:pPr algn="ctr"/>
             <a:r>
               <a:rPr lang="es-ES_tradnl" sz="1000" dirty="0" err="1"/>
-              <a:t>CustomizableExecutableSelect</a:t>
+              <a:t>CompoundableExecutableSelectExpression</a:t>
             </a:r>
             <a:endParaRPr lang="es-ES_tradnl" sz="1000" dirty="0"/>
-          </a:p>
-        </p:txBody>
-      </p:sp>
-      <p:cxnSp>
-        <p:nvCxnSpPr>
-          <p:cNvPr id="132" name="Conector recto de flecha 131">
-            <a:extLst>
-              <a:ext uri="{FF2B5EF4-FFF2-40B4-BE49-F238E27FC236}">
-                <a16:creationId xmlns:a16="http://schemas.microsoft.com/office/drawing/2014/main" id="{2E1A19AF-80E4-E84D-99EC-86BF6201316A}"/>
-              </a:ext>
-            </a:extLst>
-          </p:cNvPr>
-          <p:cNvCxnSpPr>
-            <a:cxnSpLocks/>
-            <a:stCxn id="65" idx="2"/>
-            <a:endCxn id="114" idx="0"/>
-          </p:cNvCxnSpPr>
-          <p:nvPr/>
-        </p:nvCxnSpPr>
-        <p:spPr>
-          <a:xfrm flipH="1">
-            <a:off x="9974423" y="878793"/>
-            <a:ext cx="274688" cy="271942"/>
-          </a:xfrm>
-          <a:prstGeom prst="straightConnector1">
-            <a:avLst/>
-          </a:prstGeom>
-          <a:ln>
-            <a:tailEnd type="triangle"/>
-          </a:ln>
-        </p:spPr>
-        <p:style>
-          <a:lnRef idx="3">
-            <a:schemeClr val="accent2"/>
-          </a:lnRef>
-          <a:fillRef idx="0">
-            <a:schemeClr val="accent2"/>
-          </a:fillRef>
-          <a:effectRef idx="2">
-            <a:schemeClr val="accent2"/>
-          </a:effectRef>
-          <a:fontRef idx="minor">
-            <a:schemeClr val="tx1"/>
-          </a:fontRef>
-        </p:style>
-      </p:cxnSp>
-      <p:cxnSp>
-        <p:nvCxnSpPr>
-          <p:cNvPr id="133" name="Conector recto de flecha 132">
-            <a:extLst>
-              <a:ext uri="{FF2B5EF4-FFF2-40B4-BE49-F238E27FC236}">
-                <a16:creationId xmlns:a16="http://schemas.microsoft.com/office/drawing/2014/main" id="{101E8191-9F29-8F4B-9370-B1C5B98D4C27}"/>
-              </a:ext>
-            </a:extLst>
-          </p:cNvPr>
-          <p:cNvCxnSpPr>
-            <a:cxnSpLocks/>
-          </p:cNvCxnSpPr>
-          <p:nvPr/>
-        </p:nvCxnSpPr>
-        <p:spPr>
-          <a:xfrm flipV="1">
-            <a:off x="10595133" y="889314"/>
-            <a:ext cx="144398" cy="276607"/>
-          </a:xfrm>
-          <a:prstGeom prst="straightConnector1">
-            <a:avLst/>
-          </a:prstGeom>
-          <a:ln>
-            <a:tailEnd type="triangle"/>
-          </a:ln>
-        </p:spPr>
-        <p:style>
-          <a:lnRef idx="1">
-            <a:schemeClr val="accent1"/>
-          </a:lnRef>
-          <a:fillRef idx="0">
-            <a:schemeClr val="accent1"/>
-          </a:fillRef>
-          <a:effectRef idx="0">
-            <a:schemeClr val="accent1"/>
-          </a:effectRef>
-          <a:fontRef idx="minor">
-            <a:schemeClr val="tx1"/>
-          </a:fontRef>
-        </p:style>
-      </p:cxnSp>
-      <p:sp>
-        <p:nvSpPr>
-          <p:cNvPr id="134" name="CuadroTexto 133">
-            <a:extLst>
-              <a:ext uri="{FF2B5EF4-FFF2-40B4-BE49-F238E27FC236}">
-                <a16:creationId xmlns:a16="http://schemas.microsoft.com/office/drawing/2014/main" id="{C5F23C8C-0979-7344-B8D9-3A4FEB1DEE57}"/>
-              </a:ext>
-            </a:extLst>
-          </p:cNvPr>
-          <p:cNvSpPr txBox="1"/>
-          <p:nvPr/>
-        </p:nvSpPr>
-        <p:spPr>
-          <a:xfrm>
-            <a:off x="10641932" y="945193"/>
-            <a:ext cx="692818" cy="184666"/>
-          </a:xfrm>
-          <a:prstGeom prst="rect">
-            <a:avLst/>
-          </a:prstGeom>
-          <a:noFill/>
-        </p:spPr>
-        <p:txBody>
-          <a:bodyPr wrap="none" rtlCol="0">
-            <a:spAutoFit/>
-          </a:bodyPr>
-          <a:lstStyle/>
-          <a:p>
-            <a:r>
-              <a:rPr lang="es-ES" sz="600" dirty="0" err="1"/>
-              <a:t>customizeQuery</a:t>
-            </a:r>
-            <a:endParaRPr lang="es-ES" sz="600" dirty="0"/>
-          </a:p>
-        </p:txBody>
-      </p:sp>
-      <p:sp>
-        <p:nvSpPr>
-          <p:cNvPr id="136" name="CuadroTexto 135">
-            <a:extLst>
-              <a:ext uri="{FF2B5EF4-FFF2-40B4-BE49-F238E27FC236}">
-                <a16:creationId xmlns:a16="http://schemas.microsoft.com/office/drawing/2014/main" id="{88C09B90-45BE-9543-9009-FFF45F506AC2}"/>
-              </a:ext>
-            </a:extLst>
-          </p:cNvPr>
-          <p:cNvSpPr txBox="1"/>
-          <p:nvPr/>
-        </p:nvSpPr>
-        <p:spPr>
-          <a:xfrm>
-            <a:off x="9862530" y="3316457"/>
-            <a:ext cx="3033203" cy="246221"/>
-          </a:xfrm>
-          <a:prstGeom prst="rect">
-            <a:avLst/>
-          </a:prstGeom>
-          <a:noFill/>
-        </p:spPr>
-        <p:txBody>
-          <a:bodyPr wrap="none" rtlCol="0">
-            <a:spAutoFit/>
-          </a:bodyPr>
-          <a:lstStyle/>
-          <a:p>
-            <a:pPr algn="ctr"/>
-            <a:r>
-              <a:rPr lang="es-ES_tradnl" sz="1000" dirty="0" err="1"/>
-              <a:t>CustomizedCompoundableExecutableSelectExpression</a:t>
-            </a:r>
-            <a:endParaRPr lang="es-ES_tradnl" sz="1000" dirty="0"/>
-          </a:p>
-        </p:txBody>
-      </p:sp>
-      <p:cxnSp>
-        <p:nvCxnSpPr>
-          <p:cNvPr id="137" name="Conector recto de flecha 136">
-            <a:extLst>
-              <a:ext uri="{FF2B5EF4-FFF2-40B4-BE49-F238E27FC236}">
-                <a16:creationId xmlns:a16="http://schemas.microsoft.com/office/drawing/2014/main" id="{C55E0D6B-6D18-CB49-A8E5-62EF18CA2868}"/>
-              </a:ext>
-            </a:extLst>
-          </p:cNvPr>
-          <p:cNvCxnSpPr>
-            <a:cxnSpLocks/>
-          </p:cNvCxnSpPr>
-          <p:nvPr/>
-        </p:nvCxnSpPr>
-        <p:spPr>
-          <a:xfrm>
-            <a:off x="10497192" y="900498"/>
-            <a:ext cx="479540" cy="2415959"/>
-          </a:xfrm>
-          <a:prstGeom prst="straightConnector1">
-            <a:avLst/>
-          </a:prstGeom>
-          <a:ln>
-            <a:tailEnd type="triangle"/>
-          </a:ln>
-        </p:spPr>
-        <p:style>
-          <a:lnRef idx="3">
-            <a:schemeClr val="accent2"/>
-          </a:lnRef>
-          <a:fillRef idx="0">
-            <a:schemeClr val="accent2"/>
-          </a:fillRef>
-          <a:effectRef idx="2">
-            <a:schemeClr val="accent2"/>
-          </a:effectRef>
-          <a:fontRef idx="minor">
-            <a:schemeClr val="tx1"/>
-          </a:fontRef>
-        </p:style>
-      </p:cxnSp>
-      <p:cxnSp>
-        <p:nvCxnSpPr>
-          <p:cNvPr id="138" name="Conector recto de flecha 137">
-            <a:extLst>
-              <a:ext uri="{FF2B5EF4-FFF2-40B4-BE49-F238E27FC236}">
-                <a16:creationId xmlns:a16="http://schemas.microsoft.com/office/drawing/2014/main" id="{A69D6A43-D210-9946-B5CF-8E348F01D273}"/>
-              </a:ext>
-            </a:extLst>
-          </p:cNvPr>
-          <p:cNvCxnSpPr>
-            <a:cxnSpLocks/>
-            <a:endCxn id="121" idx="2"/>
-          </p:cNvCxnSpPr>
-          <p:nvPr/>
-        </p:nvCxnSpPr>
-        <p:spPr>
-          <a:xfrm flipV="1">
-            <a:off x="12465820" y="3013624"/>
-            <a:ext cx="0" cy="368350"/>
-          </a:xfrm>
-          <a:prstGeom prst="straightConnector1">
-            <a:avLst/>
-          </a:prstGeom>
-          <a:ln>
-            <a:tailEnd type="triangle"/>
-          </a:ln>
-        </p:spPr>
-        <p:style>
-          <a:lnRef idx="1">
-            <a:schemeClr val="accent1"/>
-          </a:lnRef>
-          <a:fillRef idx="0">
-            <a:schemeClr val="accent1"/>
-          </a:fillRef>
-          <a:effectRef idx="0">
-            <a:schemeClr val="accent1"/>
-          </a:effectRef>
-          <a:fontRef idx="minor">
-            <a:schemeClr val="tx1"/>
-          </a:fontRef>
-        </p:style>
-      </p:cxnSp>
-      <p:sp>
-        <p:nvSpPr>
-          <p:cNvPr id="140" name="CuadroTexto 139">
-            <a:extLst>
-              <a:ext uri="{FF2B5EF4-FFF2-40B4-BE49-F238E27FC236}">
-                <a16:creationId xmlns:a16="http://schemas.microsoft.com/office/drawing/2014/main" id="{50E00967-1BCA-E34F-B8C0-F224805D6559}"/>
-              </a:ext>
-            </a:extLst>
-          </p:cNvPr>
-          <p:cNvSpPr txBox="1"/>
-          <p:nvPr/>
-        </p:nvSpPr>
-        <p:spPr>
-          <a:xfrm>
-            <a:off x="12488454" y="3071017"/>
-            <a:ext cx="486030" cy="184666"/>
-          </a:xfrm>
-          <a:prstGeom prst="rect">
-            <a:avLst/>
-          </a:prstGeom>
-          <a:noFill/>
-        </p:spPr>
-        <p:txBody>
-          <a:bodyPr wrap="none" rtlCol="0">
-            <a:spAutoFit/>
-          </a:bodyPr>
-          <a:lstStyle/>
-          <a:p>
-            <a:r>
-              <a:rPr lang="es-ES_tradnl" sz="600" dirty="0" err="1"/>
-              <a:t>union</a:t>
-            </a:r>
-            <a:r>
-              <a:rPr lang="es-ES_tradnl" sz="600" dirty="0"/>
-              <a:t> | …</a:t>
-            </a:r>
-            <a:endParaRPr lang="es-ES" sz="600" dirty="0"/>
-          </a:p>
-        </p:txBody>
-      </p:sp>
-      <p:cxnSp>
-        <p:nvCxnSpPr>
-          <p:cNvPr id="142" name="Conector recto de flecha 141">
-            <a:extLst>
-              <a:ext uri="{FF2B5EF4-FFF2-40B4-BE49-F238E27FC236}">
-                <a16:creationId xmlns:a16="http://schemas.microsoft.com/office/drawing/2014/main" id="{2AE6ACAA-02F6-554C-A7D7-334B6FEB1BF8}"/>
-              </a:ext>
-            </a:extLst>
-          </p:cNvPr>
-          <p:cNvCxnSpPr>
-            <a:cxnSpLocks/>
-            <a:endCxn id="136" idx="1"/>
-          </p:cNvCxnSpPr>
-          <p:nvPr/>
-        </p:nvCxnSpPr>
-        <p:spPr>
-          <a:xfrm>
-            <a:off x="9250605" y="3031862"/>
-            <a:ext cx="611925" cy="407706"/>
-          </a:xfrm>
-          <a:prstGeom prst="straightConnector1">
-            <a:avLst/>
-          </a:prstGeom>
-          <a:ln>
-            <a:tailEnd type="triangle"/>
-          </a:ln>
-        </p:spPr>
-        <p:style>
-          <a:lnRef idx="1">
-            <a:schemeClr val="accent1"/>
-          </a:lnRef>
-          <a:fillRef idx="0">
-            <a:schemeClr val="accent1"/>
-          </a:fillRef>
-          <a:effectRef idx="0">
-            <a:schemeClr val="accent1"/>
-          </a:effectRef>
-          <a:fontRef idx="minor">
-            <a:schemeClr val="tx1"/>
-          </a:fontRef>
-        </p:style>
-      </p:cxnSp>
-      <p:sp>
-        <p:nvSpPr>
-          <p:cNvPr id="143" name="CuadroTexto 142">
-            <a:extLst>
-              <a:ext uri="{FF2B5EF4-FFF2-40B4-BE49-F238E27FC236}">
-                <a16:creationId xmlns:a16="http://schemas.microsoft.com/office/drawing/2014/main" id="{A3EF31AE-C37D-B746-86E1-4DA19529F98D}"/>
-              </a:ext>
-            </a:extLst>
-          </p:cNvPr>
-          <p:cNvSpPr txBox="1"/>
-          <p:nvPr/>
-        </p:nvSpPr>
-        <p:spPr>
-          <a:xfrm>
-            <a:off x="9484581" y="3053554"/>
-            <a:ext cx="692818" cy="184666"/>
-          </a:xfrm>
-          <a:prstGeom prst="rect">
-            <a:avLst/>
-          </a:prstGeom>
-          <a:noFill/>
-        </p:spPr>
-        <p:txBody>
-          <a:bodyPr wrap="none" rtlCol="0">
-            <a:spAutoFit/>
-          </a:bodyPr>
-          <a:lstStyle/>
-          <a:p>
-            <a:r>
-              <a:rPr lang="es-ES" sz="600" dirty="0" err="1"/>
-              <a:t>customizeQuery</a:t>
-            </a:r>
-            <a:endParaRPr lang="es-ES" sz="600" dirty="0"/>
           </a:p>
         </p:txBody>
       </p:sp>
@@ -8357,14 +7668,13 @@
           </p:cNvPr>
           <p:cNvCxnSpPr>
             <a:cxnSpLocks/>
-            <a:stCxn id="47" idx="2"/>
           </p:cNvCxnSpPr>
           <p:nvPr/>
         </p:nvCxnSpPr>
         <p:spPr>
           <a:xfrm>
-            <a:off x="8719856" y="3028693"/>
-            <a:ext cx="2377522" cy="4842136"/>
+            <a:off x="9334587" y="4510835"/>
+            <a:ext cx="1762791" cy="3359994"/>
           </a:xfrm>
           <a:prstGeom prst="straightConnector1">
             <a:avLst/>
@@ -8399,15 +7709,14 @@
           </p:cNvPr>
           <p:cNvCxnSpPr>
             <a:cxnSpLocks/>
-            <a:stCxn id="47" idx="2"/>
             <a:endCxn id="160" idx="0"/>
           </p:cNvCxnSpPr>
           <p:nvPr/>
         </p:nvCxnSpPr>
         <p:spPr>
           <a:xfrm>
-            <a:off x="8719856" y="3028693"/>
-            <a:ext cx="5920135" cy="4803073"/>
+            <a:off x="9369168" y="4523173"/>
+            <a:ext cx="5270823" cy="3308593"/>
           </a:xfrm>
           <a:prstGeom prst="straightConnector1">
             <a:avLst/>
@@ -8445,7 +7754,7 @@
         </p:nvSpPr>
         <p:spPr>
           <a:xfrm>
-            <a:off x="3685132" y="1516117"/>
+            <a:off x="4231232" y="2760717"/>
             <a:ext cx="2606804" cy="246221"/>
           </a:xfrm>
           <a:prstGeom prst="rect">
@@ -8477,13 +7786,14 @@
           </p:cNvPr>
           <p:cNvCxnSpPr>
             <a:cxnSpLocks/>
+            <a:endCxn id="174" idx="2"/>
           </p:cNvCxnSpPr>
           <p:nvPr/>
         </p:nvCxnSpPr>
         <p:spPr>
           <a:xfrm flipH="1" flipV="1">
-            <a:off x="6084143" y="1810757"/>
-            <a:ext cx="315557" cy="2013823"/>
+            <a:off x="5534634" y="3006938"/>
+            <a:ext cx="865068" cy="817644"/>
           </a:xfrm>
           <a:prstGeom prst="straightConnector1">
             <a:avLst/>
@@ -8521,7 +7831,7 @@
         </p:nvSpPr>
         <p:spPr>
           <a:xfrm>
-            <a:off x="5644233" y="1081621"/>
+            <a:off x="5644233" y="2250021"/>
             <a:ext cx="404278" cy="184666"/>
           </a:xfrm>
           <a:prstGeom prst="rect">
@@ -8557,7 +7867,7 @@
         </p:nvSpPr>
         <p:spPr>
           <a:xfrm>
-            <a:off x="6344929" y="3462372"/>
+            <a:off x="6062747" y="3386859"/>
             <a:ext cx="421910" cy="184666"/>
           </a:xfrm>
           <a:prstGeom prst="rect">
@@ -8597,7 +7907,7 @@
         </p:nvCxnSpPr>
         <p:spPr>
           <a:xfrm flipH="1" flipV="1">
-            <a:off x="4988534" y="1516117"/>
+            <a:off x="5534634" y="2760717"/>
             <a:ext cx="1303402" cy="123111"/>
           </a:xfrm>
           <a:prstGeom prst="bentConnector4">
@@ -8641,8 +7951,8 @@
         </p:nvCxnSpPr>
         <p:spPr>
           <a:xfrm>
-            <a:off x="6315218" y="1771900"/>
-            <a:ext cx="2060952" cy="995504"/>
+            <a:off x="6712023" y="2962342"/>
+            <a:ext cx="1976159" cy="1193601"/>
           </a:xfrm>
           <a:prstGeom prst="straightConnector1">
             <a:avLst/>
@@ -8680,7 +7990,7 @@
         </p:nvSpPr>
         <p:spPr>
           <a:xfrm>
-            <a:off x="7587672" y="2259260"/>
+            <a:off x="7031036" y="3022727"/>
             <a:ext cx="405880" cy="184666"/>
           </a:xfrm>
           <a:prstGeom prst="rect">
@@ -8718,8 +8028,8 @@
         </p:nvCxnSpPr>
         <p:spPr>
           <a:xfrm flipH="1" flipV="1">
-            <a:off x="6192534" y="1800683"/>
-            <a:ext cx="1590924" cy="3117366"/>
+            <a:off x="6645428" y="3006940"/>
+            <a:ext cx="1239903" cy="1932427"/>
           </a:xfrm>
           <a:prstGeom prst="straightConnector1">
             <a:avLst/>
@@ -8757,7 +8067,7 @@
         </p:nvSpPr>
         <p:spPr>
           <a:xfrm>
-            <a:off x="7208722" y="3786676"/>
+            <a:off x="7550687" y="4395452"/>
             <a:ext cx="421910" cy="184666"/>
           </a:xfrm>
           <a:prstGeom prst="rect">
@@ -8779,6 +8089,1003 @@
           </a:p>
         </p:txBody>
       </p:sp>
+      <p:sp>
+        <p:nvSpPr>
+          <p:cNvPr id="196" name="CuadroTexto 195">
+            <a:extLst>
+              <a:ext uri="{FF2B5EF4-FFF2-40B4-BE49-F238E27FC236}">
+                <a16:creationId xmlns:a16="http://schemas.microsoft.com/office/drawing/2014/main" id="{F537568D-29CA-2243-8AB8-4CE18F69554D}"/>
+              </a:ext>
+            </a:extLst>
+          </p:cNvPr>
+          <p:cNvSpPr txBox="1"/>
+          <p:nvPr/>
+        </p:nvSpPr>
+        <p:spPr>
+          <a:xfrm>
+            <a:off x="8010348" y="3189116"/>
+            <a:ext cx="3122971" cy="246221"/>
+          </a:xfrm>
+          <a:prstGeom prst="rect">
+            <a:avLst/>
+          </a:prstGeom>
+          <a:noFill/>
+        </p:spPr>
+        <p:txBody>
+          <a:bodyPr wrap="none" rtlCol="0">
+            <a:spAutoFit/>
+          </a:bodyPr>
+          <a:lstStyle/>
+          <a:p>
+            <a:pPr algn="ctr"/>
+            <a:r>
+              <a:rPr lang="es-ES_tradnl" sz="1000" dirty="0" err="1"/>
+              <a:t>CompoundableCustomizableExecutableSelectExpression</a:t>
+            </a:r>
+            <a:endParaRPr lang="es-ES_tradnl" sz="1000" dirty="0"/>
+          </a:p>
+        </p:txBody>
+      </p:sp>
+      <p:sp>
+        <p:nvSpPr>
+          <p:cNvPr id="197" name="CuadroTexto 196">
+            <a:extLst>
+              <a:ext uri="{FF2B5EF4-FFF2-40B4-BE49-F238E27FC236}">
+                <a16:creationId xmlns:a16="http://schemas.microsoft.com/office/drawing/2014/main" id="{3900FEF4-E054-6748-AADA-17CC1D4BB374}"/>
+              </a:ext>
+            </a:extLst>
+          </p:cNvPr>
+          <p:cNvSpPr txBox="1"/>
+          <p:nvPr/>
+        </p:nvSpPr>
+        <p:spPr>
+          <a:xfrm>
+            <a:off x="12892890" y="3212968"/>
+            <a:ext cx="2422459" cy="246221"/>
+          </a:xfrm>
+          <a:prstGeom prst="rect">
+            <a:avLst/>
+          </a:prstGeom>
+          <a:noFill/>
+        </p:spPr>
+        <p:txBody>
+          <a:bodyPr wrap="none" rtlCol="0">
+            <a:spAutoFit/>
+          </a:bodyPr>
+          <a:lstStyle/>
+          <a:p>
+            <a:pPr algn="ctr"/>
+            <a:r>
+              <a:rPr lang="es-ES_tradnl" sz="1000" dirty="0" err="1"/>
+              <a:t>CompoundedExecutableSelectExpression</a:t>
+            </a:r>
+            <a:endParaRPr lang="es-ES_tradnl" sz="1000" dirty="0"/>
+          </a:p>
+        </p:txBody>
+      </p:sp>
+      <p:cxnSp>
+        <p:nvCxnSpPr>
+          <p:cNvPr id="198" name="Conector recto de flecha 32">
+            <a:extLst>
+              <a:ext uri="{FF2B5EF4-FFF2-40B4-BE49-F238E27FC236}">
+                <a16:creationId xmlns:a16="http://schemas.microsoft.com/office/drawing/2014/main" id="{A2687C7F-1468-B243-A69A-A0042CD42053}"/>
+              </a:ext>
+            </a:extLst>
+          </p:cNvPr>
+          <p:cNvCxnSpPr>
+            <a:cxnSpLocks/>
+            <a:stCxn id="197" idx="3"/>
+            <a:endCxn id="197" idx="0"/>
+          </p:cNvCxnSpPr>
+          <p:nvPr/>
+        </p:nvCxnSpPr>
+        <p:spPr>
+          <a:xfrm flipH="1" flipV="1">
+            <a:off x="14104120" y="3212968"/>
+            <a:ext cx="1211229" cy="123111"/>
+          </a:xfrm>
+          <a:prstGeom prst="bentConnector4">
+            <a:avLst>
+              <a:gd name="adj1" fmla="val -18873"/>
+              <a:gd name="adj2" fmla="val 285686"/>
+            </a:avLst>
+          </a:prstGeom>
+          <a:ln>
+            <a:tailEnd type="triangle"/>
+          </a:ln>
+        </p:spPr>
+        <p:style>
+          <a:lnRef idx="1">
+            <a:schemeClr val="accent1"/>
+          </a:lnRef>
+          <a:fillRef idx="0">
+            <a:schemeClr val="accent1"/>
+          </a:fillRef>
+          <a:effectRef idx="0">
+            <a:schemeClr val="accent1"/>
+          </a:effectRef>
+          <a:fontRef idx="minor">
+            <a:schemeClr val="tx1"/>
+          </a:fontRef>
+        </p:style>
+      </p:cxnSp>
+      <p:cxnSp>
+        <p:nvCxnSpPr>
+          <p:cNvPr id="199" name="Conector recto de flecha 198">
+            <a:extLst>
+              <a:ext uri="{FF2B5EF4-FFF2-40B4-BE49-F238E27FC236}">
+                <a16:creationId xmlns:a16="http://schemas.microsoft.com/office/drawing/2014/main" id="{C0423E94-FEBA-9144-A2D9-79BAE955E36F}"/>
+              </a:ext>
+            </a:extLst>
+          </p:cNvPr>
+          <p:cNvCxnSpPr>
+            <a:cxnSpLocks/>
+            <a:endCxn id="197" idx="1"/>
+          </p:cNvCxnSpPr>
+          <p:nvPr/>
+        </p:nvCxnSpPr>
+        <p:spPr>
+          <a:xfrm>
+            <a:off x="11492378" y="2816640"/>
+            <a:ext cx="1400512" cy="519439"/>
+          </a:xfrm>
+          <a:prstGeom prst="straightConnector1">
+            <a:avLst/>
+          </a:prstGeom>
+          <a:ln>
+            <a:tailEnd type="triangle"/>
+          </a:ln>
+        </p:spPr>
+        <p:style>
+          <a:lnRef idx="1">
+            <a:schemeClr val="accent1"/>
+          </a:lnRef>
+          <a:fillRef idx="0">
+            <a:schemeClr val="accent1"/>
+          </a:fillRef>
+          <a:effectRef idx="0">
+            <a:schemeClr val="accent1"/>
+          </a:effectRef>
+          <a:fontRef idx="minor">
+            <a:schemeClr val="tx1"/>
+          </a:fontRef>
+        </p:style>
+      </p:cxnSp>
+      <p:sp>
+        <p:nvSpPr>
+          <p:cNvPr id="200" name="CuadroTexto 199">
+            <a:extLst>
+              <a:ext uri="{FF2B5EF4-FFF2-40B4-BE49-F238E27FC236}">
+                <a16:creationId xmlns:a16="http://schemas.microsoft.com/office/drawing/2014/main" id="{0BECF7C0-6ADE-B640-A8A3-412A68759586}"/>
+              </a:ext>
+            </a:extLst>
+          </p:cNvPr>
+          <p:cNvSpPr txBox="1"/>
+          <p:nvPr/>
+        </p:nvSpPr>
+        <p:spPr>
+          <a:xfrm>
+            <a:off x="12157793" y="2888931"/>
+            <a:ext cx="486030" cy="184666"/>
+          </a:xfrm>
+          <a:prstGeom prst="rect">
+            <a:avLst/>
+          </a:prstGeom>
+          <a:noFill/>
+        </p:spPr>
+        <p:txBody>
+          <a:bodyPr wrap="none" rtlCol="0">
+            <a:spAutoFit/>
+          </a:bodyPr>
+          <a:lstStyle/>
+          <a:p>
+            <a:r>
+              <a:rPr lang="es-ES_tradnl" sz="600" dirty="0" err="1"/>
+              <a:t>union</a:t>
+            </a:r>
+            <a:r>
+              <a:rPr lang="es-ES_tradnl" sz="600" dirty="0"/>
+              <a:t> | …</a:t>
+            </a:r>
+            <a:endParaRPr lang="es-ES" sz="600" dirty="0"/>
+          </a:p>
+        </p:txBody>
+      </p:sp>
+      <p:sp>
+        <p:nvSpPr>
+          <p:cNvPr id="202" name="CuadroTexto 201">
+            <a:extLst>
+              <a:ext uri="{FF2B5EF4-FFF2-40B4-BE49-F238E27FC236}">
+                <a16:creationId xmlns:a16="http://schemas.microsoft.com/office/drawing/2014/main" id="{76A5AC4F-0D80-1547-87AF-6648D5A71A25}"/>
+              </a:ext>
+            </a:extLst>
+          </p:cNvPr>
+          <p:cNvSpPr txBox="1"/>
+          <p:nvPr/>
+        </p:nvSpPr>
+        <p:spPr>
+          <a:xfrm>
+            <a:off x="14465775" y="2807959"/>
+            <a:ext cx="486030" cy="184666"/>
+          </a:xfrm>
+          <a:prstGeom prst="rect">
+            <a:avLst/>
+          </a:prstGeom>
+          <a:noFill/>
+        </p:spPr>
+        <p:txBody>
+          <a:bodyPr wrap="none" rtlCol="0">
+            <a:spAutoFit/>
+          </a:bodyPr>
+          <a:lstStyle/>
+          <a:p>
+            <a:r>
+              <a:rPr lang="es-ES_tradnl" sz="600" dirty="0" err="1"/>
+              <a:t>union</a:t>
+            </a:r>
+            <a:r>
+              <a:rPr lang="es-ES_tradnl" sz="600" dirty="0"/>
+              <a:t> | …</a:t>
+            </a:r>
+            <a:endParaRPr lang="es-ES" sz="600" dirty="0"/>
+          </a:p>
+        </p:txBody>
+      </p:sp>
+      <p:sp>
+        <p:nvSpPr>
+          <p:cNvPr id="203" name="CuadroTexto 202">
+            <a:extLst>
+              <a:ext uri="{FF2B5EF4-FFF2-40B4-BE49-F238E27FC236}">
+                <a16:creationId xmlns:a16="http://schemas.microsoft.com/office/drawing/2014/main" id="{4CE51476-EED5-8E44-A3DB-4F82B78145E9}"/>
+              </a:ext>
+            </a:extLst>
+          </p:cNvPr>
+          <p:cNvSpPr txBox="1"/>
+          <p:nvPr/>
+        </p:nvSpPr>
+        <p:spPr>
+          <a:xfrm>
+            <a:off x="11491195" y="1648085"/>
+            <a:ext cx="473206" cy="184666"/>
+          </a:xfrm>
+          <a:prstGeom prst="rect">
+            <a:avLst/>
+          </a:prstGeom>
+          <a:noFill/>
+        </p:spPr>
+        <p:txBody>
+          <a:bodyPr wrap="none" rtlCol="0">
+            <a:spAutoFit/>
+          </a:bodyPr>
+          <a:lstStyle/>
+          <a:p>
+            <a:r>
+              <a:rPr lang="es-ES_tradnl" sz="600" dirty="0" err="1"/>
+              <a:t>orderBy</a:t>
+            </a:r>
+            <a:r>
+              <a:rPr lang="es-ES_tradnl" sz="600" dirty="0"/>
+              <a:t>*</a:t>
+            </a:r>
+            <a:endParaRPr lang="es-ES" sz="600" dirty="0"/>
+          </a:p>
+        </p:txBody>
+      </p:sp>
+      <p:sp>
+        <p:nvSpPr>
+          <p:cNvPr id="204" name="CuadroTexto 203">
+            <a:extLst>
+              <a:ext uri="{FF2B5EF4-FFF2-40B4-BE49-F238E27FC236}">
+                <a16:creationId xmlns:a16="http://schemas.microsoft.com/office/drawing/2014/main" id="{F9ABFB57-6512-7940-9EF1-F6753B67001A}"/>
+              </a:ext>
+            </a:extLst>
+          </p:cNvPr>
+          <p:cNvSpPr txBox="1"/>
+          <p:nvPr/>
+        </p:nvSpPr>
+        <p:spPr>
+          <a:xfrm>
+            <a:off x="14280706" y="2071207"/>
+            <a:ext cx="2651688" cy="246221"/>
+          </a:xfrm>
+          <a:prstGeom prst="rect">
+            <a:avLst/>
+          </a:prstGeom>
+          <a:noFill/>
+        </p:spPr>
+        <p:txBody>
+          <a:bodyPr wrap="none" rtlCol="0">
+            <a:spAutoFit/>
+          </a:bodyPr>
+          <a:lstStyle/>
+          <a:p>
+            <a:r>
+              <a:rPr lang="es-ES_tradnl" sz="1000" dirty="0" err="1"/>
+              <a:t>CompoundedOffsetExecutableSelectExpression</a:t>
+            </a:r>
+            <a:endParaRPr lang="es-ES_tradnl" sz="1000" dirty="0"/>
+          </a:p>
+        </p:txBody>
+      </p:sp>
+      <p:cxnSp>
+        <p:nvCxnSpPr>
+          <p:cNvPr id="205" name="Conector recto de flecha 204">
+            <a:extLst>
+              <a:ext uri="{FF2B5EF4-FFF2-40B4-BE49-F238E27FC236}">
+                <a16:creationId xmlns:a16="http://schemas.microsoft.com/office/drawing/2014/main" id="{6D83E2E7-6414-8044-8BD5-806A47E4A964}"/>
+              </a:ext>
+            </a:extLst>
+          </p:cNvPr>
+          <p:cNvCxnSpPr>
+            <a:cxnSpLocks/>
+            <a:endCxn id="204" idx="1"/>
+          </p:cNvCxnSpPr>
+          <p:nvPr/>
+        </p:nvCxnSpPr>
+        <p:spPr>
+          <a:xfrm>
+            <a:off x="13943939" y="2194318"/>
+            <a:ext cx="336767" cy="0"/>
+          </a:xfrm>
+          <a:prstGeom prst="straightConnector1">
+            <a:avLst/>
+          </a:prstGeom>
+          <a:ln>
+            <a:tailEnd type="triangle"/>
+          </a:ln>
+        </p:spPr>
+        <p:style>
+          <a:lnRef idx="1">
+            <a:schemeClr val="accent1"/>
+          </a:lnRef>
+          <a:fillRef idx="0">
+            <a:schemeClr val="accent1"/>
+          </a:fillRef>
+          <a:effectRef idx="0">
+            <a:schemeClr val="accent1"/>
+          </a:effectRef>
+          <a:fontRef idx="minor">
+            <a:schemeClr val="tx1"/>
+          </a:fontRef>
+        </p:style>
+      </p:cxnSp>
+      <p:sp>
+        <p:nvSpPr>
+          <p:cNvPr id="206" name="CuadroTexto 205">
+            <a:extLst>
+              <a:ext uri="{FF2B5EF4-FFF2-40B4-BE49-F238E27FC236}">
+                <a16:creationId xmlns:a16="http://schemas.microsoft.com/office/drawing/2014/main" id="{FA3933F0-95E7-CC48-AE1D-6E3036A3375D}"/>
+              </a:ext>
+            </a:extLst>
+          </p:cNvPr>
+          <p:cNvSpPr txBox="1"/>
+          <p:nvPr/>
+        </p:nvSpPr>
+        <p:spPr>
+          <a:xfrm>
+            <a:off x="13939592" y="2019726"/>
+            <a:ext cx="324128" cy="184666"/>
+          </a:xfrm>
+          <a:prstGeom prst="rect">
+            <a:avLst/>
+          </a:prstGeom>
+          <a:noFill/>
+        </p:spPr>
+        <p:txBody>
+          <a:bodyPr wrap="none" rtlCol="0">
+            <a:spAutoFit/>
+          </a:bodyPr>
+          <a:lstStyle/>
+          <a:p>
+            <a:r>
+              <a:rPr lang="es-ES_tradnl" sz="600" dirty="0" err="1"/>
+              <a:t>limit</a:t>
+            </a:r>
+            <a:endParaRPr lang="es-ES" sz="600" dirty="0"/>
+          </a:p>
+        </p:txBody>
+      </p:sp>
+      <p:cxnSp>
+        <p:nvCxnSpPr>
+          <p:cNvPr id="207" name="Conector recto de flecha 206">
+            <a:extLst>
+              <a:ext uri="{FF2B5EF4-FFF2-40B4-BE49-F238E27FC236}">
+                <a16:creationId xmlns:a16="http://schemas.microsoft.com/office/drawing/2014/main" id="{5C5B6FB1-ED8B-B344-A53E-918564D13161}"/>
+              </a:ext>
+            </a:extLst>
+          </p:cNvPr>
+          <p:cNvCxnSpPr>
+            <a:cxnSpLocks/>
+            <a:stCxn id="204" idx="0"/>
+          </p:cNvCxnSpPr>
+          <p:nvPr/>
+        </p:nvCxnSpPr>
+        <p:spPr>
+          <a:xfrm flipH="1" flipV="1">
+            <a:off x="14841494" y="1805777"/>
+            <a:ext cx="765056" cy="265430"/>
+          </a:xfrm>
+          <a:prstGeom prst="straightConnector1">
+            <a:avLst/>
+          </a:prstGeom>
+          <a:ln>
+            <a:tailEnd type="triangle"/>
+          </a:ln>
+        </p:spPr>
+        <p:style>
+          <a:lnRef idx="1">
+            <a:schemeClr val="accent1"/>
+          </a:lnRef>
+          <a:fillRef idx="0">
+            <a:schemeClr val="accent1"/>
+          </a:fillRef>
+          <a:effectRef idx="0">
+            <a:schemeClr val="accent1"/>
+          </a:effectRef>
+          <a:fontRef idx="minor">
+            <a:schemeClr val="tx1"/>
+          </a:fontRef>
+        </p:style>
+      </p:cxnSp>
+      <p:sp>
+        <p:nvSpPr>
+          <p:cNvPr id="208" name="CuadroTexto 207">
+            <a:extLst>
+              <a:ext uri="{FF2B5EF4-FFF2-40B4-BE49-F238E27FC236}">
+                <a16:creationId xmlns:a16="http://schemas.microsoft.com/office/drawing/2014/main" id="{E9A9C022-ABBC-1947-A226-AB79CBEC2A87}"/>
+              </a:ext>
+            </a:extLst>
+          </p:cNvPr>
+          <p:cNvSpPr txBox="1"/>
+          <p:nvPr/>
+        </p:nvSpPr>
+        <p:spPr>
+          <a:xfrm>
+            <a:off x="15222730" y="1797380"/>
+            <a:ext cx="367408" cy="184666"/>
+          </a:xfrm>
+          <a:prstGeom prst="rect">
+            <a:avLst/>
+          </a:prstGeom>
+          <a:noFill/>
+        </p:spPr>
+        <p:txBody>
+          <a:bodyPr wrap="none" rtlCol="0">
+            <a:spAutoFit/>
+          </a:bodyPr>
+          <a:lstStyle/>
+          <a:p>
+            <a:r>
+              <a:rPr lang="es-ES_tradnl" sz="600" dirty="0"/>
+              <a:t>offset</a:t>
+            </a:r>
+            <a:endParaRPr lang="es-ES" sz="600" dirty="0"/>
+          </a:p>
+        </p:txBody>
+      </p:sp>
+      <p:cxnSp>
+        <p:nvCxnSpPr>
+          <p:cNvPr id="209" name="Conector recto de flecha 208">
+            <a:extLst>
+              <a:ext uri="{FF2B5EF4-FFF2-40B4-BE49-F238E27FC236}">
+                <a16:creationId xmlns:a16="http://schemas.microsoft.com/office/drawing/2014/main" id="{D8B8B76A-5A4A-2940-BC43-2E7B3B1B7442}"/>
+              </a:ext>
+            </a:extLst>
+          </p:cNvPr>
+          <p:cNvCxnSpPr>
+            <a:cxnSpLocks/>
+            <a:stCxn id="213" idx="2"/>
+          </p:cNvCxnSpPr>
+          <p:nvPr/>
+        </p:nvCxnSpPr>
+        <p:spPr>
+          <a:xfrm flipH="1">
+            <a:off x="13250621" y="1790591"/>
+            <a:ext cx="1271258" cy="276599"/>
+          </a:xfrm>
+          <a:prstGeom prst="straightConnector1">
+            <a:avLst/>
+          </a:prstGeom>
+          <a:ln>
+            <a:tailEnd type="triangle"/>
+          </a:ln>
+        </p:spPr>
+        <p:style>
+          <a:lnRef idx="3">
+            <a:schemeClr val="accent2"/>
+          </a:lnRef>
+          <a:fillRef idx="0">
+            <a:schemeClr val="accent2"/>
+          </a:fillRef>
+          <a:effectRef idx="2">
+            <a:schemeClr val="accent2"/>
+          </a:effectRef>
+          <a:fontRef idx="minor">
+            <a:schemeClr val="tx1"/>
+          </a:fontRef>
+        </p:style>
+      </p:cxnSp>
+      <p:cxnSp>
+        <p:nvCxnSpPr>
+          <p:cNvPr id="210" name="Conector recto de flecha 209">
+            <a:extLst>
+              <a:ext uri="{FF2B5EF4-FFF2-40B4-BE49-F238E27FC236}">
+                <a16:creationId xmlns:a16="http://schemas.microsoft.com/office/drawing/2014/main" id="{B2444877-618B-1747-8EEA-75CF720C6F0D}"/>
+              </a:ext>
+            </a:extLst>
+          </p:cNvPr>
+          <p:cNvCxnSpPr>
+            <a:cxnSpLocks/>
+            <a:stCxn id="213" idx="2"/>
+          </p:cNvCxnSpPr>
+          <p:nvPr/>
+        </p:nvCxnSpPr>
+        <p:spPr>
+          <a:xfrm>
+            <a:off x="14521879" y="1790591"/>
+            <a:ext cx="201522" cy="229135"/>
+          </a:xfrm>
+          <a:prstGeom prst="straightConnector1">
+            <a:avLst/>
+          </a:prstGeom>
+          <a:ln>
+            <a:tailEnd type="triangle"/>
+          </a:ln>
+        </p:spPr>
+        <p:style>
+          <a:lnRef idx="3">
+            <a:schemeClr val="accent2"/>
+          </a:lnRef>
+          <a:fillRef idx="0">
+            <a:schemeClr val="accent2"/>
+          </a:fillRef>
+          <a:effectRef idx="2">
+            <a:schemeClr val="accent2"/>
+          </a:effectRef>
+          <a:fontRef idx="minor">
+            <a:schemeClr val="tx1"/>
+          </a:fontRef>
+        </p:style>
+      </p:cxnSp>
+      <p:cxnSp>
+        <p:nvCxnSpPr>
+          <p:cNvPr id="211" name="Conector recto de flecha 200">
+            <a:extLst>
+              <a:ext uri="{FF2B5EF4-FFF2-40B4-BE49-F238E27FC236}">
+                <a16:creationId xmlns:a16="http://schemas.microsoft.com/office/drawing/2014/main" id="{9A1F79AE-D9C6-AD42-9A81-0997FCA4EEFA}"/>
+              </a:ext>
+            </a:extLst>
+          </p:cNvPr>
+          <p:cNvCxnSpPr>
+            <a:cxnSpLocks/>
+          </p:cNvCxnSpPr>
+          <p:nvPr/>
+        </p:nvCxnSpPr>
+        <p:spPr>
+          <a:xfrm rot="16200000" flipH="1" flipV="1">
+            <a:off x="11691243" y="1594246"/>
+            <a:ext cx="123111" cy="1030090"/>
+          </a:xfrm>
+          <a:prstGeom prst="bentConnector4">
+            <a:avLst>
+              <a:gd name="adj1" fmla="val -185686"/>
+              <a:gd name="adj2" fmla="val 130822"/>
+            </a:avLst>
+          </a:prstGeom>
+          <a:ln>
+            <a:tailEnd type="triangle"/>
+          </a:ln>
+        </p:spPr>
+        <p:style>
+          <a:lnRef idx="1">
+            <a:schemeClr val="accent1"/>
+          </a:lnRef>
+          <a:fillRef idx="0">
+            <a:schemeClr val="accent1"/>
+          </a:fillRef>
+          <a:effectRef idx="0">
+            <a:schemeClr val="accent1"/>
+          </a:effectRef>
+          <a:fontRef idx="minor">
+            <a:schemeClr val="tx1"/>
+          </a:fontRef>
+        </p:style>
+      </p:cxnSp>
+      <p:sp>
+        <p:nvSpPr>
+          <p:cNvPr id="212" name="CuadroTexto 211">
+            <a:extLst>
+              <a:ext uri="{FF2B5EF4-FFF2-40B4-BE49-F238E27FC236}">
+                <a16:creationId xmlns:a16="http://schemas.microsoft.com/office/drawing/2014/main" id="{524A86E8-3D8C-1947-AAD0-B5B0189DD51A}"/>
+              </a:ext>
+            </a:extLst>
+          </p:cNvPr>
+          <p:cNvSpPr txBox="1"/>
+          <p:nvPr/>
+        </p:nvSpPr>
+        <p:spPr>
+          <a:xfrm>
+            <a:off x="11215565" y="2039807"/>
+            <a:ext cx="2767104" cy="246221"/>
+          </a:xfrm>
+          <a:prstGeom prst="rect">
+            <a:avLst/>
+          </a:prstGeom>
+          <a:noFill/>
+        </p:spPr>
+        <p:txBody>
+          <a:bodyPr wrap="none" rtlCol="0">
+            <a:spAutoFit/>
+          </a:bodyPr>
+          <a:lstStyle/>
+          <a:p>
+            <a:pPr algn="ctr"/>
+            <a:r>
+              <a:rPr lang="es-ES_tradnl" sz="1000" dirty="0" err="1"/>
+              <a:t>CompoundedOrderByExecutableSelectExpression</a:t>
+            </a:r>
+            <a:endParaRPr lang="es-ES_tradnl" sz="1000" dirty="0"/>
+          </a:p>
+        </p:txBody>
+      </p:sp>
+      <p:sp>
+        <p:nvSpPr>
+          <p:cNvPr id="213" name="CuadroTexto 212">
+            <a:extLst>
+              <a:ext uri="{FF2B5EF4-FFF2-40B4-BE49-F238E27FC236}">
+                <a16:creationId xmlns:a16="http://schemas.microsoft.com/office/drawing/2014/main" id="{169FCBB5-8DE5-D942-9FC5-5AB6B225FDEF}"/>
+              </a:ext>
+            </a:extLst>
+          </p:cNvPr>
+          <p:cNvSpPr txBox="1"/>
+          <p:nvPr/>
+        </p:nvSpPr>
+        <p:spPr>
+          <a:xfrm>
+            <a:off x="13284200" y="1544370"/>
+            <a:ext cx="2475358" cy="246221"/>
+          </a:xfrm>
+          <a:prstGeom prst="rect">
+            <a:avLst/>
+          </a:prstGeom>
+          <a:noFill/>
+        </p:spPr>
+        <p:txBody>
+          <a:bodyPr wrap="none" rtlCol="0">
+            <a:spAutoFit/>
+          </a:bodyPr>
+          <a:lstStyle/>
+          <a:p>
+            <a:r>
+              <a:rPr lang="es-ES_tradnl" sz="1000" dirty="0" err="1"/>
+              <a:t>CompoundedCustomizableExecutableSelect</a:t>
+            </a:r>
+            <a:endParaRPr lang="es-ES_tradnl" sz="1000" dirty="0"/>
+          </a:p>
+        </p:txBody>
+      </p:sp>
+      <p:cxnSp>
+        <p:nvCxnSpPr>
+          <p:cNvPr id="214" name="Conector recto de flecha 213">
+            <a:extLst>
+              <a:ext uri="{FF2B5EF4-FFF2-40B4-BE49-F238E27FC236}">
+                <a16:creationId xmlns:a16="http://schemas.microsoft.com/office/drawing/2014/main" id="{FD3D4D5C-8181-054F-B65B-76B5D72E3DB6}"/>
+              </a:ext>
+            </a:extLst>
+          </p:cNvPr>
+          <p:cNvCxnSpPr>
+            <a:cxnSpLocks/>
+            <a:stCxn id="65" idx="2"/>
+          </p:cNvCxnSpPr>
+          <p:nvPr/>
+        </p:nvCxnSpPr>
+        <p:spPr>
+          <a:xfrm>
+            <a:off x="9960289" y="865377"/>
+            <a:ext cx="3250985" cy="667756"/>
+          </a:xfrm>
+          <a:prstGeom prst="straightConnector1">
+            <a:avLst/>
+          </a:prstGeom>
+          <a:ln>
+            <a:tailEnd type="triangle"/>
+          </a:ln>
+        </p:spPr>
+        <p:style>
+          <a:lnRef idx="3">
+            <a:schemeClr val="accent2"/>
+          </a:lnRef>
+          <a:fillRef idx="0">
+            <a:schemeClr val="accent2"/>
+          </a:fillRef>
+          <a:effectRef idx="2">
+            <a:schemeClr val="accent2"/>
+          </a:effectRef>
+          <a:fontRef idx="minor">
+            <a:schemeClr val="tx1"/>
+          </a:fontRef>
+        </p:style>
+      </p:cxnSp>
+      <p:cxnSp>
+        <p:nvCxnSpPr>
+          <p:cNvPr id="215" name="Conector recto de flecha 214">
+            <a:extLst>
+              <a:ext uri="{FF2B5EF4-FFF2-40B4-BE49-F238E27FC236}">
+                <a16:creationId xmlns:a16="http://schemas.microsoft.com/office/drawing/2014/main" id="{BFDA4F4C-F3E8-974F-9F39-5139A273FB75}"/>
+              </a:ext>
+            </a:extLst>
+          </p:cNvPr>
+          <p:cNvCxnSpPr>
+            <a:cxnSpLocks/>
+          </p:cNvCxnSpPr>
+          <p:nvPr/>
+        </p:nvCxnSpPr>
+        <p:spPr>
+          <a:xfrm flipH="1" flipV="1">
+            <a:off x="10702908" y="853525"/>
+            <a:ext cx="4086219" cy="706032"/>
+          </a:xfrm>
+          <a:prstGeom prst="straightConnector1">
+            <a:avLst/>
+          </a:prstGeom>
+          <a:ln>
+            <a:tailEnd type="triangle"/>
+          </a:ln>
+        </p:spPr>
+        <p:style>
+          <a:lnRef idx="1">
+            <a:schemeClr val="accent1"/>
+          </a:lnRef>
+          <a:fillRef idx="0">
+            <a:schemeClr val="accent1"/>
+          </a:fillRef>
+          <a:effectRef idx="0">
+            <a:schemeClr val="accent1"/>
+          </a:effectRef>
+          <a:fontRef idx="minor">
+            <a:schemeClr val="tx1"/>
+          </a:fontRef>
+        </p:style>
+      </p:cxnSp>
+      <p:sp>
+        <p:nvSpPr>
+          <p:cNvPr id="216" name="CuadroTexto 215">
+            <a:extLst>
+              <a:ext uri="{FF2B5EF4-FFF2-40B4-BE49-F238E27FC236}">
+                <a16:creationId xmlns:a16="http://schemas.microsoft.com/office/drawing/2014/main" id="{482B169B-8B5E-DB4A-AEC3-F804031BA87C}"/>
+              </a:ext>
+            </a:extLst>
+          </p:cNvPr>
+          <p:cNvSpPr txBox="1"/>
+          <p:nvPr/>
+        </p:nvSpPr>
+        <p:spPr>
+          <a:xfrm>
+            <a:off x="14125634" y="1237646"/>
+            <a:ext cx="692818" cy="184666"/>
+          </a:xfrm>
+          <a:prstGeom prst="rect">
+            <a:avLst/>
+          </a:prstGeom>
+          <a:noFill/>
+        </p:spPr>
+        <p:txBody>
+          <a:bodyPr wrap="none" rtlCol="0">
+            <a:spAutoFit/>
+          </a:bodyPr>
+          <a:lstStyle/>
+          <a:p>
+            <a:r>
+              <a:rPr lang="es-ES" sz="600" dirty="0" err="1"/>
+              <a:t>customizeQuery</a:t>
+            </a:r>
+            <a:endParaRPr lang="es-ES" sz="600" dirty="0"/>
+          </a:p>
+        </p:txBody>
+      </p:sp>
+      <p:cxnSp>
+        <p:nvCxnSpPr>
+          <p:cNvPr id="217" name="Conector recto de flecha 216">
+            <a:extLst>
+              <a:ext uri="{FF2B5EF4-FFF2-40B4-BE49-F238E27FC236}">
+                <a16:creationId xmlns:a16="http://schemas.microsoft.com/office/drawing/2014/main" id="{D5F6C0C3-1BE5-6545-9907-194AC0E81E2C}"/>
+              </a:ext>
+            </a:extLst>
+          </p:cNvPr>
+          <p:cNvCxnSpPr>
+            <a:cxnSpLocks/>
+            <a:stCxn id="212" idx="2"/>
+          </p:cNvCxnSpPr>
+          <p:nvPr/>
+        </p:nvCxnSpPr>
+        <p:spPr>
+          <a:xfrm>
+            <a:off x="12599117" y="2286028"/>
+            <a:ext cx="685083" cy="940263"/>
+          </a:xfrm>
+          <a:prstGeom prst="straightConnector1">
+            <a:avLst/>
+          </a:prstGeom>
+          <a:ln>
+            <a:tailEnd type="triangle"/>
+          </a:ln>
+        </p:spPr>
+        <p:style>
+          <a:lnRef idx="3">
+            <a:schemeClr val="accent2"/>
+          </a:lnRef>
+          <a:fillRef idx="0">
+            <a:schemeClr val="accent2"/>
+          </a:fillRef>
+          <a:effectRef idx="2">
+            <a:schemeClr val="accent2"/>
+          </a:effectRef>
+          <a:fontRef idx="minor">
+            <a:schemeClr val="tx1"/>
+          </a:fontRef>
+        </p:style>
+      </p:cxnSp>
+      <p:cxnSp>
+        <p:nvCxnSpPr>
+          <p:cNvPr id="218" name="Conector recto de flecha 217">
+            <a:extLst>
+              <a:ext uri="{FF2B5EF4-FFF2-40B4-BE49-F238E27FC236}">
+                <a16:creationId xmlns:a16="http://schemas.microsoft.com/office/drawing/2014/main" id="{0A960757-80F3-2D41-A33C-3B22C48A0D7B}"/>
+              </a:ext>
+            </a:extLst>
+          </p:cNvPr>
+          <p:cNvCxnSpPr>
+            <a:cxnSpLocks/>
+            <a:endCxn id="196" idx="0"/>
+          </p:cNvCxnSpPr>
+          <p:nvPr/>
+        </p:nvCxnSpPr>
+        <p:spPr>
+          <a:xfrm flipH="1">
+            <a:off x="9571834" y="2785995"/>
+            <a:ext cx="523588" cy="403121"/>
+          </a:xfrm>
+          <a:prstGeom prst="straightConnector1">
+            <a:avLst/>
+          </a:prstGeom>
+          <a:ln>
+            <a:tailEnd type="triangle"/>
+          </a:ln>
+        </p:spPr>
+        <p:style>
+          <a:lnRef idx="3">
+            <a:schemeClr val="accent2"/>
+          </a:lnRef>
+          <a:fillRef idx="0">
+            <a:schemeClr val="accent2"/>
+          </a:fillRef>
+          <a:effectRef idx="2">
+            <a:schemeClr val="accent2"/>
+          </a:effectRef>
+          <a:fontRef idx="minor">
+            <a:schemeClr val="tx1"/>
+          </a:fontRef>
+        </p:style>
+      </p:cxnSp>
+      <p:sp>
+        <p:nvSpPr>
+          <p:cNvPr id="236" name="CuadroTexto 235">
+            <a:extLst>
+              <a:ext uri="{FF2B5EF4-FFF2-40B4-BE49-F238E27FC236}">
+                <a16:creationId xmlns:a16="http://schemas.microsoft.com/office/drawing/2014/main" id="{2FEDB046-64A8-C249-B664-8AC8153C14DA}"/>
+              </a:ext>
+            </a:extLst>
+          </p:cNvPr>
+          <p:cNvSpPr txBox="1"/>
+          <p:nvPr/>
+        </p:nvSpPr>
+        <p:spPr>
+          <a:xfrm>
+            <a:off x="10025015" y="2914605"/>
+            <a:ext cx="692818" cy="184666"/>
+          </a:xfrm>
+          <a:prstGeom prst="rect">
+            <a:avLst/>
+          </a:prstGeom>
+          <a:noFill/>
+        </p:spPr>
+        <p:txBody>
+          <a:bodyPr wrap="none" rtlCol="0">
+            <a:spAutoFit/>
+          </a:bodyPr>
+          <a:lstStyle/>
+          <a:p>
+            <a:r>
+              <a:rPr lang="es-ES" sz="600" dirty="0" err="1"/>
+              <a:t>customizeQuery</a:t>
+            </a:r>
+            <a:endParaRPr lang="es-ES" sz="600" dirty="0"/>
+          </a:p>
+        </p:txBody>
+      </p:sp>
+      <p:cxnSp>
+        <p:nvCxnSpPr>
+          <p:cNvPr id="237" name="Conector recto de flecha 236">
+            <a:extLst>
+              <a:ext uri="{FF2B5EF4-FFF2-40B4-BE49-F238E27FC236}">
+                <a16:creationId xmlns:a16="http://schemas.microsoft.com/office/drawing/2014/main" id="{DA4466F0-98BD-F54A-BBE1-F89AA51397FC}"/>
+              </a:ext>
+            </a:extLst>
+          </p:cNvPr>
+          <p:cNvCxnSpPr>
+            <a:cxnSpLocks/>
+          </p:cNvCxnSpPr>
+          <p:nvPr/>
+        </p:nvCxnSpPr>
+        <p:spPr>
+          <a:xfrm flipV="1">
+            <a:off x="10560084" y="2798138"/>
+            <a:ext cx="235982" cy="386498"/>
+          </a:xfrm>
+          <a:prstGeom prst="straightConnector1">
+            <a:avLst/>
+          </a:prstGeom>
+          <a:ln>
+            <a:tailEnd type="triangle"/>
+          </a:ln>
+        </p:spPr>
+        <p:style>
+          <a:lnRef idx="1">
+            <a:schemeClr val="accent1"/>
+          </a:lnRef>
+          <a:fillRef idx="0">
+            <a:schemeClr val="accent1"/>
+          </a:fillRef>
+          <a:effectRef idx="0">
+            <a:schemeClr val="accent1"/>
+          </a:effectRef>
+          <a:fontRef idx="minor">
+            <a:schemeClr val="tx1"/>
+          </a:fontRef>
+        </p:style>
+      </p:cxnSp>
+      <p:cxnSp>
+        <p:nvCxnSpPr>
+          <p:cNvPr id="253" name="Conector recto de flecha 252">
+            <a:extLst>
+              <a:ext uri="{FF2B5EF4-FFF2-40B4-BE49-F238E27FC236}">
+                <a16:creationId xmlns:a16="http://schemas.microsoft.com/office/drawing/2014/main" id="{FC0E1BCC-0AC8-4C47-92BE-E7A14BB7B3DD}"/>
+              </a:ext>
+            </a:extLst>
+          </p:cNvPr>
+          <p:cNvCxnSpPr>
+            <a:cxnSpLocks/>
+            <a:stCxn id="65" idx="2"/>
+          </p:cNvCxnSpPr>
+          <p:nvPr/>
+        </p:nvCxnSpPr>
+        <p:spPr>
+          <a:xfrm>
+            <a:off x="9960289" y="865377"/>
+            <a:ext cx="786376" cy="1681552"/>
+          </a:xfrm>
+          <a:prstGeom prst="straightConnector1">
+            <a:avLst/>
+          </a:prstGeom>
+          <a:ln>
+            <a:tailEnd type="triangle"/>
+          </a:ln>
+        </p:spPr>
+        <p:style>
+          <a:lnRef idx="3">
+            <a:schemeClr val="accent2"/>
+          </a:lnRef>
+          <a:fillRef idx="0">
+            <a:schemeClr val="accent2"/>
+          </a:fillRef>
+          <a:effectRef idx="2">
+            <a:schemeClr val="accent2"/>
+          </a:effectRef>
+          <a:fontRef idx="minor">
+            <a:schemeClr val="tx1"/>
+          </a:fontRef>
+        </p:style>
+      </p:cxnSp>
     </p:spTree>
     <p:extLst>
       <p:ext uri="{BB962C8B-B14F-4D97-AF65-F5344CB8AC3E}">

</xml_diff>

<commit_message>
Increase the flexibility of a select from no table, allowing all the clauses supported by a select (outside the from definition)
</commit_message>
<xml_diff>
--- a/docs/select.pptx
+++ b/docs/select.pptx
@@ -2,12 +2,12 @@
 <file path=ppt/presentation.xml><?xml version="1.0" encoding="utf-8"?>
 <p:presentation xmlns:a="http://schemas.openxmlformats.org/drawingml/2006/main" xmlns:r="http://schemas.openxmlformats.org/officeDocument/2006/relationships" xmlns:p="http://schemas.openxmlformats.org/presentationml/2006/main" saveSubsetFonts="1">
   <p:sldMasterIdLst>
-    <p:sldMasterId id="2147483696" r:id="rId1"/>
+    <p:sldMasterId id="2147483720" r:id="rId1"/>
   </p:sldMasterIdLst>
   <p:sldIdLst>
     <p:sldId id="256" r:id="rId2"/>
   </p:sldIdLst>
-  <p:sldSz cx="18005425" cy="11041063"/>
+  <p:sldSz cx="19799300" cy="12239625"/>
   <p:notesSz cx="6858000" cy="9144000"/>
   <p:defaultTextStyle>
     <a:defPPr>
@@ -153,15 +153,15 @@
         </p:nvSpPr>
         <p:spPr>
           <a:xfrm>
-            <a:off x="2250678" y="1806952"/>
-            <a:ext cx="13504069" cy="3843926"/>
+            <a:off x="2474913" y="2003106"/>
+            <a:ext cx="14849475" cy="4261203"/>
           </a:xfrm>
         </p:spPr>
         <p:txBody>
           <a:bodyPr anchor="b"/>
           <a:lstStyle>
             <a:lvl1pPr algn="ctr">
-              <a:defRPr sz="8861"/>
+              <a:defRPr sz="9744"/>
             </a:lvl1pPr>
           </a:lstStyle>
           <a:p>
@@ -185,8 +185,8 @@
         </p:nvSpPr>
         <p:spPr>
           <a:xfrm>
-            <a:off x="2250678" y="5799115"/>
-            <a:ext cx="13504069" cy="2665700"/>
+            <a:off x="2474913" y="6428637"/>
+            <a:ext cx="14849475" cy="2955075"/>
           </a:xfrm>
         </p:spPr>
         <p:txBody>
@@ -194,39 +194,39 @@
           <a:lstStyle>
             <a:lvl1pPr marL="0" indent="0" algn="ctr">
               <a:buNone/>
-              <a:defRPr sz="3544"/>
+              <a:defRPr sz="3898"/>
             </a:lvl1pPr>
-            <a:lvl2pPr marL="675193" indent="0" algn="ctr">
+            <a:lvl2pPr marL="742493" indent="0" algn="ctr">
               <a:buNone/>
-              <a:defRPr sz="2954"/>
+              <a:defRPr sz="3248"/>
             </a:lvl2pPr>
-            <a:lvl3pPr marL="1350386" indent="0" algn="ctr">
+            <a:lvl3pPr marL="1484986" indent="0" algn="ctr">
               <a:buNone/>
-              <a:defRPr sz="2658"/>
+              <a:defRPr sz="2923"/>
             </a:lvl3pPr>
-            <a:lvl4pPr marL="2025579" indent="0" algn="ctr">
+            <a:lvl4pPr marL="2227478" indent="0" algn="ctr">
               <a:buNone/>
-              <a:defRPr sz="2363"/>
+              <a:defRPr sz="2598"/>
             </a:lvl4pPr>
-            <a:lvl5pPr marL="2700772" indent="0" algn="ctr">
+            <a:lvl5pPr marL="2969971" indent="0" algn="ctr">
               <a:buNone/>
-              <a:defRPr sz="2363"/>
+              <a:defRPr sz="2598"/>
             </a:lvl5pPr>
-            <a:lvl6pPr marL="3375965" indent="0" algn="ctr">
+            <a:lvl6pPr marL="3712464" indent="0" algn="ctr">
               <a:buNone/>
-              <a:defRPr sz="2363"/>
+              <a:defRPr sz="2598"/>
             </a:lvl6pPr>
-            <a:lvl7pPr marL="4051158" indent="0" algn="ctr">
+            <a:lvl7pPr marL="4454957" indent="0" algn="ctr">
               <a:buNone/>
-              <a:defRPr sz="2363"/>
+              <a:defRPr sz="2598"/>
             </a:lvl7pPr>
-            <a:lvl8pPr marL="4726351" indent="0" algn="ctr">
+            <a:lvl8pPr marL="5197450" indent="0" algn="ctr">
               <a:buNone/>
-              <a:defRPr sz="2363"/>
+              <a:defRPr sz="2598"/>
             </a:lvl8pPr>
-            <a:lvl9pPr marL="5401544" indent="0" algn="ctr">
+            <a:lvl9pPr marL="5939942" indent="0" algn="ctr">
               <a:buNone/>
-              <a:defRPr sz="2363"/>
+              <a:defRPr sz="2598"/>
             </a:lvl9pPr>
           </a:lstStyle>
           <a:p>
@@ -306,7 +306,7 @@
     </p:spTree>
     <p:extLst>
       <p:ext uri="{BB962C8B-B14F-4D97-AF65-F5344CB8AC3E}">
-        <p14:creationId xmlns:p14="http://schemas.microsoft.com/office/powerpoint/2010/main" val="4152971465"/>
+        <p14:creationId xmlns:p14="http://schemas.microsoft.com/office/powerpoint/2010/main" val="822533116"/>
       </p:ext>
     </p:extLst>
   </p:cSld>
@@ -476,7 +476,7 @@
     </p:spTree>
     <p:extLst>
       <p:ext uri="{BB962C8B-B14F-4D97-AF65-F5344CB8AC3E}">
-        <p14:creationId xmlns:p14="http://schemas.microsoft.com/office/powerpoint/2010/main" val="3466177492"/>
+        <p14:creationId xmlns:p14="http://schemas.microsoft.com/office/powerpoint/2010/main" val="3455202932"/>
       </p:ext>
     </p:extLst>
   </p:cSld>
@@ -515,8 +515,8 @@
         </p:nvSpPr>
         <p:spPr>
           <a:xfrm>
-            <a:off x="12885132" y="587834"/>
-            <a:ext cx="3882420" cy="9356791"/>
+            <a:off x="14168874" y="651647"/>
+            <a:ext cx="4269224" cy="10372516"/>
           </a:xfrm>
         </p:spPr>
         <p:txBody>
@@ -543,8 +543,8 @@
         </p:nvSpPr>
         <p:spPr>
           <a:xfrm>
-            <a:off x="1237873" y="587834"/>
-            <a:ext cx="11422191" cy="9356791"/>
+            <a:off x="1361202" y="651647"/>
+            <a:ext cx="12560181" cy="10372516"/>
           </a:xfrm>
         </p:spPr>
         <p:txBody>
@@ -656,7 +656,7 @@
     </p:spTree>
     <p:extLst>
       <p:ext uri="{BB962C8B-B14F-4D97-AF65-F5344CB8AC3E}">
-        <p14:creationId xmlns:p14="http://schemas.microsoft.com/office/powerpoint/2010/main" val="1940529716"/>
+        <p14:creationId xmlns:p14="http://schemas.microsoft.com/office/powerpoint/2010/main" val="4007462200"/>
       </p:ext>
     </p:extLst>
   </p:cSld>
@@ -826,7 +826,7 @@
     </p:spTree>
     <p:extLst>
       <p:ext uri="{BB962C8B-B14F-4D97-AF65-F5344CB8AC3E}">
-        <p14:creationId xmlns:p14="http://schemas.microsoft.com/office/powerpoint/2010/main" val="2553798167"/>
+        <p14:creationId xmlns:p14="http://schemas.microsoft.com/office/powerpoint/2010/main" val="1923671624"/>
       </p:ext>
     </p:extLst>
   </p:cSld>
@@ -865,15 +865,15 @@
         </p:nvSpPr>
         <p:spPr>
           <a:xfrm>
-            <a:off x="1228495" y="2752600"/>
-            <a:ext cx="15529679" cy="4592775"/>
+            <a:off x="1350890" y="3051408"/>
+            <a:ext cx="17076896" cy="5091343"/>
           </a:xfrm>
         </p:spPr>
         <p:txBody>
           <a:bodyPr anchor="b"/>
           <a:lstStyle>
             <a:lvl1pPr>
-              <a:defRPr sz="8861"/>
+              <a:defRPr sz="9744"/>
             </a:lvl1pPr>
           </a:lstStyle>
           <a:p>
@@ -897,8 +897,8 @@
         </p:nvSpPr>
         <p:spPr>
           <a:xfrm>
-            <a:off x="1228495" y="7388824"/>
-            <a:ext cx="15529679" cy="2415232"/>
+            <a:off x="1350890" y="8190918"/>
+            <a:ext cx="17076896" cy="2677417"/>
           </a:xfrm>
         </p:spPr>
         <p:txBody>
@@ -906,7 +906,7 @@
           <a:lstStyle>
             <a:lvl1pPr marL="0" indent="0">
               <a:buNone/>
-              <a:defRPr sz="3544">
+              <a:defRPr sz="3898">
                 <a:solidFill>
                   <a:schemeClr val="tx1">
                     <a:tint val="75000"/>
@@ -914,9 +914,9 @@
                 </a:solidFill>
               </a:defRPr>
             </a:lvl1pPr>
-            <a:lvl2pPr marL="675193" indent="0">
+            <a:lvl2pPr marL="742493" indent="0">
               <a:buNone/>
-              <a:defRPr sz="2954">
+              <a:defRPr sz="3248">
                 <a:solidFill>
                   <a:schemeClr val="tx1">
                     <a:tint val="75000"/>
@@ -924,9 +924,9 @@
                 </a:solidFill>
               </a:defRPr>
             </a:lvl2pPr>
-            <a:lvl3pPr marL="1350386" indent="0">
+            <a:lvl3pPr marL="1484986" indent="0">
               <a:buNone/>
-              <a:defRPr sz="2658">
+              <a:defRPr sz="2923">
                 <a:solidFill>
                   <a:schemeClr val="tx1">
                     <a:tint val="75000"/>
@@ -934,9 +934,9 @@
                 </a:solidFill>
               </a:defRPr>
             </a:lvl3pPr>
-            <a:lvl4pPr marL="2025579" indent="0">
+            <a:lvl4pPr marL="2227478" indent="0">
               <a:buNone/>
-              <a:defRPr sz="2363">
+              <a:defRPr sz="2598">
                 <a:solidFill>
                   <a:schemeClr val="tx1">
                     <a:tint val="75000"/>
@@ -944,9 +944,9 @@
                 </a:solidFill>
               </a:defRPr>
             </a:lvl4pPr>
-            <a:lvl5pPr marL="2700772" indent="0">
+            <a:lvl5pPr marL="2969971" indent="0">
               <a:buNone/>
-              <a:defRPr sz="2363">
+              <a:defRPr sz="2598">
                 <a:solidFill>
                   <a:schemeClr val="tx1">
                     <a:tint val="75000"/>
@@ -954,9 +954,9 @@
                 </a:solidFill>
               </a:defRPr>
             </a:lvl5pPr>
-            <a:lvl6pPr marL="3375965" indent="0">
+            <a:lvl6pPr marL="3712464" indent="0">
               <a:buNone/>
-              <a:defRPr sz="2363">
+              <a:defRPr sz="2598">
                 <a:solidFill>
                   <a:schemeClr val="tx1">
                     <a:tint val="75000"/>
@@ -964,9 +964,9 @@
                 </a:solidFill>
               </a:defRPr>
             </a:lvl6pPr>
-            <a:lvl7pPr marL="4051158" indent="0">
+            <a:lvl7pPr marL="4454957" indent="0">
               <a:buNone/>
-              <a:defRPr sz="2363">
+              <a:defRPr sz="2598">
                 <a:solidFill>
                   <a:schemeClr val="tx1">
                     <a:tint val="75000"/>
@@ -974,9 +974,9 @@
                 </a:solidFill>
               </a:defRPr>
             </a:lvl7pPr>
-            <a:lvl8pPr marL="4726351" indent="0">
+            <a:lvl8pPr marL="5197450" indent="0">
               <a:buNone/>
-              <a:defRPr sz="2363">
+              <a:defRPr sz="2598">
                 <a:solidFill>
                   <a:schemeClr val="tx1">
                     <a:tint val="75000"/>
@@ -984,9 +984,9 @@
                 </a:solidFill>
               </a:defRPr>
             </a:lvl8pPr>
-            <a:lvl9pPr marL="5401544" indent="0">
+            <a:lvl9pPr marL="5939942" indent="0">
               <a:buNone/>
-              <a:defRPr sz="2363">
+              <a:defRPr sz="2598">
                 <a:solidFill>
                   <a:schemeClr val="tx1">
                     <a:tint val="75000"/>
@@ -1072,7 +1072,7 @@
     </p:spTree>
     <p:extLst>
       <p:ext uri="{BB962C8B-B14F-4D97-AF65-F5344CB8AC3E}">
-        <p14:creationId xmlns:p14="http://schemas.microsoft.com/office/powerpoint/2010/main" val="3529612109"/>
+        <p14:creationId xmlns:p14="http://schemas.microsoft.com/office/powerpoint/2010/main" val="1792021853"/>
       </p:ext>
     </p:extLst>
   </p:cSld>
@@ -1134,8 +1134,8 @@
         </p:nvSpPr>
         <p:spPr>
           <a:xfrm>
-            <a:off x="1237873" y="2939172"/>
-            <a:ext cx="7652306" cy="7005453"/>
+            <a:off x="1361202" y="3258233"/>
+            <a:ext cx="8414703" cy="7765930"/>
           </a:xfrm>
         </p:spPr>
         <p:txBody>
@@ -1191,8 +1191,8 @@
         </p:nvSpPr>
         <p:spPr>
           <a:xfrm>
-            <a:off x="9115246" y="2939172"/>
-            <a:ext cx="7652306" cy="7005453"/>
+            <a:off x="10023395" y="3258233"/>
+            <a:ext cx="8414703" cy="7765930"/>
           </a:xfrm>
         </p:spPr>
         <p:txBody>
@@ -1304,7 +1304,7 @@
     </p:spTree>
     <p:extLst>
       <p:ext uri="{BB962C8B-B14F-4D97-AF65-F5344CB8AC3E}">
-        <p14:creationId xmlns:p14="http://schemas.microsoft.com/office/powerpoint/2010/main" val="1710043276"/>
+        <p14:creationId xmlns:p14="http://schemas.microsoft.com/office/powerpoint/2010/main" val="3118715944"/>
       </p:ext>
     </p:extLst>
   </p:cSld>
@@ -1343,8 +1343,8 @@
         </p:nvSpPr>
         <p:spPr>
           <a:xfrm>
-            <a:off x="1240218" y="587835"/>
-            <a:ext cx="15529679" cy="2134095"/>
+            <a:off x="1363781" y="651647"/>
+            <a:ext cx="17076896" cy="2365762"/>
           </a:xfrm>
         </p:spPr>
         <p:txBody>
@@ -1371,8 +1371,8 @@
         </p:nvSpPr>
         <p:spPr>
           <a:xfrm>
-            <a:off x="1240219" y="2706595"/>
-            <a:ext cx="7617138" cy="1326460"/>
+            <a:off x="1363782" y="3000409"/>
+            <a:ext cx="8376031" cy="1470454"/>
           </a:xfrm>
         </p:spPr>
         <p:txBody>
@@ -1380,39 +1380,39 @@
           <a:lstStyle>
             <a:lvl1pPr marL="0" indent="0">
               <a:buNone/>
-              <a:defRPr sz="3544" b="1"/>
+              <a:defRPr sz="3898" b="1"/>
             </a:lvl1pPr>
-            <a:lvl2pPr marL="675193" indent="0">
+            <a:lvl2pPr marL="742493" indent="0">
               <a:buNone/>
-              <a:defRPr sz="2954" b="1"/>
+              <a:defRPr sz="3248" b="1"/>
             </a:lvl2pPr>
-            <a:lvl3pPr marL="1350386" indent="0">
+            <a:lvl3pPr marL="1484986" indent="0">
               <a:buNone/>
-              <a:defRPr sz="2658" b="1"/>
+              <a:defRPr sz="2923" b="1"/>
             </a:lvl3pPr>
-            <a:lvl4pPr marL="2025579" indent="0">
+            <a:lvl4pPr marL="2227478" indent="0">
               <a:buNone/>
-              <a:defRPr sz="2363" b="1"/>
+              <a:defRPr sz="2598" b="1"/>
             </a:lvl4pPr>
-            <a:lvl5pPr marL="2700772" indent="0">
+            <a:lvl5pPr marL="2969971" indent="0">
               <a:buNone/>
-              <a:defRPr sz="2363" b="1"/>
+              <a:defRPr sz="2598" b="1"/>
             </a:lvl5pPr>
-            <a:lvl6pPr marL="3375965" indent="0">
+            <a:lvl6pPr marL="3712464" indent="0">
               <a:buNone/>
-              <a:defRPr sz="2363" b="1"/>
+              <a:defRPr sz="2598" b="1"/>
             </a:lvl6pPr>
-            <a:lvl7pPr marL="4051158" indent="0">
+            <a:lvl7pPr marL="4454957" indent="0">
               <a:buNone/>
-              <a:defRPr sz="2363" b="1"/>
+              <a:defRPr sz="2598" b="1"/>
             </a:lvl7pPr>
-            <a:lvl8pPr marL="4726351" indent="0">
+            <a:lvl8pPr marL="5197450" indent="0">
               <a:buNone/>
-              <a:defRPr sz="2363" b="1"/>
+              <a:defRPr sz="2598" b="1"/>
             </a:lvl8pPr>
-            <a:lvl9pPr marL="5401544" indent="0">
+            <a:lvl9pPr marL="5939942" indent="0">
               <a:buNone/>
-              <a:defRPr sz="2363" b="1"/>
+              <a:defRPr sz="2598" b="1"/>
             </a:lvl9pPr>
           </a:lstStyle>
           <a:p>
@@ -1436,8 +1436,8 @@
         </p:nvSpPr>
         <p:spPr>
           <a:xfrm>
-            <a:off x="1240219" y="4033055"/>
-            <a:ext cx="7617138" cy="5932016"/>
+            <a:off x="1363782" y="4470863"/>
+            <a:ext cx="8376031" cy="6575966"/>
           </a:xfrm>
         </p:spPr>
         <p:txBody>
@@ -1493,8 +1493,8 @@
         </p:nvSpPr>
         <p:spPr>
           <a:xfrm>
-            <a:off x="9115246" y="2706595"/>
-            <a:ext cx="7654651" cy="1326460"/>
+            <a:off x="10023396" y="3000409"/>
+            <a:ext cx="8417281" cy="1470454"/>
           </a:xfrm>
         </p:spPr>
         <p:txBody>
@@ -1502,39 +1502,39 @@
           <a:lstStyle>
             <a:lvl1pPr marL="0" indent="0">
               <a:buNone/>
-              <a:defRPr sz="3544" b="1"/>
+              <a:defRPr sz="3898" b="1"/>
             </a:lvl1pPr>
-            <a:lvl2pPr marL="675193" indent="0">
+            <a:lvl2pPr marL="742493" indent="0">
               <a:buNone/>
-              <a:defRPr sz="2954" b="1"/>
+              <a:defRPr sz="3248" b="1"/>
             </a:lvl2pPr>
-            <a:lvl3pPr marL="1350386" indent="0">
+            <a:lvl3pPr marL="1484986" indent="0">
               <a:buNone/>
-              <a:defRPr sz="2658" b="1"/>
+              <a:defRPr sz="2923" b="1"/>
             </a:lvl3pPr>
-            <a:lvl4pPr marL="2025579" indent="0">
+            <a:lvl4pPr marL="2227478" indent="0">
               <a:buNone/>
-              <a:defRPr sz="2363" b="1"/>
+              <a:defRPr sz="2598" b="1"/>
             </a:lvl4pPr>
-            <a:lvl5pPr marL="2700772" indent="0">
+            <a:lvl5pPr marL="2969971" indent="0">
               <a:buNone/>
-              <a:defRPr sz="2363" b="1"/>
+              <a:defRPr sz="2598" b="1"/>
             </a:lvl5pPr>
-            <a:lvl6pPr marL="3375965" indent="0">
+            <a:lvl6pPr marL="3712464" indent="0">
               <a:buNone/>
-              <a:defRPr sz="2363" b="1"/>
+              <a:defRPr sz="2598" b="1"/>
             </a:lvl6pPr>
-            <a:lvl7pPr marL="4051158" indent="0">
+            <a:lvl7pPr marL="4454957" indent="0">
               <a:buNone/>
-              <a:defRPr sz="2363" b="1"/>
+              <a:defRPr sz="2598" b="1"/>
             </a:lvl7pPr>
-            <a:lvl8pPr marL="4726351" indent="0">
+            <a:lvl8pPr marL="5197450" indent="0">
               <a:buNone/>
-              <a:defRPr sz="2363" b="1"/>
+              <a:defRPr sz="2598" b="1"/>
             </a:lvl8pPr>
-            <a:lvl9pPr marL="5401544" indent="0">
+            <a:lvl9pPr marL="5939942" indent="0">
               <a:buNone/>
-              <a:defRPr sz="2363" b="1"/>
+              <a:defRPr sz="2598" b="1"/>
             </a:lvl9pPr>
           </a:lstStyle>
           <a:p>
@@ -1558,8 +1558,8 @@
         </p:nvSpPr>
         <p:spPr>
           <a:xfrm>
-            <a:off x="9115246" y="4033055"/>
-            <a:ext cx="7654651" cy="5932016"/>
+            <a:off x="10023396" y="4470863"/>
+            <a:ext cx="8417281" cy="6575966"/>
           </a:xfrm>
         </p:spPr>
         <p:txBody>
@@ -1671,7 +1671,7 @@
     </p:spTree>
     <p:extLst>
       <p:ext uri="{BB962C8B-B14F-4D97-AF65-F5344CB8AC3E}">
-        <p14:creationId xmlns:p14="http://schemas.microsoft.com/office/powerpoint/2010/main" val="4060692353"/>
+        <p14:creationId xmlns:p14="http://schemas.microsoft.com/office/powerpoint/2010/main" val="3167676353"/>
       </p:ext>
     </p:extLst>
   </p:cSld>
@@ -1789,7 +1789,7 @@
     </p:spTree>
     <p:extLst>
       <p:ext uri="{BB962C8B-B14F-4D97-AF65-F5344CB8AC3E}">
-        <p14:creationId xmlns:p14="http://schemas.microsoft.com/office/powerpoint/2010/main" val="3177648086"/>
+        <p14:creationId xmlns:p14="http://schemas.microsoft.com/office/powerpoint/2010/main" val="376385141"/>
       </p:ext>
     </p:extLst>
   </p:cSld>
@@ -1884,7 +1884,7 @@
     </p:spTree>
     <p:extLst>
       <p:ext uri="{BB962C8B-B14F-4D97-AF65-F5344CB8AC3E}">
-        <p14:creationId xmlns:p14="http://schemas.microsoft.com/office/powerpoint/2010/main" val="558660612"/>
+        <p14:creationId xmlns:p14="http://schemas.microsoft.com/office/powerpoint/2010/main" val="2373255802"/>
       </p:ext>
     </p:extLst>
   </p:cSld>
@@ -1923,15 +1923,15 @@
         </p:nvSpPr>
         <p:spPr>
           <a:xfrm>
-            <a:off x="1240219" y="736071"/>
-            <a:ext cx="5807218" cy="2576248"/>
+            <a:off x="1363782" y="815975"/>
+            <a:ext cx="6385789" cy="2855913"/>
           </a:xfrm>
         </p:spPr>
         <p:txBody>
           <a:bodyPr anchor="b"/>
           <a:lstStyle>
             <a:lvl1pPr>
-              <a:defRPr sz="4726"/>
+              <a:defRPr sz="5197"/>
             </a:lvl1pPr>
           </a:lstStyle>
           <a:p>
@@ -1955,39 +1955,39 @@
         </p:nvSpPr>
         <p:spPr>
           <a:xfrm>
-            <a:off x="7654651" y="1589709"/>
-            <a:ext cx="9115246" cy="7846311"/>
+            <a:off x="8417281" y="1762280"/>
+            <a:ext cx="10023396" cy="8698067"/>
           </a:xfrm>
         </p:spPr>
         <p:txBody>
           <a:bodyPr/>
           <a:lstStyle>
             <a:lvl1pPr>
-              <a:defRPr sz="4726"/>
+              <a:defRPr sz="5197"/>
             </a:lvl1pPr>
             <a:lvl2pPr>
-              <a:defRPr sz="4135"/>
+              <a:defRPr sz="4547"/>
             </a:lvl2pPr>
             <a:lvl3pPr>
-              <a:defRPr sz="3544"/>
+              <a:defRPr sz="3898"/>
             </a:lvl3pPr>
             <a:lvl4pPr>
-              <a:defRPr sz="2954"/>
+              <a:defRPr sz="3248"/>
             </a:lvl4pPr>
             <a:lvl5pPr>
-              <a:defRPr sz="2954"/>
+              <a:defRPr sz="3248"/>
             </a:lvl5pPr>
             <a:lvl6pPr>
-              <a:defRPr sz="2954"/>
+              <a:defRPr sz="3248"/>
             </a:lvl6pPr>
             <a:lvl7pPr>
-              <a:defRPr sz="2954"/>
+              <a:defRPr sz="3248"/>
             </a:lvl7pPr>
             <a:lvl8pPr>
-              <a:defRPr sz="2954"/>
+              <a:defRPr sz="3248"/>
             </a:lvl8pPr>
             <a:lvl9pPr>
-              <a:defRPr sz="2954"/>
+              <a:defRPr sz="3248"/>
             </a:lvl9pPr>
           </a:lstStyle>
           <a:p>
@@ -2040,8 +2040,8 @@
         </p:nvSpPr>
         <p:spPr>
           <a:xfrm>
-            <a:off x="1240219" y="3312319"/>
-            <a:ext cx="5807218" cy="6136480"/>
+            <a:off x="1363782" y="3671887"/>
+            <a:ext cx="6385789" cy="6802626"/>
           </a:xfrm>
         </p:spPr>
         <p:txBody>
@@ -2049,39 +2049,39 @@
           <a:lstStyle>
             <a:lvl1pPr marL="0" indent="0">
               <a:buNone/>
-              <a:defRPr sz="2363"/>
+              <a:defRPr sz="2598"/>
             </a:lvl1pPr>
-            <a:lvl2pPr marL="675193" indent="0">
+            <a:lvl2pPr marL="742493" indent="0">
               <a:buNone/>
-              <a:defRPr sz="2068"/>
+              <a:defRPr sz="2274"/>
             </a:lvl2pPr>
-            <a:lvl3pPr marL="1350386" indent="0">
+            <a:lvl3pPr marL="1484986" indent="0">
               <a:buNone/>
-              <a:defRPr sz="1772"/>
+              <a:defRPr sz="1949"/>
             </a:lvl3pPr>
-            <a:lvl4pPr marL="2025579" indent="0">
+            <a:lvl4pPr marL="2227478" indent="0">
               <a:buNone/>
-              <a:defRPr sz="1477"/>
+              <a:defRPr sz="1624"/>
             </a:lvl4pPr>
-            <a:lvl5pPr marL="2700772" indent="0">
+            <a:lvl5pPr marL="2969971" indent="0">
               <a:buNone/>
-              <a:defRPr sz="1477"/>
+              <a:defRPr sz="1624"/>
             </a:lvl5pPr>
-            <a:lvl6pPr marL="3375965" indent="0">
+            <a:lvl6pPr marL="3712464" indent="0">
               <a:buNone/>
-              <a:defRPr sz="1477"/>
+              <a:defRPr sz="1624"/>
             </a:lvl6pPr>
-            <a:lvl7pPr marL="4051158" indent="0">
+            <a:lvl7pPr marL="4454957" indent="0">
               <a:buNone/>
-              <a:defRPr sz="1477"/>
+              <a:defRPr sz="1624"/>
             </a:lvl7pPr>
-            <a:lvl8pPr marL="4726351" indent="0">
+            <a:lvl8pPr marL="5197450" indent="0">
               <a:buNone/>
-              <a:defRPr sz="1477"/>
+              <a:defRPr sz="1624"/>
             </a:lvl8pPr>
-            <a:lvl9pPr marL="5401544" indent="0">
+            <a:lvl9pPr marL="5939942" indent="0">
               <a:buNone/>
-              <a:defRPr sz="1477"/>
+              <a:defRPr sz="1624"/>
             </a:lvl9pPr>
           </a:lstStyle>
           <a:p>
@@ -2161,7 +2161,7 @@
     </p:spTree>
     <p:extLst>
       <p:ext uri="{BB962C8B-B14F-4D97-AF65-F5344CB8AC3E}">
-        <p14:creationId xmlns:p14="http://schemas.microsoft.com/office/powerpoint/2010/main" val="17743276"/>
+        <p14:creationId xmlns:p14="http://schemas.microsoft.com/office/powerpoint/2010/main" val="315510835"/>
       </p:ext>
     </p:extLst>
   </p:cSld>
@@ -2200,15 +2200,15 @@
         </p:nvSpPr>
         <p:spPr>
           <a:xfrm>
-            <a:off x="1240219" y="736071"/>
-            <a:ext cx="5807218" cy="2576248"/>
+            <a:off x="1363782" y="815975"/>
+            <a:ext cx="6385789" cy="2855913"/>
           </a:xfrm>
         </p:spPr>
         <p:txBody>
           <a:bodyPr anchor="b"/>
           <a:lstStyle>
             <a:lvl1pPr>
-              <a:defRPr sz="4726"/>
+              <a:defRPr sz="5197"/>
             </a:lvl1pPr>
           </a:lstStyle>
           <a:p>
@@ -2232,8 +2232,8 @@
         </p:nvSpPr>
         <p:spPr>
           <a:xfrm>
-            <a:off x="7654651" y="1589709"/>
-            <a:ext cx="9115246" cy="7846311"/>
+            <a:off x="8417281" y="1762280"/>
+            <a:ext cx="10023396" cy="8698067"/>
           </a:xfrm>
         </p:spPr>
         <p:txBody>
@@ -2241,39 +2241,39 @@
           <a:lstStyle>
             <a:lvl1pPr marL="0" indent="0">
               <a:buNone/>
-              <a:defRPr sz="4726"/>
+              <a:defRPr sz="5197"/>
             </a:lvl1pPr>
-            <a:lvl2pPr marL="675193" indent="0">
+            <a:lvl2pPr marL="742493" indent="0">
               <a:buNone/>
-              <a:defRPr sz="4135"/>
+              <a:defRPr sz="4547"/>
             </a:lvl2pPr>
-            <a:lvl3pPr marL="1350386" indent="0">
+            <a:lvl3pPr marL="1484986" indent="0">
               <a:buNone/>
-              <a:defRPr sz="3544"/>
+              <a:defRPr sz="3898"/>
             </a:lvl3pPr>
-            <a:lvl4pPr marL="2025579" indent="0">
+            <a:lvl4pPr marL="2227478" indent="0">
               <a:buNone/>
-              <a:defRPr sz="2954"/>
+              <a:defRPr sz="3248"/>
             </a:lvl4pPr>
-            <a:lvl5pPr marL="2700772" indent="0">
+            <a:lvl5pPr marL="2969971" indent="0">
               <a:buNone/>
-              <a:defRPr sz="2954"/>
+              <a:defRPr sz="3248"/>
             </a:lvl5pPr>
-            <a:lvl6pPr marL="3375965" indent="0">
+            <a:lvl6pPr marL="3712464" indent="0">
               <a:buNone/>
-              <a:defRPr sz="2954"/>
+              <a:defRPr sz="3248"/>
             </a:lvl6pPr>
-            <a:lvl7pPr marL="4051158" indent="0">
+            <a:lvl7pPr marL="4454957" indent="0">
               <a:buNone/>
-              <a:defRPr sz="2954"/>
+              <a:defRPr sz="3248"/>
             </a:lvl7pPr>
-            <a:lvl8pPr marL="4726351" indent="0">
+            <a:lvl8pPr marL="5197450" indent="0">
               <a:buNone/>
-              <a:defRPr sz="2954"/>
+              <a:defRPr sz="3248"/>
             </a:lvl8pPr>
-            <a:lvl9pPr marL="5401544" indent="0">
+            <a:lvl9pPr marL="5939942" indent="0">
               <a:buNone/>
-              <a:defRPr sz="2954"/>
+              <a:defRPr sz="3248"/>
             </a:lvl9pPr>
           </a:lstStyle>
           <a:p>
@@ -2297,8 +2297,8 @@
         </p:nvSpPr>
         <p:spPr>
           <a:xfrm>
-            <a:off x="1240219" y="3312319"/>
-            <a:ext cx="5807218" cy="6136480"/>
+            <a:off x="1363782" y="3671887"/>
+            <a:ext cx="6385789" cy="6802626"/>
           </a:xfrm>
         </p:spPr>
         <p:txBody>
@@ -2306,39 +2306,39 @@
           <a:lstStyle>
             <a:lvl1pPr marL="0" indent="0">
               <a:buNone/>
-              <a:defRPr sz="2363"/>
+              <a:defRPr sz="2598"/>
             </a:lvl1pPr>
-            <a:lvl2pPr marL="675193" indent="0">
+            <a:lvl2pPr marL="742493" indent="0">
               <a:buNone/>
-              <a:defRPr sz="2068"/>
+              <a:defRPr sz="2274"/>
             </a:lvl2pPr>
-            <a:lvl3pPr marL="1350386" indent="0">
+            <a:lvl3pPr marL="1484986" indent="0">
               <a:buNone/>
-              <a:defRPr sz="1772"/>
+              <a:defRPr sz="1949"/>
             </a:lvl3pPr>
-            <a:lvl4pPr marL="2025579" indent="0">
+            <a:lvl4pPr marL="2227478" indent="0">
               <a:buNone/>
-              <a:defRPr sz="1477"/>
+              <a:defRPr sz="1624"/>
             </a:lvl4pPr>
-            <a:lvl5pPr marL="2700772" indent="0">
+            <a:lvl5pPr marL="2969971" indent="0">
               <a:buNone/>
-              <a:defRPr sz="1477"/>
+              <a:defRPr sz="1624"/>
             </a:lvl5pPr>
-            <a:lvl6pPr marL="3375965" indent="0">
+            <a:lvl6pPr marL="3712464" indent="0">
               <a:buNone/>
-              <a:defRPr sz="1477"/>
+              <a:defRPr sz="1624"/>
             </a:lvl6pPr>
-            <a:lvl7pPr marL="4051158" indent="0">
+            <a:lvl7pPr marL="4454957" indent="0">
               <a:buNone/>
-              <a:defRPr sz="1477"/>
+              <a:defRPr sz="1624"/>
             </a:lvl7pPr>
-            <a:lvl8pPr marL="4726351" indent="0">
+            <a:lvl8pPr marL="5197450" indent="0">
               <a:buNone/>
-              <a:defRPr sz="1477"/>
+              <a:defRPr sz="1624"/>
             </a:lvl8pPr>
-            <a:lvl9pPr marL="5401544" indent="0">
+            <a:lvl9pPr marL="5939942" indent="0">
               <a:buNone/>
-              <a:defRPr sz="1477"/>
+              <a:defRPr sz="1624"/>
             </a:lvl9pPr>
           </a:lstStyle>
           <a:p>
@@ -2418,7 +2418,7 @@
     </p:spTree>
     <p:extLst>
       <p:ext uri="{BB962C8B-B14F-4D97-AF65-F5344CB8AC3E}">
-        <p14:creationId xmlns:p14="http://schemas.microsoft.com/office/powerpoint/2010/main" val="2922980264"/>
+        <p14:creationId xmlns:p14="http://schemas.microsoft.com/office/powerpoint/2010/main" val="2496348424"/>
       </p:ext>
     </p:extLst>
   </p:cSld>
@@ -2462,8 +2462,8 @@
         </p:nvSpPr>
         <p:spPr>
           <a:xfrm>
-            <a:off x="1237873" y="587835"/>
-            <a:ext cx="15529679" cy="2134095"/>
+            <a:off x="1361202" y="651647"/>
+            <a:ext cx="17076896" cy="2365762"/>
           </a:xfrm>
           <a:prstGeom prst="rect">
             <a:avLst/>
@@ -2495,8 +2495,8 @@
         </p:nvSpPr>
         <p:spPr>
           <a:xfrm>
-            <a:off x="1237873" y="2939172"/>
-            <a:ext cx="15529679" cy="7005453"/>
+            <a:off x="1361202" y="3258233"/>
+            <a:ext cx="17076896" cy="7765930"/>
           </a:xfrm>
           <a:prstGeom prst="rect">
             <a:avLst/>
@@ -2557,8 +2557,8 @@
         </p:nvSpPr>
         <p:spPr>
           <a:xfrm>
-            <a:off x="1237873" y="10233431"/>
-            <a:ext cx="4051221" cy="587834"/>
+            <a:off x="1361202" y="11344320"/>
+            <a:ext cx="4454843" cy="651647"/>
           </a:xfrm>
           <a:prstGeom prst="rect">
             <a:avLst/>
@@ -2568,7 +2568,7 @@
           <a:bodyPr vert="horz" lIns="91440" tIns="45720" rIns="91440" bIns="45720" rtlCol="0" anchor="ctr"/>
           <a:lstStyle>
             <a:lvl1pPr algn="l">
-              <a:defRPr sz="1772">
+              <a:defRPr sz="1949">
                 <a:solidFill>
                   <a:schemeClr val="tx1">
                     <a:tint val="75000"/>
@@ -2598,8 +2598,8 @@
         </p:nvSpPr>
         <p:spPr>
           <a:xfrm>
-            <a:off x="5964297" y="10233431"/>
-            <a:ext cx="6076831" cy="587834"/>
+            <a:off x="6558518" y="11344320"/>
+            <a:ext cx="6682264" cy="651647"/>
           </a:xfrm>
           <a:prstGeom prst="rect">
             <a:avLst/>
@@ -2609,7 +2609,7 @@
           <a:bodyPr vert="horz" lIns="91440" tIns="45720" rIns="91440" bIns="45720" rtlCol="0" anchor="ctr"/>
           <a:lstStyle>
             <a:lvl1pPr algn="ctr">
-              <a:defRPr sz="1772">
+              <a:defRPr sz="1949">
                 <a:solidFill>
                   <a:schemeClr val="tx1">
                     <a:tint val="75000"/>
@@ -2635,8 +2635,8 @@
         </p:nvSpPr>
         <p:spPr>
           <a:xfrm>
-            <a:off x="12716331" y="10233431"/>
-            <a:ext cx="4051221" cy="587834"/>
+            <a:off x="13983255" y="11344320"/>
+            <a:ext cx="4454843" cy="651647"/>
           </a:xfrm>
           <a:prstGeom prst="rect">
             <a:avLst/>
@@ -2646,7 +2646,7 @@
           <a:bodyPr vert="horz" lIns="91440" tIns="45720" rIns="91440" bIns="45720" rtlCol="0" anchor="ctr"/>
           <a:lstStyle>
             <a:lvl1pPr algn="r">
-              <a:defRPr sz="1772">
+              <a:defRPr sz="1949">
                 <a:solidFill>
                   <a:schemeClr val="tx1">
                     <a:tint val="75000"/>
@@ -2667,27 +2667,27 @@
     </p:spTree>
     <p:extLst>
       <p:ext uri="{BB962C8B-B14F-4D97-AF65-F5344CB8AC3E}">
-        <p14:creationId xmlns:p14="http://schemas.microsoft.com/office/powerpoint/2010/main" val="2139092840"/>
+        <p14:creationId xmlns:p14="http://schemas.microsoft.com/office/powerpoint/2010/main" val="11930967"/>
       </p:ext>
     </p:extLst>
   </p:cSld>
   <p:clrMap bg1="lt1" tx1="dk1" bg2="lt2" tx2="dk2" accent1="accent1" accent2="accent2" accent3="accent3" accent4="accent4" accent5="accent5" accent6="accent6" hlink="hlink" folHlink="folHlink"/>
   <p:sldLayoutIdLst>
-    <p:sldLayoutId id="2147483697" r:id="rId1"/>
-    <p:sldLayoutId id="2147483698" r:id="rId2"/>
-    <p:sldLayoutId id="2147483699" r:id="rId3"/>
-    <p:sldLayoutId id="2147483700" r:id="rId4"/>
-    <p:sldLayoutId id="2147483701" r:id="rId5"/>
-    <p:sldLayoutId id="2147483702" r:id="rId6"/>
-    <p:sldLayoutId id="2147483703" r:id="rId7"/>
-    <p:sldLayoutId id="2147483704" r:id="rId8"/>
-    <p:sldLayoutId id="2147483705" r:id="rId9"/>
-    <p:sldLayoutId id="2147483706" r:id="rId10"/>
-    <p:sldLayoutId id="2147483707" r:id="rId11"/>
+    <p:sldLayoutId id="2147483721" r:id="rId1"/>
+    <p:sldLayoutId id="2147483722" r:id="rId2"/>
+    <p:sldLayoutId id="2147483723" r:id="rId3"/>
+    <p:sldLayoutId id="2147483724" r:id="rId4"/>
+    <p:sldLayoutId id="2147483725" r:id="rId5"/>
+    <p:sldLayoutId id="2147483726" r:id="rId6"/>
+    <p:sldLayoutId id="2147483727" r:id="rId7"/>
+    <p:sldLayoutId id="2147483728" r:id="rId8"/>
+    <p:sldLayoutId id="2147483729" r:id="rId9"/>
+    <p:sldLayoutId id="2147483730" r:id="rId10"/>
+    <p:sldLayoutId id="2147483731" r:id="rId11"/>
   </p:sldLayoutIdLst>
   <p:txStyles>
     <p:titleStyle>
-      <a:lvl1pPr algn="l" defTabSz="1350386" rtl="0" eaLnBrk="1" latinLnBrk="0" hangingPunct="1">
+      <a:lvl1pPr algn="l" defTabSz="1484986" rtl="0" eaLnBrk="1" latinLnBrk="0" hangingPunct="1">
         <a:lnSpc>
           <a:spcPct val="90000"/>
         </a:lnSpc>
@@ -2695,7 +2695,7 @@
           <a:spcPct val="0"/>
         </a:spcBef>
         <a:buNone/>
-        <a:defRPr sz="6498" kern="1200">
+        <a:defRPr sz="7146" kern="1200">
           <a:solidFill>
             <a:schemeClr val="tx1"/>
           </a:solidFill>
@@ -2706,16 +2706,16 @@
       </a:lvl1pPr>
     </p:titleStyle>
     <p:bodyStyle>
-      <a:lvl1pPr marL="337596" indent="-337596" algn="l" defTabSz="1350386" rtl="0" eaLnBrk="1" latinLnBrk="0" hangingPunct="1">
+      <a:lvl1pPr marL="371246" indent="-371246" algn="l" defTabSz="1484986" rtl="0" eaLnBrk="1" latinLnBrk="0" hangingPunct="1">
         <a:lnSpc>
           <a:spcPct val="90000"/>
         </a:lnSpc>
         <a:spcBef>
-          <a:spcPts val="1477"/>
+          <a:spcPts val="1624"/>
         </a:spcBef>
         <a:buFont typeface="Arial" panose="020B0604020202020204" pitchFamily="34" charset="0"/>
         <a:buChar char="•"/>
-        <a:defRPr sz="4135" kern="1200">
+        <a:defRPr sz="4547" kern="1200">
           <a:solidFill>
             <a:schemeClr val="tx1"/>
           </a:solidFill>
@@ -2724,16 +2724,16 @@
           <a:cs typeface="+mn-cs"/>
         </a:defRPr>
       </a:lvl1pPr>
-      <a:lvl2pPr marL="1012789" indent="-337596" algn="l" defTabSz="1350386" rtl="0" eaLnBrk="1" latinLnBrk="0" hangingPunct="1">
+      <a:lvl2pPr marL="1113739" indent="-371246" algn="l" defTabSz="1484986" rtl="0" eaLnBrk="1" latinLnBrk="0" hangingPunct="1">
         <a:lnSpc>
           <a:spcPct val="90000"/>
         </a:lnSpc>
         <a:spcBef>
-          <a:spcPts val="738"/>
+          <a:spcPts val="812"/>
         </a:spcBef>
         <a:buFont typeface="Arial" panose="020B0604020202020204" pitchFamily="34" charset="0"/>
         <a:buChar char="•"/>
-        <a:defRPr sz="3544" kern="1200">
+        <a:defRPr sz="3898" kern="1200">
           <a:solidFill>
             <a:schemeClr val="tx1"/>
           </a:solidFill>
@@ -2742,16 +2742,16 @@
           <a:cs typeface="+mn-cs"/>
         </a:defRPr>
       </a:lvl2pPr>
-      <a:lvl3pPr marL="1687982" indent="-337596" algn="l" defTabSz="1350386" rtl="0" eaLnBrk="1" latinLnBrk="0" hangingPunct="1">
+      <a:lvl3pPr marL="1856232" indent="-371246" algn="l" defTabSz="1484986" rtl="0" eaLnBrk="1" latinLnBrk="0" hangingPunct="1">
         <a:lnSpc>
           <a:spcPct val="90000"/>
         </a:lnSpc>
         <a:spcBef>
-          <a:spcPts val="738"/>
+          <a:spcPts val="812"/>
         </a:spcBef>
         <a:buFont typeface="Arial" panose="020B0604020202020204" pitchFamily="34" charset="0"/>
         <a:buChar char="•"/>
-        <a:defRPr sz="2954" kern="1200">
+        <a:defRPr sz="3248" kern="1200">
           <a:solidFill>
             <a:schemeClr val="tx1"/>
           </a:solidFill>
@@ -2760,16 +2760,16 @@
           <a:cs typeface="+mn-cs"/>
         </a:defRPr>
       </a:lvl3pPr>
-      <a:lvl4pPr marL="2363175" indent="-337596" algn="l" defTabSz="1350386" rtl="0" eaLnBrk="1" latinLnBrk="0" hangingPunct="1">
+      <a:lvl4pPr marL="2598725" indent="-371246" algn="l" defTabSz="1484986" rtl="0" eaLnBrk="1" latinLnBrk="0" hangingPunct="1">
         <a:lnSpc>
           <a:spcPct val="90000"/>
         </a:lnSpc>
         <a:spcBef>
-          <a:spcPts val="738"/>
+          <a:spcPts val="812"/>
         </a:spcBef>
         <a:buFont typeface="Arial" panose="020B0604020202020204" pitchFamily="34" charset="0"/>
         <a:buChar char="•"/>
-        <a:defRPr sz="2658" kern="1200">
+        <a:defRPr sz="2923" kern="1200">
           <a:solidFill>
             <a:schemeClr val="tx1"/>
           </a:solidFill>
@@ -2778,16 +2778,16 @@
           <a:cs typeface="+mn-cs"/>
         </a:defRPr>
       </a:lvl4pPr>
-      <a:lvl5pPr marL="3038368" indent="-337596" algn="l" defTabSz="1350386" rtl="0" eaLnBrk="1" latinLnBrk="0" hangingPunct="1">
+      <a:lvl5pPr marL="3341218" indent="-371246" algn="l" defTabSz="1484986" rtl="0" eaLnBrk="1" latinLnBrk="0" hangingPunct="1">
         <a:lnSpc>
           <a:spcPct val="90000"/>
         </a:lnSpc>
         <a:spcBef>
-          <a:spcPts val="738"/>
+          <a:spcPts val="812"/>
         </a:spcBef>
         <a:buFont typeface="Arial" panose="020B0604020202020204" pitchFamily="34" charset="0"/>
         <a:buChar char="•"/>
-        <a:defRPr sz="2658" kern="1200">
+        <a:defRPr sz="2923" kern="1200">
           <a:solidFill>
             <a:schemeClr val="tx1"/>
           </a:solidFill>
@@ -2796,16 +2796,16 @@
           <a:cs typeface="+mn-cs"/>
         </a:defRPr>
       </a:lvl5pPr>
-      <a:lvl6pPr marL="3713561" indent="-337596" algn="l" defTabSz="1350386" rtl="0" eaLnBrk="1" latinLnBrk="0" hangingPunct="1">
+      <a:lvl6pPr marL="4083710" indent="-371246" algn="l" defTabSz="1484986" rtl="0" eaLnBrk="1" latinLnBrk="0" hangingPunct="1">
         <a:lnSpc>
           <a:spcPct val="90000"/>
         </a:lnSpc>
         <a:spcBef>
-          <a:spcPts val="738"/>
+          <a:spcPts val="812"/>
         </a:spcBef>
         <a:buFont typeface="Arial" panose="020B0604020202020204" pitchFamily="34" charset="0"/>
         <a:buChar char="•"/>
-        <a:defRPr sz="2658" kern="1200">
+        <a:defRPr sz="2923" kern="1200">
           <a:solidFill>
             <a:schemeClr val="tx1"/>
           </a:solidFill>
@@ -2814,16 +2814,16 @@
           <a:cs typeface="+mn-cs"/>
         </a:defRPr>
       </a:lvl6pPr>
-      <a:lvl7pPr marL="4388754" indent="-337596" algn="l" defTabSz="1350386" rtl="0" eaLnBrk="1" latinLnBrk="0" hangingPunct="1">
+      <a:lvl7pPr marL="4826203" indent="-371246" algn="l" defTabSz="1484986" rtl="0" eaLnBrk="1" latinLnBrk="0" hangingPunct="1">
         <a:lnSpc>
           <a:spcPct val="90000"/>
         </a:lnSpc>
         <a:spcBef>
-          <a:spcPts val="738"/>
+          <a:spcPts val="812"/>
         </a:spcBef>
         <a:buFont typeface="Arial" panose="020B0604020202020204" pitchFamily="34" charset="0"/>
         <a:buChar char="•"/>
-        <a:defRPr sz="2658" kern="1200">
+        <a:defRPr sz="2923" kern="1200">
           <a:solidFill>
             <a:schemeClr val="tx1"/>
           </a:solidFill>
@@ -2832,16 +2832,16 @@
           <a:cs typeface="+mn-cs"/>
         </a:defRPr>
       </a:lvl7pPr>
-      <a:lvl8pPr marL="5063947" indent="-337596" algn="l" defTabSz="1350386" rtl="0" eaLnBrk="1" latinLnBrk="0" hangingPunct="1">
+      <a:lvl8pPr marL="5568696" indent="-371246" algn="l" defTabSz="1484986" rtl="0" eaLnBrk="1" latinLnBrk="0" hangingPunct="1">
         <a:lnSpc>
           <a:spcPct val="90000"/>
         </a:lnSpc>
         <a:spcBef>
-          <a:spcPts val="738"/>
+          <a:spcPts val="812"/>
         </a:spcBef>
         <a:buFont typeface="Arial" panose="020B0604020202020204" pitchFamily="34" charset="0"/>
         <a:buChar char="•"/>
-        <a:defRPr sz="2658" kern="1200">
+        <a:defRPr sz="2923" kern="1200">
           <a:solidFill>
             <a:schemeClr val="tx1"/>
           </a:solidFill>
@@ -2850,16 +2850,16 @@
           <a:cs typeface="+mn-cs"/>
         </a:defRPr>
       </a:lvl8pPr>
-      <a:lvl9pPr marL="5739140" indent="-337596" algn="l" defTabSz="1350386" rtl="0" eaLnBrk="1" latinLnBrk="0" hangingPunct="1">
+      <a:lvl9pPr marL="6311189" indent="-371246" algn="l" defTabSz="1484986" rtl="0" eaLnBrk="1" latinLnBrk="0" hangingPunct="1">
         <a:lnSpc>
           <a:spcPct val="90000"/>
         </a:lnSpc>
         <a:spcBef>
-          <a:spcPts val="738"/>
+          <a:spcPts val="812"/>
         </a:spcBef>
         <a:buFont typeface="Arial" panose="020B0604020202020204" pitchFamily="34" charset="0"/>
         <a:buChar char="•"/>
-        <a:defRPr sz="2658" kern="1200">
+        <a:defRPr sz="2923" kern="1200">
           <a:solidFill>
             <a:schemeClr val="tx1"/>
           </a:solidFill>
@@ -2873,8 +2873,8 @@
       <a:defPPr>
         <a:defRPr lang="en-US"/>
       </a:defPPr>
-      <a:lvl1pPr marL="0" algn="l" defTabSz="1350386" rtl="0" eaLnBrk="1" latinLnBrk="0" hangingPunct="1">
-        <a:defRPr sz="2658" kern="1200">
+      <a:lvl1pPr marL="0" algn="l" defTabSz="1484986" rtl="0" eaLnBrk="1" latinLnBrk="0" hangingPunct="1">
+        <a:defRPr sz="2923" kern="1200">
           <a:solidFill>
             <a:schemeClr val="tx1"/>
           </a:solidFill>
@@ -2883,8 +2883,8 @@
           <a:cs typeface="+mn-cs"/>
         </a:defRPr>
       </a:lvl1pPr>
-      <a:lvl2pPr marL="675193" algn="l" defTabSz="1350386" rtl="0" eaLnBrk="1" latinLnBrk="0" hangingPunct="1">
-        <a:defRPr sz="2658" kern="1200">
+      <a:lvl2pPr marL="742493" algn="l" defTabSz="1484986" rtl="0" eaLnBrk="1" latinLnBrk="0" hangingPunct="1">
+        <a:defRPr sz="2923" kern="1200">
           <a:solidFill>
             <a:schemeClr val="tx1"/>
           </a:solidFill>
@@ -2893,8 +2893,8 @@
           <a:cs typeface="+mn-cs"/>
         </a:defRPr>
       </a:lvl2pPr>
-      <a:lvl3pPr marL="1350386" algn="l" defTabSz="1350386" rtl="0" eaLnBrk="1" latinLnBrk="0" hangingPunct="1">
-        <a:defRPr sz="2658" kern="1200">
+      <a:lvl3pPr marL="1484986" algn="l" defTabSz="1484986" rtl="0" eaLnBrk="1" latinLnBrk="0" hangingPunct="1">
+        <a:defRPr sz="2923" kern="1200">
           <a:solidFill>
             <a:schemeClr val="tx1"/>
           </a:solidFill>
@@ -2903,8 +2903,8 @@
           <a:cs typeface="+mn-cs"/>
         </a:defRPr>
       </a:lvl3pPr>
-      <a:lvl4pPr marL="2025579" algn="l" defTabSz="1350386" rtl="0" eaLnBrk="1" latinLnBrk="0" hangingPunct="1">
-        <a:defRPr sz="2658" kern="1200">
+      <a:lvl4pPr marL="2227478" algn="l" defTabSz="1484986" rtl="0" eaLnBrk="1" latinLnBrk="0" hangingPunct="1">
+        <a:defRPr sz="2923" kern="1200">
           <a:solidFill>
             <a:schemeClr val="tx1"/>
           </a:solidFill>
@@ -2913,8 +2913,8 @@
           <a:cs typeface="+mn-cs"/>
         </a:defRPr>
       </a:lvl4pPr>
-      <a:lvl5pPr marL="2700772" algn="l" defTabSz="1350386" rtl="0" eaLnBrk="1" latinLnBrk="0" hangingPunct="1">
-        <a:defRPr sz="2658" kern="1200">
+      <a:lvl5pPr marL="2969971" algn="l" defTabSz="1484986" rtl="0" eaLnBrk="1" latinLnBrk="0" hangingPunct="1">
+        <a:defRPr sz="2923" kern="1200">
           <a:solidFill>
             <a:schemeClr val="tx1"/>
           </a:solidFill>
@@ -2923,8 +2923,8 @@
           <a:cs typeface="+mn-cs"/>
         </a:defRPr>
       </a:lvl5pPr>
-      <a:lvl6pPr marL="3375965" algn="l" defTabSz="1350386" rtl="0" eaLnBrk="1" latinLnBrk="0" hangingPunct="1">
-        <a:defRPr sz="2658" kern="1200">
+      <a:lvl6pPr marL="3712464" algn="l" defTabSz="1484986" rtl="0" eaLnBrk="1" latinLnBrk="0" hangingPunct="1">
+        <a:defRPr sz="2923" kern="1200">
           <a:solidFill>
             <a:schemeClr val="tx1"/>
           </a:solidFill>
@@ -2933,8 +2933,8 @@
           <a:cs typeface="+mn-cs"/>
         </a:defRPr>
       </a:lvl6pPr>
-      <a:lvl7pPr marL="4051158" algn="l" defTabSz="1350386" rtl="0" eaLnBrk="1" latinLnBrk="0" hangingPunct="1">
-        <a:defRPr sz="2658" kern="1200">
+      <a:lvl7pPr marL="4454957" algn="l" defTabSz="1484986" rtl="0" eaLnBrk="1" latinLnBrk="0" hangingPunct="1">
+        <a:defRPr sz="2923" kern="1200">
           <a:solidFill>
             <a:schemeClr val="tx1"/>
           </a:solidFill>
@@ -2943,8 +2943,8 @@
           <a:cs typeface="+mn-cs"/>
         </a:defRPr>
       </a:lvl7pPr>
-      <a:lvl8pPr marL="4726351" algn="l" defTabSz="1350386" rtl="0" eaLnBrk="1" latinLnBrk="0" hangingPunct="1">
-        <a:defRPr sz="2658" kern="1200">
+      <a:lvl8pPr marL="5197450" algn="l" defTabSz="1484986" rtl="0" eaLnBrk="1" latinLnBrk="0" hangingPunct="1">
+        <a:defRPr sz="2923" kern="1200">
           <a:solidFill>
             <a:schemeClr val="tx1"/>
           </a:solidFill>
@@ -2953,8 +2953,8 @@
           <a:cs typeface="+mn-cs"/>
         </a:defRPr>
       </a:lvl8pPr>
-      <a:lvl9pPr marL="5401544" algn="l" defTabSz="1350386" rtl="0" eaLnBrk="1" latinLnBrk="0" hangingPunct="1">
-        <a:defRPr sz="2658" kern="1200">
+      <a:lvl9pPr marL="5939942" algn="l" defTabSz="1484986" rtl="0" eaLnBrk="1" latinLnBrk="0" hangingPunct="1">
+        <a:defRPr sz="2923" kern="1200">
           <a:solidFill>
             <a:schemeClr val="tx1"/>
           </a:solidFill>
@@ -2999,7 +2999,7 @@
         </p:nvSpPr>
         <p:spPr>
           <a:xfrm>
-            <a:off x="3581243" y="9164426"/>
+            <a:off x="3608761" y="10273369"/>
             <a:ext cx="1056700" cy="246221"/>
           </a:xfrm>
           <a:prstGeom prst="rect">
@@ -3035,7 +3035,7 @@
         </p:nvSpPr>
         <p:spPr>
           <a:xfrm>
-            <a:off x="4570120" y="9532726"/>
+            <a:off x="4597638" y="10641669"/>
             <a:ext cx="1693092" cy="246221"/>
           </a:xfrm>
           <a:prstGeom prst="rect">
@@ -3075,7 +3075,7 @@
         </p:nvCxnSpPr>
         <p:spPr>
           <a:xfrm>
-            <a:off x="4109598" y="9410644"/>
+            <a:off x="4137118" y="10519585"/>
             <a:ext cx="460527" cy="245190"/>
           </a:xfrm>
           <a:prstGeom prst="straightConnector1">
@@ -3114,7 +3114,7 @@
         </p:nvSpPr>
         <p:spPr>
           <a:xfrm>
-            <a:off x="693001" y="8973926"/>
+            <a:off x="720521" y="10082869"/>
             <a:ext cx="947695" cy="246221"/>
           </a:xfrm>
           <a:prstGeom prst="rect">
@@ -3150,7 +3150,7 @@
         </p:nvSpPr>
         <p:spPr>
           <a:xfrm>
-            <a:off x="5566441" y="8084149"/>
+            <a:off x="5593959" y="9193092"/>
             <a:ext cx="2411238" cy="246221"/>
           </a:xfrm>
           <a:prstGeom prst="rect">
@@ -3186,7 +3186,7 @@
         </p:nvSpPr>
         <p:spPr>
           <a:xfrm>
-            <a:off x="4352028" y="9426443"/>
+            <a:off x="4379546" y="10535384"/>
             <a:ext cx="336952" cy="184666"/>
           </a:xfrm>
           <a:prstGeom prst="rect">
@@ -3222,7 +3222,7 @@
         </p:nvSpPr>
         <p:spPr>
           <a:xfrm>
-            <a:off x="1569547" y="8399967"/>
+            <a:off x="1597065" y="9508908"/>
             <a:ext cx="377026" cy="184666"/>
           </a:xfrm>
           <a:prstGeom prst="rect">
@@ -3270,7 +3270,7 @@
         </p:nvCxnSpPr>
         <p:spPr>
           <a:xfrm rot="16200000" flipH="1">
-            <a:off x="4027001" y="6667817"/>
+            <a:off x="4054519" y="7776758"/>
             <a:ext cx="1431532" cy="1647348"/>
           </a:xfrm>
           <a:prstGeom prst="curvedConnector2">
@@ -3309,7 +3309,7 @@
         </p:nvSpPr>
         <p:spPr>
           <a:xfrm>
-            <a:off x="4543776" y="7727490"/>
+            <a:off x="4571294" y="8836431"/>
             <a:ext cx="405880" cy="184666"/>
           </a:xfrm>
           <a:prstGeom prst="rect">
@@ -3345,7 +3345,7 @@
         </p:nvSpPr>
         <p:spPr>
           <a:xfrm>
-            <a:off x="4379625" y="7098234"/>
+            <a:off x="4407145" y="8207177"/>
             <a:ext cx="2328067" cy="246221"/>
           </a:xfrm>
           <a:prstGeom prst="rect">
@@ -3385,7 +3385,7 @@
         </p:nvCxnSpPr>
         <p:spPr>
           <a:xfrm>
-            <a:off x="3919093" y="6775728"/>
+            <a:off x="3946611" y="7884671"/>
             <a:ext cx="460528" cy="445617"/>
           </a:xfrm>
           <a:prstGeom prst="straightConnector1">
@@ -3424,7 +3424,7 @@
         </p:nvSpPr>
         <p:spPr>
           <a:xfrm>
-            <a:off x="4137929" y="6898605"/>
+            <a:off x="4165447" y="8007546"/>
             <a:ext cx="421910" cy="184666"/>
           </a:xfrm>
           <a:prstGeom prst="rect">
@@ -3464,7 +3464,7 @@
         </p:nvCxnSpPr>
         <p:spPr>
           <a:xfrm flipH="1">
-            <a:off x="5416666" y="9655834"/>
+            <a:off x="5444184" y="10764775"/>
             <a:ext cx="846546" cy="123110"/>
           </a:xfrm>
           <a:prstGeom prst="bentConnector4">
@@ -3506,7 +3506,7 @@
         </p:nvSpPr>
         <p:spPr>
           <a:xfrm>
-            <a:off x="5818368" y="9868403"/>
+            <a:off x="5845886" y="10977344"/>
             <a:ext cx="336952" cy="184666"/>
           </a:xfrm>
           <a:prstGeom prst="rect">
@@ -3542,7 +3542,7 @@
         </p:nvSpPr>
         <p:spPr>
           <a:xfrm>
-            <a:off x="8857971" y="8084149"/>
+            <a:off x="8885489" y="9193092"/>
             <a:ext cx="2430474" cy="246221"/>
           </a:xfrm>
           <a:prstGeom prst="rect">
@@ -3582,7 +3582,7 @@
         </p:nvCxnSpPr>
         <p:spPr>
           <a:xfrm>
-            <a:off x="7977679" y="8207257"/>
+            <a:off x="8005197" y="9316198"/>
             <a:ext cx="880292" cy="0"/>
           </a:xfrm>
           <a:prstGeom prst="straightConnector1">
@@ -3621,7 +3621,7 @@
         </p:nvSpPr>
         <p:spPr>
           <a:xfrm>
-            <a:off x="10605933" y="8399967"/>
+            <a:off x="10633451" y="9508908"/>
             <a:ext cx="404278" cy="184666"/>
           </a:xfrm>
           <a:prstGeom prst="rect">
@@ -3657,7 +3657,7 @@
         </p:nvSpPr>
         <p:spPr>
           <a:xfrm>
-            <a:off x="8443803" y="4530550"/>
+            <a:off x="8471321" y="5639491"/>
             <a:ext cx="473206" cy="184666"/>
           </a:xfrm>
           <a:prstGeom prst="rect">
@@ -3697,7 +3697,7 @@
         </p:nvSpPr>
         <p:spPr>
           <a:xfrm>
-            <a:off x="8944705" y="711281"/>
+            <a:off x="8043756" y="1820224"/>
             <a:ext cx="1542410" cy="246221"/>
           </a:xfrm>
           <a:prstGeom prst="rect">
@@ -3733,7 +3733,7 @@
         </p:nvSpPr>
         <p:spPr>
           <a:xfrm>
-            <a:off x="11653054" y="178208"/>
+            <a:off x="6415747" y="1248075"/>
             <a:ext cx="266700" cy="246221"/>
           </a:xfrm>
           <a:prstGeom prst="ellipse">
@@ -3779,14 +3779,15 @@
           </p:cNvPr>
           <p:cNvCxnSpPr>
             <a:cxnSpLocks/>
-            <a:endCxn id="67" idx="2"/>
+            <a:stCxn id="104" idx="1"/>
+            <a:endCxn id="67" idx="6"/>
           </p:cNvCxnSpPr>
           <p:nvPr/>
         </p:nvCxnSpPr>
         <p:spPr>
-          <a:xfrm flipV="1">
-            <a:off x="10267784" y="301319"/>
-            <a:ext cx="1385270" cy="1"/>
+          <a:xfrm flipH="1" flipV="1">
+            <a:off x="6682447" y="1371186"/>
+            <a:ext cx="1590245" cy="2865"/>
           </a:xfrm>
           <a:prstGeom prst="straightConnector1">
             <a:avLst/>
@@ -3824,7 +3825,7 @@
         </p:nvSpPr>
         <p:spPr>
           <a:xfrm>
-            <a:off x="10452832" y="4953787"/>
+            <a:off x="10480352" y="6062730"/>
             <a:ext cx="1944763" cy="246221"/>
           </a:xfrm>
           <a:prstGeom prst="rect">
@@ -3863,7 +3864,7 @@
         </p:nvCxnSpPr>
         <p:spPr>
           <a:xfrm>
-            <a:off x="10116065" y="5076896"/>
+            <a:off x="10143585" y="6185837"/>
             <a:ext cx="336767" cy="0"/>
           </a:xfrm>
           <a:prstGeom prst="straightConnector1">
@@ -3902,7 +3903,7 @@
         </p:nvSpPr>
         <p:spPr>
           <a:xfrm>
-            <a:off x="10114600" y="4837282"/>
+            <a:off x="10142118" y="5946223"/>
             <a:ext cx="324128" cy="184666"/>
           </a:xfrm>
           <a:prstGeom prst="rect">
@@ -3940,7 +3941,7 @@
         </p:nvCxnSpPr>
         <p:spPr>
           <a:xfrm flipH="1" flipV="1">
-            <a:off x="10284449" y="3572517"/>
+            <a:off x="10311967" y="4681458"/>
             <a:ext cx="917270" cy="1397864"/>
           </a:xfrm>
           <a:prstGeom prst="straightConnector1">
@@ -3979,7 +3980,7 @@
         </p:nvSpPr>
         <p:spPr>
           <a:xfrm>
-            <a:off x="11025339" y="4615233"/>
+            <a:off x="11052857" y="5724174"/>
             <a:ext cx="367408" cy="184666"/>
           </a:xfrm>
           <a:prstGeom prst="rect">
@@ -4019,7 +4020,7 @@
         </p:nvCxnSpPr>
         <p:spPr>
           <a:xfrm flipH="1">
-            <a:off x="5543659" y="7221343"/>
+            <a:off x="5571179" y="8330284"/>
             <a:ext cx="1164033" cy="123110"/>
           </a:xfrm>
           <a:prstGeom prst="bentConnector4">
@@ -4061,7 +4062,7 @@
         </p:nvSpPr>
         <p:spPr>
           <a:xfrm>
-            <a:off x="5866566" y="7417529"/>
+            <a:off x="5894084" y="8526470"/>
             <a:ext cx="404278" cy="184666"/>
           </a:xfrm>
           <a:prstGeom prst="rect">
@@ -4101,7 +4102,7 @@
         </p:nvCxnSpPr>
         <p:spPr>
           <a:xfrm>
-            <a:off x="6707688" y="7221345"/>
+            <a:off x="6735206" y="8330288"/>
             <a:ext cx="546292" cy="1341"/>
           </a:xfrm>
           <a:prstGeom prst="straightConnector1">
@@ -4140,7 +4141,7 @@
         </p:nvSpPr>
         <p:spPr>
           <a:xfrm>
-            <a:off x="10285027" y="126430"/>
+            <a:off x="7406178" y="1151172"/>
             <a:ext cx="470000" cy="184666"/>
           </a:xfrm>
           <a:prstGeom prst="rect">
@@ -4180,7 +4181,7 @@
         </p:nvSpPr>
         <p:spPr>
           <a:xfrm>
-            <a:off x="6799546" y="7068795"/>
+            <a:off x="6827064" y="8177736"/>
             <a:ext cx="405880" cy="184666"/>
           </a:xfrm>
           <a:prstGeom prst="rect">
@@ -4216,7 +4217,7 @@
         </p:nvSpPr>
         <p:spPr>
           <a:xfrm>
-            <a:off x="475837" y="9714518"/>
+            <a:off x="503357" y="10823461"/>
             <a:ext cx="1373729" cy="246221"/>
           </a:xfrm>
           <a:prstGeom prst="rect">
@@ -4252,7 +4253,7 @@
         </p:nvSpPr>
         <p:spPr>
           <a:xfrm>
-            <a:off x="895732" y="9378617"/>
+            <a:off x="923250" y="10487558"/>
             <a:ext cx="303288" cy="184666"/>
           </a:xfrm>
           <a:prstGeom prst="rect">
@@ -4296,7 +4297,7 @@
         </p:nvCxnSpPr>
         <p:spPr>
           <a:xfrm rot="10800000" flipH="1" flipV="1">
-            <a:off x="475836" y="9837626"/>
+            <a:off x="503356" y="10946567"/>
             <a:ext cx="686865" cy="123110"/>
           </a:xfrm>
           <a:prstGeom prst="bentConnector4">
@@ -4338,7 +4339,7 @@
         </p:nvSpPr>
         <p:spPr>
           <a:xfrm>
-            <a:off x="491454" y="9991514"/>
+            <a:off x="518972" y="11100455"/>
             <a:ext cx="404278" cy="184666"/>
           </a:xfrm>
           <a:prstGeom prst="rect">
@@ -4374,7 +4375,7 @@
         </p:nvSpPr>
         <p:spPr>
           <a:xfrm>
-            <a:off x="3213611" y="6529507"/>
+            <a:off x="3241129" y="7638450"/>
             <a:ext cx="1410964" cy="246221"/>
           </a:xfrm>
           <a:prstGeom prst="rect">
@@ -4410,7 +4411,7 @@
         </p:nvSpPr>
         <p:spPr>
           <a:xfrm>
-            <a:off x="2689359" y="8330315"/>
+            <a:off x="2716877" y="9439258"/>
             <a:ext cx="1616148" cy="246221"/>
           </a:xfrm>
           <a:prstGeom prst="rect">
@@ -4450,7 +4451,7 @@
         </p:nvCxnSpPr>
         <p:spPr>
           <a:xfrm rot="10800000" flipV="1">
-            <a:off x="1166850" y="8453423"/>
+            <a:off x="1194370" y="9562364"/>
             <a:ext cx="1522515" cy="520500"/>
           </a:xfrm>
           <a:prstGeom prst="curvedConnector2">
@@ -4492,7 +4493,7 @@
         </p:nvCxnSpPr>
         <p:spPr>
           <a:xfrm flipH="1">
-            <a:off x="1162702" y="9220147"/>
+            <a:off x="1190222" y="10329090"/>
             <a:ext cx="4147" cy="494371"/>
           </a:xfrm>
           <a:prstGeom prst="straightConnector1">
@@ -4534,7 +4535,7 @@
         </p:nvCxnSpPr>
         <p:spPr>
           <a:xfrm>
-            <a:off x="3491943" y="6744658"/>
+            <a:off x="3519461" y="7853601"/>
             <a:ext cx="5490" cy="1585657"/>
           </a:xfrm>
           <a:prstGeom prst="straightConnector1">
@@ -4576,7 +4577,7 @@
         </p:nvCxnSpPr>
         <p:spPr>
           <a:xfrm flipH="1">
-            <a:off x="7595868" y="6561575"/>
+            <a:off x="7623386" y="7670516"/>
             <a:ext cx="6879132" cy="1509358"/>
           </a:xfrm>
           <a:prstGeom prst="straightConnector1">
@@ -4619,7 +4620,7 @@
         </p:nvCxnSpPr>
         <p:spPr>
           <a:xfrm>
-            <a:off x="8511701" y="7345796"/>
+            <a:off x="8539221" y="8454739"/>
             <a:ext cx="1561511" cy="738353"/>
           </a:xfrm>
           <a:prstGeom prst="straightConnector1">
@@ -4660,7 +4661,7 @@
         </p:nvCxnSpPr>
         <p:spPr>
           <a:xfrm>
-            <a:off x="9854084" y="3595129"/>
+            <a:off x="9881602" y="4704070"/>
             <a:ext cx="0" cy="1358658"/>
           </a:xfrm>
           <a:prstGeom prst="straightConnector1">
@@ -4701,7 +4702,7 @@
         </p:nvCxnSpPr>
         <p:spPr>
           <a:xfrm>
-            <a:off x="10014928" y="3584894"/>
+            <a:off x="10042448" y="4693837"/>
             <a:ext cx="852873" cy="1385487"/>
           </a:xfrm>
           <a:prstGeom prst="straightConnector1">
@@ -4743,7 +4744,7 @@
         </p:nvCxnSpPr>
         <p:spPr>
           <a:xfrm flipH="1">
-            <a:off x="1640691" y="8576536"/>
+            <a:off x="1668209" y="9685479"/>
             <a:ext cx="1856742" cy="520501"/>
           </a:xfrm>
           <a:prstGeom prst="straightConnector1">
@@ -4785,7 +4786,7 @@
         </p:nvCxnSpPr>
         <p:spPr>
           <a:xfrm flipH="1">
-            <a:off x="1849561" y="8576536"/>
+            <a:off x="1877079" y="9685479"/>
             <a:ext cx="1647872" cy="1261093"/>
           </a:xfrm>
           <a:prstGeom prst="straightConnector1">
@@ -4827,7 +4828,7 @@
         </p:nvCxnSpPr>
         <p:spPr>
           <a:xfrm flipV="1">
-            <a:off x="2652148" y="9287535"/>
+            <a:off x="2679668" y="10396476"/>
             <a:ext cx="929099" cy="711000"/>
           </a:xfrm>
           <a:prstGeom prst="straightConnector1">
@@ -4866,7 +4867,7 @@
         </p:nvSpPr>
         <p:spPr>
           <a:xfrm>
-            <a:off x="2600700" y="9520802"/>
+            <a:off x="2628218" y="10629745"/>
             <a:ext cx="558166" cy="276999"/>
           </a:xfrm>
           <a:prstGeom prst="rect">
@@ -4907,7 +4908,7 @@
         </p:nvCxnSpPr>
         <p:spPr>
           <a:xfrm>
-            <a:off x="3497433" y="8576533"/>
+            <a:off x="3524951" y="9685474"/>
             <a:ext cx="612160" cy="587890"/>
           </a:xfrm>
           <a:prstGeom prst="straightConnector1">
@@ -4948,7 +4949,7 @@
         </p:nvCxnSpPr>
         <p:spPr>
           <a:xfrm>
-            <a:off x="3491943" y="6759533"/>
+            <a:off x="3519461" y="7868476"/>
             <a:ext cx="1560666" cy="2851579"/>
           </a:xfrm>
           <a:prstGeom prst="straightConnector1">
@@ -4987,7 +4988,7 @@
         </p:nvSpPr>
         <p:spPr>
           <a:xfrm>
-            <a:off x="2531586" y="10474457"/>
+            <a:off x="2559104" y="11583400"/>
             <a:ext cx="1552028" cy="246221"/>
           </a:xfrm>
           <a:prstGeom prst="rect">
@@ -5026,7 +5027,7 @@
         </p:nvCxnSpPr>
         <p:spPr>
           <a:xfrm flipV="1">
-            <a:off x="3307605" y="9287534"/>
+            <a:off x="3335125" y="10396475"/>
             <a:ext cx="273643" cy="1186920"/>
           </a:xfrm>
           <a:prstGeom prst="straightConnector1">
@@ -5065,7 +5066,7 @@
         </p:nvSpPr>
         <p:spPr>
           <a:xfrm>
-            <a:off x="3045135" y="10163368"/>
+            <a:off x="3072653" y="11272309"/>
             <a:ext cx="336952" cy="184666"/>
           </a:xfrm>
           <a:prstGeom prst="rect">
@@ -5103,7 +5104,7 @@
         </p:nvCxnSpPr>
         <p:spPr>
           <a:xfrm>
-            <a:off x="1162696" y="10597567"/>
+            <a:off x="1190214" y="11706510"/>
             <a:ext cx="1368890" cy="1"/>
           </a:xfrm>
           <a:prstGeom prst="straightConnector1">
@@ -5142,7 +5143,7 @@
         </p:nvSpPr>
         <p:spPr>
           <a:xfrm>
-            <a:off x="1693306" y="10415209"/>
+            <a:off x="1720824" y="11524150"/>
             <a:ext cx="657552" cy="184666"/>
           </a:xfrm>
           <a:prstGeom prst="rect">
@@ -5178,7 +5179,7 @@
         </p:nvSpPr>
         <p:spPr>
           <a:xfrm>
-            <a:off x="6593661" y="1826928"/>
+            <a:off x="1290138" y="8839682"/>
             <a:ext cx="1765227" cy="246221"/>
           </a:xfrm>
           <a:prstGeom prst="rect">
@@ -5202,10 +5203,10 @@
       </p:sp>
       <p:cxnSp>
         <p:nvCxnSpPr>
-          <p:cNvPr id="188" name="Conector recto de flecha 187">
-            <a:extLst>
-              <a:ext uri="{FF2B5EF4-FFF2-40B4-BE49-F238E27FC236}">
-                <a16:creationId xmlns:a16="http://schemas.microsoft.com/office/drawing/2014/main" id="{60A8004E-4C87-4F96-A1CF-E7BA95CD3F6C}"/>
+          <p:cNvPr id="191" name="Conector recto de flecha 190">
+            <a:extLst>
+              <a:ext uri="{FF2B5EF4-FFF2-40B4-BE49-F238E27FC236}">
+                <a16:creationId xmlns:a16="http://schemas.microsoft.com/office/drawing/2014/main" id="{E3845FE8-D0C0-4AF5-978E-0E798F11BA16}"/>
               </a:ext>
             </a:extLst>
           </p:cNvPr>
@@ -5216,8 +5217,8 @@
         </p:nvCxnSpPr>
         <p:spPr>
           <a:xfrm>
-            <a:off x="7849576" y="2122005"/>
-            <a:ext cx="885112" cy="1177513"/>
+            <a:off x="968213" y="7972092"/>
+            <a:ext cx="559964" cy="867590"/>
           </a:xfrm>
           <a:prstGeom prst="straightConnector1">
             <a:avLst/>
@@ -5243,10 +5244,10 @@
       </p:cxnSp>
       <p:sp>
         <p:nvSpPr>
-          <p:cNvPr id="189" name="CuadroTexto 188">
-            <a:extLst>
-              <a:ext uri="{FF2B5EF4-FFF2-40B4-BE49-F238E27FC236}">
-                <a16:creationId xmlns:a16="http://schemas.microsoft.com/office/drawing/2014/main" id="{5BB9F12E-1C00-49E4-A62A-A60B772543A4}"/>
+          <p:cNvPr id="192" name="CuadroTexto 191">
+            <a:extLst>
+              <a:ext uri="{FF2B5EF4-FFF2-40B4-BE49-F238E27FC236}">
+                <a16:creationId xmlns:a16="http://schemas.microsoft.com/office/drawing/2014/main" id="{4959044A-EF4D-4BBC-B091-2E1BC2E05DC0}"/>
               </a:ext>
             </a:extLst>
           </p:cNvPr>
@@ -5255,8 +5256,8 @@
         </p:nvSpPr>
         <p:spPr>
           <a:xfrm>
-            <a:off x="8171756" y="2454386"/>
-            <a:ext cx="405880" cy="184666"/>
+            <a:off x="1196121" y="8202854"/>
+            <a:ext cx="790601" cy="184666"/>
           </a:xfrm>
           <a:prstGeom prst="rect">
             <a:avLst/>
@@ -5270,83 +5271,6 @@
           <a:lstStyle/>
           <a:p>
             <a:r>
-              <a:rPr lang="es-ES_tradnl" sz="600" dirty="0"/>
-              <a:t>select*</a:t>
-            </a:r>
-            <a:endParaRPr lang="es-ES" sz="600" dirty="0"/>
-          </a:p>
-        </p:txBody>
-      </p:sp>
-      <p:cxnSp>
-        <p:nvCxnSpPr>
-          <p:cNvPr id="191" name="Conector recto de flecha 190">
-            <a:extLst>
-              <a:ext uri="{FF2B5EF4-FFF2-40B4-BE49-F238E27FC236}">
-                <a16:creationId xmlns:a16="http://schemas.microsoft.com/office/drawing/2014/main" id="{E3845FE8-D0C0-4AF5-978E-0E798F11BA16}"/>
-              </a:ext>
-            </a:extLst>
-          </p:cNvPr>
-          <p:cNvCxnSpPr>
-            <a:endCxn id="186" idx="1"/>
-          </p:cNvCxnSpPr>
-          <p:nvPr/>
-        </p:nvCxnSpPr>
-        <p:spPr>
-          <a:xfrm>
-            <a:off x="5400326" y="1950038"/>
-            <a:ext cx="1193330" cy="1"/>
-          </a:xfrm>
-          <a:prstGeom prst="straightConnector1">
-            <a:avLst/>
-          </a:prstGeom>
-          <a:ln>
-            <a:tailEnd type="triangle"/>
-          </a:ln>
-        </p:spPr>
-        <p:style>
-          <a:lnRef idx="1">
-            <a:schemeClr val="accent1"/>
-          </a:lnRef>
-          <a:fillRef idx="0">
-            <a:schemeClr val="accent1"/>
-          </a:fillRef>
-          <a:effectRef idx="0">
-            <a:schemeClr val="accent1"/>
-          </a:effectRef>
-          <a:fontRef idx="minor">
-            <a:schemeClr val="tx1"/>
-          </a:fontRef>
-        </p:style>
-      </p:cxnSp>
-      <p:sp>
-        <p:nvSpPr>
-          <p:cNvPr id="192" name="CuadroTexto 191">
-            <a:extLst>
-              <a:ext uri="{FF2B5EF4-FFF2-40B4-BE49-F238E27FC236}">
-                <a16:creationId xmlns:a16="http://schemas.microsoft.com/office/drawing/2014/main" id="{4959044A-EF4D-4BBC-B091-2E1BC2E05DC0}"/>
-              </a:ext>
-            </a:extLst>
-          </p:cNvPr>
-          <p:cNvSpPr txBox="1"/>
-          <p:nvPr/>
-        </p:nvSpPr>
-        <p:spPr>
-          <a:xfrm>
-            <a:off x="5583872" y="1757889"/>
-            <a:ext cx="790601" cy="184666"/>
-          </a:xfrm>
-          <a:prstGeom prst="rect">
-            <a:avLst/>
-          </a:prstGeom>
-          <a:noFill/>
-        </p:spPr>
-        <p:txBody>
-          <a:bodyPr wrap="none" rtlCol="0">
-            <a:spAutoFit/>
-          </a:bodyPr>
-          <a:lstStyle/>
-          <a:p>
-            <a:r>
               <a:rPr lang="es-ES" sz="600" dirty="0" err="1"/>
               <a:t>selectFromNoTable</a:t>
             </a:r>
@@ -5368,7 +5292,7 @@
         </p:nvSpPr>
         <p:spPr>
           <a:xfrm>
-            <a:off x="8154159" y="8044780"/>
+            <a:off x="8181677" y="9153721"/>
             <a:ext cx="421910" cy="184666"/>
           </a:xfrm>
           <a:prstGeom prst="rect">
@@ -5407,7 +5331,7 @@
         </p:nvCxnSpPr>
         <p:spPr>
           <a:xfrm flipH="1">
-            <a:off x="10073212" y="8207258"/>
+            <a:off x="10100732" y="9316199"/>
             <a:ext cx="1215237" cy="123110"/>
           </a:xfrm>
           <a:prstGeom prst="bentConnector4">
@@ -5451,7 +5375,7 @@
         </p:nvCxnSpPr>
         <p:spPr>
           <a:xfrm rot="16200000" flipH="1" flipV="1">
-            <a:off x="8635480" y="4486863"/>
+            <a:off x="8663000" y="5595804"/>
             <a:ext cx="123111" cy="1030090"/>
           </a:xfrm>
           <a:prstGeom prst="bentConnector4">
@@ -5493,7 +5417,7 @@
         </p:nvSpPr>
         <p:spPr>
           <a:xfrm>
-            <a:off x="7253984" y="7099575"/>
+            <a:off x="7281504" y="8208518"/>
             <a:ext cx="2515433" cy="246221"/>
           </a:xfrm>
           <a:prstGeom prst="rect">
@@ -5534,7 +5458,7 @@
         </p:nvCxnSpPr>
         <p:spPr>
           <a:xfrm flipH="1">
-            <a:off x="8511701" y="5186575"/>
+            <a:off x="8539221" y="6295516"/>
             <a:ext cx="677747" cy="1913000"/>
           </a:xfrm>
           <a:prstGeom prst="straightConnector1">
@@ -5573,7 +5497,7 @@
         </p:nvSpPr>
         <p:spPr>
           <a:xfrm>
-            <a:off x="9948178" y="7150975"/>
+            <a:off x="9975696" y="8259916"/>
             <a:ext cx="445956" cy="184666"/>
           </a:xfrm>
           <a:prstGeom prst="rect">
@@ -5612,7 +5536,7 @@
         </p:nvCxnSpPr>
         <p:spPr>
           <a:xfrm>
-            <a:off x="9769413" y="7222686"/>
+            <a:off x="9796931" y="8331629"/>
             <a:ext cx="985614" cy="379511"/>
           </a:xfrm>
           <a:prstGeom prst="straightConnector1">
@@ -5654,7 +5578,7 @@
         </p:nvCxnSpPr>
         <p:spPr>
           <a:xfrm>
-            <a:off x="9189448" y="5186575"/>
+            <a:off x="9216966" y="6295518"/>
             <a:ext cx="2107492" cy="2387029"/>
           </a:xfrm>
           <a:prstGeom prst="straightConnector1">
@@ -5697,7 +5621,7 @@
         </p:nvCxnSpPr>
         <p:spPr>
           <a:xfrm flipH="1" flipV="1">
-            <a:off x="11786404" y="7573604"/>
+            <a:off x="11813922" y="8682547"/>
             <a:ext cx="1435650" cy="123111"/>
           </a:xfrm>
           <a:prstGeom prst="bentConnector4">
@@ -5739,7 +5663,7 @@
         </p:nvSpPr>
         <p:spPr>
           <a:xfrm>
-            <a:off x="13778378" y="7164415"/>
+            <a:off x="13805896" y="8273356"/>
             <a:ext cx="405880" cy="184666"/>
           </a:xfrm>
           <a:prstGeom prst="rect">
@@ -5775,7 +5699,7 @@
         </p:nvSpPr>
         <p:spPr>
           <a:xfrm>
-            <a:off x="13817321" y="7573604"/>
+            <a:off x="13844839" y="8682547"/>
             <a:ext cx="2432076" cy="246221"/>
           </a:xfrm>
           <a:prstGeom prst="rect">
@@ -5814,7 +5738,7 @@
         </p:nvCxnSpPr>
         <p:spPr>
           <a:xfrm>
-            <a:off x="13222058" y="7696713"/>
+            <a:off x="13249578" y="8805654"/>
             <a:ext cx="595267" cy="0"/>
           </a:xfrm>
           <a:prstGeom prst="straightConnector1">
@@ -5853,7 +5777,7 @@
         </p:nvSpPr>
         <p:spPr>
           <a:xfrm>
-            <a:off x="13371365" y="7509862"/>
+            <a:off x="13398883" y="8618803"/>
             <a:ext cx="429926" cy="184666"/>
           </a:xfrm>
           <a:prstGeom prst="rect">
@@ -5896,7 +5820,7 @@
         </p:nvCxnSpPr>
         <p:spPr>
           <a:xfrm flipH="1">
-            <a:off x="15033359" y="7696713"/>
+            <a:off x="15060877" y="8805654"/>
             <a:ext cx="1216038" cy="123110"/>
           </a:xfrm>
           <a:prstGeom prst="bentConnector4">
@@ -5938,7 +5862,7 @@
         </p:nvSpPr>
         <p:spPr>
           <a:xfrm>
-            <a:off x="15605926" y="7886781"/>
+            <a:off x="15633444" y="8995722"/>
             <a:ext cx="404278" cy="184666"/>
           </a:xfrm>
           <a:prstGeom prst="rect">
@@ -5978,7 +5902,7 @@
         </p:nvCxnSpPr>
         <p:spPr>
           <a:xfrm>
-            <a:off x="9189448" y="5186575"/>
+            <a:off x="9216968" y="6295518"/>
             <a:ext cx="5843911" cy="2387029"/>
           </a:xfrm>
           <a:prstGeom prst="straightConnector1">
@@ -6017,7 +5941,7 @@
         </p:nvSpPr>
         <p:spPr>
           <a:xfrm>
-            <a:off x="5100928" y="6156284"/>
+            <a:off x="5128448" y="7265227"/>
             <a:ext cx="2733441" cy="246221"/>
           </a:xfrm>
           <a:prstGeom prst="rect">
@@ -6053,7 +5977,7 @@
         </p:nvSpPr>
         <p:spPr>
           <a:xfrm>
-            <a:off x="5516074" y="5723451"/>
+            <a:off x="5543592" y="6832392"/>
             <a:ext cx="405880" cy="184666"/>
           </a:xfrm>
           <a:prstGeom prst="rect">
@@ -6089,7 +6013,7 @@
         </p:nvSpPr>
         <p:spPr>
           <a:xfrm>
-            <a:off x="4409161" y="5076784"/>
+            <a:off x="4436679" y="6185727"/>
             <a:ext cx="2294218" cy="246221"/>
           </a:xfrm>
           <a:prstGeom prst="rect">
@@ -6128,7 +6052,7 @@
         </p:nvCxnSpPr>
         <p:spPr>
           <a:xfrm rot="10800000" flipH="1">
-            <a:off x="4409164" y="5076785"/>
+            <a:off x="4436684" y="6185728"/>
             <a:ext cx="1147109" cy="123111"/>
           </a:xfrm>
           <a:prstGeom prst="bentConnector4">
@@ -6170,7 +6094,7 @@
         </p:nvSpPr>
         <p:spPr>
           <a:xfrm>
-            <a:off x="4715471" y="4609056"/>
+            <a:off x="4742989" y="5717997"/>
             <a:ext cx="404278" cy="184666"/>
           </a:xfrm>
           <a:prstGeom prst="rect">
@@ -6209,7 +6133,7 @@
         </p:nvCxnSpPr>
         <p:spPr>
           <a:xfrm>
-            <a:off x="6852237" y="6409198"/>
+            <a:off x="6879755" y="7518139"/>
             <a:ext cx="2151406" cy="2797882"/>
           </a:xfrm>
           <a:prstGeom prst="straightConnector1">
@@ -6252,7 +6176,7 @@
         </p:nvCxnSpPr>
         <p:spPr>
           <a:xfrm>
-            <a:off x="6703379" y="5199895"/>
+            <a:off x="6730897" y="6308838"/>
             <a:ext cx="2300264" cy="4007187"/>
           </a:xfrm>
           <a:prstGeom prst="straightConnector1">
@@ -6293,7 +6217,7 @@
         </p:nvCxnSpPr>
         <p:spPr>
           <a:xfrm rot="16200000" flipH="1" flipV="1">
-            <a:off x="5659233" y="5521778"/>
+            <a:off x="5686753" y="6630721"/>
             <a:ext cx="123111" cy="1366721"/>
           </a:xfrm>
           <a:prstGeom prst="bentConnector4">
@@ -6338,7 +6262,7 @@
         </p:nvCxnSpPr>
         <p:spPr>
           <a:xfrm flipH="1" flipV="1">
-            <a:off x="6467648" y="5369794"/>
+            <a:off x="6495168" y="6478735"/>
             <a:ext cx="1" cy="786488"/>
           </a:xfrm>
           <a:prstGeom prst="straightConnector1">
@@ -6377,7 +6301,7 @@
         </p:nvSpPr>
         <p:spPr>
           <a:xfrm>
-            <a:off x="6677578" y="6587521"/>
+            <a:off x="6705096" y="7696462"/>
             <a:ext cx="405880" cy="184666"/>
           </a:xfrm>
           <a:prstGeom prst="rect">
@@ -6413,7 +6337,7 @@
         </p:nvSpPr>
         <p:spPr>
           <a:xfrm>
-            <a:off x="6681226" y="5683043"/>
+            <a:off x="6708744" y="6791984"/>
             <a:ext cx="405880" cy="184666"/>
           </a:xfrm>
           <a:prstGeom prst="rect">
@@ -6452,7 +6376,7 @@
         </p:nvCxnSpPr>
         <p:spPr>
           <a:xfrm flipV="1">
-            <a:off x="4624579" y="6279395"/>
+            <a:off x="4652099" y="7388338"/>
             <a:ext cx="476349" cy="373223"/>
           </a:xfrm>
           <a:prstGeom prst="straightConnector1">
@@ -6491,7 +6415,7 @@
         </p:nvSpPr>
         <p:spPr>
           <a:xfrm>
-            <a:off x="4498950" y="6302988"/>
+            <a:off x="4526468" y="7411929"/>
             <a:ext cx="445956" cy="184666"/>
           </a:xfrm>
           <a:prstGeom prst="rect">
@@ -6530,7 +6454,7 @@
         </p:nvCxnSpPr>
         <p:spPr>
           <a:xfrm flipH="1" flipV="1">
-            <a:off x="5100928" y="6279395"/>
+            <a:off x="5128448" y="7388338"/>
             <a:ext cx="442731" cy="818839"/>
           </a:xfrm>
           <a:prstGeom prst="straightConnector1">
@@ -6569,7 +6493,7 @@
         </p:nvSpPr>
         <p:spPr>
           <a:xfrm>
-            <a:off x="5336716" y="6643316"/>
+            <a:off x="5364234" y="7752257"/>
             <a:ext cx="445956" cy="184666"/>
           </a:xfrm>
           <a:prstGeom prst="rect">
@@ -6605,7 +6529,7 @@
         </p:nvSpPr>
         <p:spPr>
           <a:xfrm>
-            <a:off x="6093083" y="5502224"/>
+            <a:off x="6120601" y="6611165"/>
             <a:ext cx="429926" cy="184666"/>
           </a:xfrm>
           <a:prstGeom prst="rect">
@@ -6645,7 +6569,7 @@
         </p:nvSpPr>
         <p:spPr>
           <a:xfrm>
-            <a:off x="8159358" y="4940354"/>
+            <a:off x="8186878" y="6049297"/>
             <a:ext cx="2060179" cy="246221"/>
           </a:xfrm>
           <a:prstGeom prst="rect">
@@ -6682,7 +6606,7 @@
         </p:nvSpPr>
         <p:spPr>
           <a:xfrm>
-            <a:off x="9215616" y="178001"/>
+            <a:off x="8272692" y="1250940"/>
             <a:ext cx="1067921" cy="246221"/>
           </a:xfrm>
           <a:prstGeom prst="rect">
@@ -6721,9 +6645,9 @@
           <p:nvPr/>
         </p:nvCxnSpPr>
         <p:spPr>
-          <a:xfrm flipH="1">
-            <a:off x="9715914" y="424222"/>
-            <a:ext cx="33663" cy="287059"/>
+          <a:xfrm>
+            <a:off x="8806653" y="1497161"/>
+            <a:ext cx="8308" cy="323063"/>
           </a:xfrm>
           <a:prstGeom prst="straightConnector1">
             <a:avLst/>
@@ -6761,7 +6685,7 @@
         </p:nvSpPr>
         <p:spPr>
           <a:xfrm>
-            <a:off x="11894354" y="737396"/>
+            <a:off x="6417177" y="1820224"/>
             <a:ext cx="266700" cy="246221"/>
           </a:xfrm>
           <a:prstGeom prst="ellipse">
@@ -6807,14 +6731,15 @@
           </p:cNvPr>
           <p:cNvCxnSpPr>
             <a:cxnSpLocks/>
-            <a:endCxn id="111" idx="2"/>
+            <a:stCxn id="65" idx="1"/>
+            <a:endCxn id="111" idx="6"/>
           </p:cNvCxnSpPr>
           <p:nvPr/>
         </p:nvCxnSpPr>
         <p:spPr>
-          <a:xfrm flipV="1">
-            <a:off x="10509084" y="860507"/>
-            <a:ext cx="1385270" cy="1"/>
+          <a:xfrm flipH="1">
+            <a:off x="6683877" y="1943335"/>
+            <a:ext cx="1359879" cy="0"/>
           </a:xfrm>
           <a:prstGeom prst="straightConnector1">
             <a:avLst/>
@@ -6852,7 +6777,7 @@
         </p:nvSpPr>
         <p:spPr>
           <a:xfrm>
-            <a:off x="10526327" y="685618"/>
+            <a:off x="7086018" y="1738623"/>
             <a:ext cx="721672" cy="184666"/>
           </a:xfrm>
           <a:prstGeom prst="rect">
@@ -6888,7 +6813,7 @@
         </p:nvSpPr>
         <p:spPr>
           <a:xfrm>
-            <a:off x="9689715" y="2631899"/>
+            <a:off x="7760534" y="3726153"/>
             <a:ext cx="2491388" cy="246221"/>
           </a:xfrm>
           <a:prstGeom prst="rect">
@@ -6925,7 +6850,7 @@
         </p:nvSpPr>
         <p:spPr>
           <a:xfrm>
-            <a:off x="7107527" y="8534662"/>
+            <a:off x="7135045" y="9643603"/>
             <a:ext cx="445956" cy="184666"/>
           </a:xfrm>
           <a:prstGeom prst="rect">
@@ -6961,7 +6886,7 @@
         </p:nvSpPr>
         <p:spPr>
           <a:xfrm>
-            <a:off x="7546237" y="10284760"/>
+            <a:off x="7573757" y="11393703"/>
             <a:ext cx="3656771" cy="246221"/>
           </a:xfrm>
           <a:prstGeom prst="rect">
@@ -7001,7 +6926,7 @@
         </p:nvCxnSpPr>
         <p:spPr>
           <a:xfrm>
-            <a:off x="6772064" y="8330370"/>
+            <a:off x="6799584" y="9439313"/>
             <a:ext cx="2024657" cy="1982983"/>
           </a:xfrm>
           <a:prstGeom prst="straightConnector1">
@@ -7044,7 +6969,7 @@
         </p:nvCxnSpPr>
         <p:spPr>
           <a:xfrm flipH="1" flipV="1">
-            <a:off x="9374623" y="10284760"/>
+            <a:off x="9402143" y="11393703"/>
             <a:ext cx="1828385" cy="123111"/>
           </a:xfrm>
           <a:prstGeom prst="bentConnector4">
@@ -7086,7 +7011,7 @@
         </p:nvSpPr>
         <p:spPr>
           <a:xfrm>
-            <a:off x="10461921" y="9875571"/>
+            <a:off x="10489439" y="10984512"/>
             <a:ext cx="405880" cy="184666"/>
           </a:xfrm>
           <a:prstGeom prst="rect">
@@ -7122,7 +7047,7 @@
         </p:nvSpPr>
         <p:spPr>
           <a:xfrm>
-            <a:off x="11859015" y="10284760"/>
+            <a:off x="11886535" y="11393703"/>
             <a:ext cx="3217547" cy="246221"/>
           </a:xfrm>
           <a:prstGeom prst="rect">
@@ -7161,7 +7086,7 @@
         </p:nvCxnSpPr>
         <p:spPr>
           <a:xfrm>
-            <a:off x="11203008" y="10407869"/>
+            <a:off x="11230528" y="11516810"/>
             <a:ext cx="656007" cy="0"/>
           </a:xfrm>
           <a:prstGeom prst="straightConnector1">
@@ -7200,7 +7125,7 @@
         </p:nvSpPr>
         <p:spPr>
           <a:xfrm>
-            <a:off x="11413055" y="10221018"/>
+            <a:off x="11440573" y="11329959"/>
             <a:ext cx="429926" cy="184666"/>
           </a:xfrm>
           <a:prstGeom prst="rect">
@@ -7243,7 +7168,7 @@
         </p:nvCxnSpPr>
         <p:spPr>
           <a:xfrm flipH="1">
-            <a:off x="13467789" y="10407869"/>
+            <a:off x="13495309" y="11516810"/>
             <a:ext cx="1608773" cy="123110"/>
           </a:xfrm>
           <a:prstGeom prst="bentConnector4">
@@ -7285,7 +7210,7 @@
         </p:nvSpPr>
         <p:spPr>
           <a:xfrm>
-            <a:off x="13647616" y="10597937"/>
+            <a:off x="13675134" y="11706878"/>
             <a:ext cx="404278" cy="184666"/>
           </a:xfrm>
           <a:prstGeom prst="rect">
@@ -7321,7 +7246,7 @@
         </p:nvSpPr>
         <p:spPr>
           <a:xfrm>
-            <a:off x="9003647" y="9083971"/>
+            <a:off x="9031167" y="10192914"/>
             <a:ext cx="2909771" cy="246221"/>
           </a:xfrm>
           <a:prstGeom prst="rect">
@@ -7356,7 +7281,7 @@
         </p:nvSpPr>
         <p:spPr>
           <a:xfrm>
-            <a:off x="12826115" y="9083971"/>
+            <a:off x="12853635" y="10192914"/>
             <a:ext cx="3139001" cy="246221"/>
           </a:xfrm>
           <a:prstGeom prst="rect">
@@ -7395,7 +7320,7 @@
         </p:nvCxnSpPr>
         <p:spPr>
           <a:xfrm>
-            <a:off x="11945819" y="9207081"/>
+            <a:off x="11973337" y="10316024"/>
             <a:ext cx="880292" cy="1"/>
           </a:xfrm>
           <a:prstGeom prst="straightConnector1">
@@ -7434,7 +7359,7 @@
         </p:nvSpPr>
         <p:spPr>
           <a:xfrm>
-            <a:off x="14574073" y="9399789"/>
+            <a:off x="14601591" y="10508730"/>
             <a:ext cx="404278" cy="184666"/>
           </a:xfrm>
           <a:prstGeom prst="rect">
@@ -7470,7 +7395,7 @@
         </p:nvSpPr>
         <p:spPr>
           <a:xfrm>
-            <a:off x="12122299" y="9044602"/>
+            <a:off x="12149817" y="10153543"/>
             <a:ext cx="421910" cy="184666"/>
           </a:xfrm>
           <a:prstGeom prst="rect">
@@ -7509,7 +7434,7 @@
         </p:nvCxnSpPr>
         <p:spPr>
           <a:xfrm flipH="1">
-            <a:off x="14395612" y="9207080"/>
+            <a:off x="14423130" y="10316021"/>
             <a:ext cx="1569500" cy="123110"/>
           </a:xfrm>
           <a:prstGeom prst="bentConnector4">
@@ -7554,7 +7479,7 @@
         </p:nvCxnSpPr>
         <p:spPr>
           <a:xfrm flipH="1">
-            <a:off x="10329669" y="9330190"/>
+            <a:off x="10357187" y="10439131"/>
             <a:ext cx="128860" cy="1014122"/>
           </a:xfrm>
           <a:prstGeom prst="straightConnector1">
@@ -7597,7 +7522,7 @@
         </p:nvCxnSpPr>
         <p:spPr>
           <a:xfrm>
-            <a:off x="10458529" y="9330190"/>
+            <a:off x="10486047" y="10439131"/>
             <a:ext cx="3009256" cy="954568"/>
           </a:xfrm>
           <a:prstGeom prst="straightConnector1">
@@ -7638,7 +7563,7 @@
         </p:nvCxnSpPr>
         <p:spPr>
           <a:xfrm flipH="1">
-            <a:off x="11617287" y="6582156"/>
+            <a:off x="11644805" y="7691097"/>
             <a:ext cx="2808654" cy="2550630"/>
           </a:xfrm>
           <a:prstGeom prst="straightConnector1">
@@ -7681,7 +7606,7 @@
         </p:nvCxnSpPr>
         <p:spPr>
           <a:xfrm>
-            <a:off x="9189448" y="5186575"/>
+            <a:off x="9216966" y="6295516"/>
             <a:ext cx="5206168" cy="3897396"/>
           </a:xfrm>
           <a:prstGeom prst="straightConnector1">
@@ -7720,7 +7645,7 @@
         </p:nvSpPr>
         <p:spPr>
           <a:xfrm>
-            <a:off x="3959557" y="3971964"/>
+            <a:off x="3987075" y="5080907"/>
             <a:ext cx="2606804" cy="246221"/>
           </a:xfrm>
           <a:prstGeom prst="rect">
@@ -7758,7 +7683,7 @@
         </p:nvCxnSpPr>
         <p:spPr>
           <a:xfrm flipH="1" flipV="1">
-            <a:off x="5262959" y="4218183"/>
+            <a:off x="5290477" y="5327124"/>
             <a:ext cx="865068" cy="817644"/>
           </a:xfrm>
           <a:prstGeom prst="straightConnector1">
@@ -7797,7 +7722,7 @@
         </p:nvSpPr>
         <p:spPr>
           <a:xfrm>
-            <a:off x="5372558" y="3461266"/>
+            <a:off x="5400076" y="4570207"/>
             <a:ext cx="404278" cy="184666"/>
           </a:xfrm>
           <a:prstGeom prst="rect">
@@ -7833,7 +7758,7 @@
         </p:nvSpPr>
         <p:spPr>
           <a:xfrm>
-            <a:off x="5791072" y="4598104"/>
+            <a:off x="5818590" y="5707045"/>
             <a:ext cx="421910" cy="184666"/>
           </a:xfrm>
           <a:prstGeom prst="rect">
@@ -7873,7 +7798,7 @@
         </p:nvCxnSpPr>
         <p:spPr>
           <a:xfrm flipH="1" flipV="1">
-            <a:off x="5262959" y="3971964"/>
+            <a:off x="5290477" y="5080907"/>
             <a:ext cx="1303402" cy="123111"/>
           </a:xfrm>
           <a:prstGeom prst="bentConnector4">
@@ -7917,7 +7842,7 @@
         </p:nvCxnSpPr>
         <p:spPr>
           <a:xfrm>
-            <a:off x="6440350" y="4173589"/>
+            <a:off x="6467870" y="5282530"/>
             <a:ext cx="1974395" cy="822986"/>
           </a:xfrm>
           <a:prstGeom prst="straightConnector1">
@@ -7956,7 +7881,7 @@
         </p:nvSpPr>
         <p:spPr>
           <a:xfrm>
-            <a:off x="6862162" y="4218183"/>
+            <a:off x="6889680" y="5327124"/>
             <a:ext cx="405880" cy="184666"/>
           </a:xfrm>
           <a:prstGeom prst="rect">
@@ -7994,7 +7919,7 @@
         </p:nvCxnSpPr>
         <p:spPr>
           <a:xfrm flipH="1" flipV="1">
-            <a:off x="6373755" y="4218187"/>
+            <a:off x="6401275" y="5327130"/>
             <a:ext cx="1239903" cy="1932427"/>
           </a:xfrm>
           <a:prstGeom prst="straightConnector1">
@@ -8033,7 +7958,7 @@
         </p:nvSpPr>
         <p:spPr>
           <a:xfrm>
-            <a:off x="7306308" y="5647655"/>
+            <a:off x="7333826" y="6756596"/>
             <a:ext cx="421910" cy="184666"/>
           </a:xfrm>
           <a:prstGeom prst="rect">
@@ -8069,7 +7994,7 @@
         </p:nvSpPr>
         <p:spPr>
           <a:xfrm>
-            <a:off x="7765973" y="3281241"/>
+            <a:off x="7793493" y="4390184"/>
             <a:ext cx="3122971" cy="246221"/>
           </a:xfrm>
           <a:prstGeom prst="rect">
@@ -8106,7 +8031,7 @@
         </p:nvSpPr>
         <p:spPr>
           <a:xfrm>
-            <a:off x="12687156" y="3042248"/>
+            <a:off x="2360853" y="4305941"/>
             <a:ext cx="2422459" cy="246221"/>
           </a:xfrm>
           <a:prstGeom prst="rect">
@@ -8131,30 +8056,27 @@
       </p:sp>
       <p:cxnSp>
         <p:nvCxnSpPr>
-          <p:cNvPr id="198" name="Conector recto de flecha 32">
-            <a:extLst>
-              <a:ext uri="{FF2B5EF4-FFF2-40B4-BE49-F238E27FC236}">
-                <a16:creationId xmlns:a16="http://schemas.microsoft.com/office/drawing/2014/main" id="{A2687C7F-1468-B243-A69A-A0042CD42053}"/>
+          <p:cNvPr id="199" name="Conector recto de flecha 198">
+            <a:extLst>
+              <a:ext uri="{FF2B5EF4-FFF2-40B4-BE49-F238E27FC236}">
+                <a16:creationId xmlns:a16="http://schemas.microsoft.com/office/drawing/2014/main" id="{C0423E94-FEBA-9144-A2D9-79BAE955E36F}"/>
               </a:ext>
             </a:extLst>
           </p:cNvPr>
           <p:cNvCxnSpPr>
             <a:cxnSpLocks/>
-            <a:stCxn id="197" idx="3"/>
-            <a:endCxn id="197" idx="0"/>
+            <a:stCxn id="136" idx="1"/>
+            <a:endCxn id="197" idx="3"/>
           </p:cNvCxnSpPr>
           <p:nvPr/>
         </p:nvCxnSpPr>
         <p:spPr>
-          <a:xfrm flipH="1" flipV="1">
-            <a:off x="13898386" y="3042248"/>
-            <a:ext cx="1211229" cy="123111"/>
-          </a:xfrm>
-          <a:prstGeom prst="bentConnector4">
-            <a:avLst>
-              <a:gd name="adj1" fmla="val -18873"/>
-              <a:gd name="adj2" fmla="val 285686"/>
-            </a:avLst>
+          <a:xfrm flipH="1">
+            <a:off x="4783312" y="3849264"/>
+            <a:ext cx="2977222" cy="579788"/>
+          </a:xfrm>
+          <a:prstGeom prst="straightConnector1">
+            <a:avLst/>
           </a:prstGeom>
           <a:ln>
             <a:tailEnd type="triangle"/>
@@ -8175,25 +8097,181 @@
           </a:fontRef>
         </p:style>
       </p:cxnSp>
+      <p:sp>
+        <p:nvSpPr>
+          <p:cNvPr id="200" name="CuadroTexto 199">
+            <a:extLst>
+              <a:ext uri="{FF2B5EF4-FFF2-40B4-BE49-F238E27FC236}">
+                <a16:creationId xmlns:a16="http://schemas.microsoft.com/office/drawing/2014/main" id="{0BECF7C0-6ADE-B640-A8A3-412A68759586}"/>
+              </a:ext>
+            </a:extLst>
+          </p:cNvPr>
+          <p:cNvSpPr txBox="1"/>
+          <p:nvPr/>
+        </p:nvSpPr>
+        <p:spPr>
+          <a:xfrm>
+            <a:off x="6989929" y="3726153"/>
+            <a:ext cx="486030" cy="184666"/>
+          </a:xfrm>
+          <a:prstGeom prst="rect">
+            <a:avLst/>
+          </a:prstGeom>
+          <a:noFill/>
+        </p:spPr>
+        <p:txBody>
+          <a:bodyPr wrap="none" rtlCol="0">
+            <a:spAutoFit/>
+          </a:bodyPr>
+          <a:lstStyle/>
+          <a:p>
+            <a:r>
+              <a:rPr lang="es-ES_tradnl" sz="600" dirty="0" err="1"/>
+              <a:t>union</a:t>
+            </a:r>
+            <a:r>
+              <a:rPr lang="es-ES_tradnl" sz="600" dirty="0"/>
+              <a:t> | …</a:t>
+            </a:r>
+            <a:endParaRPr lang="es-ES" sz="600" dirty="0"/>
+          </a:p>
+        </p:txBody>
+      </p:sp>
+      <p:sp>
+        <p:nvSpPr>
+          <p:cNvPr id="202" name="CuadroTexto 201">
+            <a:extLst>
+              <a:ext uri="{FF2B5EF4-FFF2-40B4-BE49-F238E27FC236}">
+                <a16:creationId xmlns:a16="http://schemas.microsoft.com/office/drawing/2014/main" id="{76A5AC4F-0D80-1547-87AF-6648D5A71A25}"/>
+              </a:ext>
+            </a:extLst>
+          </p:cNvPr>
+          <p:cNvSpPr txBox="1"/>
+          <p:nvPr/>
+        </p:nvSpPr>
+        <p:spPr>
+          <a:xfrm>
+            <a:off x="2421271" y="4601252"/>
+            <a:ext cx="486030" cy="184666"/>
+          </a:xfrm>
+          <a:prstGeom prst="rect">
+            <a:avLst/>
+          </a:prstGeom>
+          <a:noFill/>
+        </p:spPr>
+        <p:txBody>
+          <a:bodyPr wrap="none" rtlCol="0">
+            <a:spAutoFit/>
+          </a:bodyPr>
+          <a:lstStyle/>
+          <a:p>
+            <a:r>
+              <a:rPr lang="es-ES_tradnl" sz="600" dirty="0" err="1"/>
+              <a:t>union</a:t>
+            </a:r>
+            <a:r>
+              <a:rPr lang="es-ES_tradnl" sz="600" dirty="0"/>
+              <a:t> | …</a:t>
+            </a:r>
+            <a:endParaRPr lang="es-ES" sz="600" dirty="0"/>
+          </a:p>
+        </p:txBody>
+      </p:sp>
+      <p:sp>
+        <p:nvSpPr>
+          <p:cNvPr id="203" name="CuadroTexto 202">
+            <a:extLst>
+              <a:ext uri="{FF2B5EF4-FFF2-40B4-BE49-F238E27FC236}">
+                <a16:creationId xmlns:a16="http://schemas.microsoft.com/office/drawing/2014/main" id="{4CE51476-EED5-8E44-A3DB-4F82B78145E9}"/>
+              </a:ext>
+            </a:extLst>
+          </p:cNvPr>
+          <p:cNvSpPr txBox="1"/>
+          <p:nvPr/>
+        </p:nvSpPr>
+        <p:spPr>
+          <a:xfrm>
+            <a:off x="920511" y="3243055"/>
+            <a:ext cx="473206" cy="184666"/>
+          </a:xfrm>
+          <a:prstGeom prst="rect">
+            <a:avLst/>
+          </a:prstGeom>
+          <a:noFill/>
+        </p:spPr>
+        <p:txBody>
+          <a:bodyPr wrap="none" rtlCol="0">
+            <a:spAutoFit/>
+          </a:bodyPr>
+          <a:lstStyle/>
+          <a:p>
+            <a:r>
+              <a:rPr lang="es-ES_tradnl" sz="600" dirty="0" err="1"/>
+              <a:t>orderBy</a:t>
+            </a:r>
+            <a:r>
+              <a:rPr lang="es-ES_tradnl" sz="600" dirty="0"/>
+              <a:t>*</a:t>
+            </a:r>
+            <a:endParaRPr lang="es-ES" sz="600" dirty="0"/>
+          </a:p>
+        </p:txBody>
+      </p:sp>
+      <p:sp>
+        <p:nvSpPr>
+          <p:cNvPr id="204" name="CuadroTexto 203">
+            <a:extLst>
+              <a:ext uri="{FF2B5EF4-FFF2-40B4-BE49-F238E27FC236}">
+                <a16:creationId xmlns:a16="http://schemas.microsoft.com/office/drawing/2014/main" id="{F9ABFB57-6512-7940-9EF1-F6753B67001A}"/>
+              </a:ext>
+            </a:extLst>
+          </p:cNvPr>
+          <p:cNvSpPr txBox="1"/>
+          <p:nvPr/>
+        </p:nvSpPr>
+        <p:spPr>
+          <a:xfrm>
+            <a:off x="3710022" y="3666181"/>
+            <a:ext cx="2651688" cy="246221"/>
+          </a:xfrm>
+          <a:prstGeom prst="rect">
+            <a:avLst/>
+          </a:prstGeom>
+          <a:noFill/>
+        </p:spPr>
+        <p:txBody>
+          <a:bodyPr wrap="none" rtlCol="0">
+            <a:spAutoFit/>
+          </a:bodyPr>
+          <a:lstStyle/>
+          <a:p>
+            <a:r>
+              <a:rPr lang="es-ES_tradnl" sz="1000" dirty="0" err="1"/>
+              <a:t>CompoundedOffsetExecutableSelectExpression</a:t>
+            </a:r>
+            <a:endParaRPr lang="es-ES_tradnl" sz="1000" dirty="0"/>
+          </a:p>
+        </p:txBody>
+      </p:sp>
       <p:cxnSp>
         <p:nvCxnSpPr>
-          <p:cNvPr id="199" name="Conector recto de flecha 198">
-            <a:extLst>
-              <a:ext uri="{FF2B5EF4-FFF2-40B4-BE49-F238E27FC236}">
-                <a16:creationId xmlns:a16="http://schemas.microsoft.com/office/drawing/2014/main" id="{C0423E94-FEBA-9144-A2D9-79BAE955E36F}"/>
+          <p:cNvPr id="205" name="Conector recto de flecha 204">
+            <a:extLst>
+              <a:ext uri="{FF2B5EF4-FFF2-40B4-BE49-F238E27FC236}">
+                <a16:creationId xmlns:a16="http://schemas.microsoft.com/office/drawing/2014/main" id="{6D83E2E7-6414-8044-8BD5-806A47E4A964}"/>
               </a:ext>
             </a:extLst>
           </p:cNvPr>
           <p:cNvCxnSpPr>
             <a:cxnSpLocks/>
-            <a:endCxn id="197" idx="1"/>
+            <a:endCxn id="204" idx="1"/>
           </p:cNvCxnSpPr>
           <p:nvPr/>
         </p:nvCxnSpPr>
         <p:spPr>
           <a:xfrm>
-            <a:off x="11945823" y="2891089"/>
-            <a:ext cx="741333" cy="274268"/>
+            <a:off x="3373261" y="3789288"/>
+            <a:ext cx="336767" cy="0"/>
           </a:xfrm>
           <a:prstGeom prst="straightConnector1">
             <a:avLst/>
@@ -8219,10 +8297,10 @@
       </p:cxnSp>
       <p:sp>
         <p:nvSpPr>
-          <p:cNvPr id="200" name="CuadroTexto 199">
-            <a:extLst>
-              <a:ext uri="{FF2B5EF4-FFF2-40B4-BE49-F238E27FC236}">
-                <a16:creationId xmlns:a16="http://schemas.microsoft.com/office/drawing/2014/main" id="{0BECF7C0-6ADE-B640-A8A3-412A68759586}"/>
+          <p:cNvPr id="206" name="CuadroTexto 205">
+            <a:extLst>
+              <a:ext uri="{FF2B5EF4-FFF2-40B4-BE49-F238E27FC236}">
+                <a16:creationId xmlns:a16="http://schemas.microsoft.com/office/drawing/2014/main" id="{FA3933F0-95E7-CC48-AE1D-6E3036A3375D}"/>
               </a:ext>
             </a:extLst>
           </p:cNvPr>
@@ -8231,8 +8309,8 @@
         </p:nvSpPr>
         <p:spPr>
           <a:xfrm>
-            <a:off x="11913414" y="2981054"/>
-            <a:ext cx="486030" cy="184666"/>
+            <a:off x="3368908" y="3614696"/>
+            <a:ext cx="324128" cy="184666"/>
           </a:xfrm>
           <a:prstGeom prst="rect">
             <a:avLst/>
@@ -8247,151 +8325,31 @@
           <a:p>
             <a:r>
               <a:rPr lang="es-ES_tradnl" sz="600" dirty="0" err="1"/>
-              <a:t>union</a:t>
-            </a:r>
-            <a:r>
-              <a:rPr lang="es-ES_tradnl" sz="600" dirty="0"/>
-              <a:t> | …</a:t>
+              <a:t>limit</a:t>
             </a:r>
             <a:endParaRPr lang="es-ES" sz="600" dirty="0"/>
-          </a:p>
-        </p:txBody>
-      </p:sp>
-      <p:sp>
-        <p:nvSpPr>
-          <p:cNvPr id="202" name="CuadroTexto 201">
-            <a:extLst>
-              <a:ext uri="{FF2B5EF4-FFF2-40B4-BE49-F238E27FC236}">
-                <a16:creationId xmlns:a16="http://schemas.microsoft.com/office/drawing/2014/main" id="{76A5AC4F-0D80-1547-87AF-6648D5A71A25}"/>
-              </a:ext>
-            </a:extLst>
-          </p:cNvPr>
-          <p:cNvSpPr txBox="1"/>
-          <p:nvPr/>
-        </p:nvSpPr>
-        <p:spPr>
-          <a:xfrm>
-            <a:off x="14215432" y="2634769"/>
-            <a:ext cx="486030" cy="184666"/>
-          </a:xfrm>
-          <a:prstGeom prst="rect">
-            <a:avLst/>
-          </a:prstGeom>
-          <a:noFill/>
-        </p:spPr>
-        <p:txBody>
-          <a:bodyPr wrap="none" rtlCol="0">
-            <a:spAutoFit/>
-          </a:bodyPr>
-          <a:lstStyle/>
-          <a:p>
-            <a:r>
-              <a:rPr lang="es-ES_tradnl" sz="600" dirty="0" err="1"/>
-              <a:t>union</a:t>
-            </a:r>
-            <a:r>
-              <a:rPr lang="es-ES_tradnl" sz="600" dirty="0"/>
-              <a:t> | …</a:t>
-            </a:r>
-            <a:endParaRPr lang="es-ES" sz="600" dirty="0"/>
-          </a:p>
-        </p:txBody>
-      </p:sp>
-      <p:sp>
-        <p:nvSpPr>
-          <p:cNvPr id="203" name="CuadroTexto 202">
-            <a:extLst>
-              <a:ext uri="{FF2B5EF4-FFF2-40B4-BE49-F238E27FC236}">
-                <a16:creationId xmlns:a16="http://schemas.microsoft.com/office/drawing/2014/main" id="{4CE51476-EED5-8E44-A3DB-4F82B78145E9}"/>
-              </a:ext>
-            </a:extLst>
-          </p:cNvPr>
-          <p:cNvSpPr txBox="1"/>
-          <p:nvPr/>
-        </p:nvSpPr>
-        <p:spPr>
-          <a:xfrm>
-            <a:off x="11246816" y="1740208"/>
-            <a:ext cx="473206" cy="184666"/>
-          </a:xfrm>
-          <a:prstGeom prst="rect">
-            <a:avLst/>
-          </a:prstGeom>
-          <a:noFill/>
-        </p:spPr>
-        <p:txBody>
-          <a:bodyPr wrap="none" rtlCol="0">
-            <a:spAutoFit/>
-          </a:bodyPr>
-          <a:lstStyle/>
-          <a:p>
-            <a:r>
-              <a:rPr lang="es-ES_tradnl" sz="600" dirty="0" err="1"/>
-              <a:t>orderBy</a:t>
-            </a:r>
-            <a:r>
-              <a:rPr lang="es-ES_tradnl" sz="600" dirty="0"/>
-              <a:t>*</a:t>
-            </a:r>
-            <a:endParaRPr lang="es-ES" sz="600" dirty="0"/>
-          </a:p>
-        </p:txBody>
-      </p:sp>
-      <p:sp>
-        <p:nvSpPr>
-          <p:cNvPr id="204" name="CuadroTexto 203">
-            <a:extLst>
-              <a:ext uri="{FF2B5EF4-FFF2-40B4-BE49-F238E27FC236}">
-                <a16:creationId xmlns:a16="http://schemas.microsoft.com/office/drawing/2014/main" id="{F9ABFB57-6512-7940-9EF1-F6753B67001A}"/>
-              </a:ext>
-            </a:extLst>
-          </p:cNvPr>
-          <p:cNvSpPr txBox="1"/>
-          <p:nvPr/>
-        </p:nvSpPr>
-        <p:spPr>
-          <a:xfrm>
-            <a:off x="14036327" y="2163332"/>
-            <a:ext cx="2651688" cy="246221"/>
-          </a:xfrm>
-          <a:prstGeom prst="rect">
-            <a:avLst/>
-          </a:prstGeom>
-          <a:noFill/>
-        </p:spPr>
-        <p:txBody>
-          <a:bodyPr wrap="none" rtlCol="0">
-            <a:spAutoFit/>
-          </a:bodyPr>
-          <a:lstStyle/>
-          <a:p>
-            <a:r>
-              <a:rPr lang="es-ES_tradnl" sz="1000" dirty="0" err="1"/>
-              <a:t>CompoundedOffsetExecutableSelectExpression</a:t>
-            </a:r>
-            <a:endParaRPr lang="es-ES_tradnl" sz="1000" dirty="0"/>
           </a:p>
         </p:txBody>
       </p:sp>
       <p:cxnSp>
         <p:nvCxnSpPr>
-          <p:cNvPr id="205" name="Conector recto de flecha 204">
-            <a:extLst>
-              <a:ext uri="{FF2B5EF4-FFF2-40B4-BE49-F238E27FC236}">
-                <a16:creationId xmlns:a16="http://schemas.microsoft.com/office/drawing/2014/main" id="{6D83E2E7-6414-8044-8BD5-806A47E4A964}"/>
+          <p:cNvPr id="207" name="Conector recto de flecha 206">
+            <a:extLst>
+              <a:ext uri="{FF2B5EF4-FFF2-40B4-BE49-F238E27FC236}">
+                <a16:creationId xmlns:a16="http://schemas.microsoft.com/office/drawing/2014/main" id="{5C5B6FB1-ED8B-B344-A53E-918564D13161}"/>
               </a:ext>
             </a:extLst>
           </p:cNvPr>
           <p:cNvCxnSpPr>
             <a:cxnSpLocks/>
-            <a:endCxn id="204" idx="1"/>
+            <a:stCxn id="204" idx="0"/>
           </p:cNvCxnSpPr>
           <p:nvPr/>
         </p:nvCxnSpPr>
         <p:spPr>
-          <a:xfrm>
-            <a:off x="13699564" y="2286441"/>
-            <a:ext cx="336767" cy="0"/>
+          <a:xfrm flipH="1" flipV="1">
+            <a:off x="4597638" y="3249637"/>
+            <a:ext cx="438228" cy="416544"/>
           </a:xfrm>
           <a:prstGeom prst="straightConnector1">
             <a:avLst/>
@@ -8417,10 +8375,10 @@
       </p:cxnSp>
       <p:sp>
         <p:nvSpPr>
-          <p:cNvPr id="206" name="CuadroTexto 205">
-            <a:extLst>
-              <a:ext uri="{FF2B5EF4-FFF2-40B4-BE49-F238E27FC236}">
-                <a16:creationId xmlns:a16="http://schemas.microsoft.com/office/drawing/2014/main" id="{FA3933F0-95E7-CC48-AE1D-6E3036A3375D}"/>
+          <p:cNvPr id="208" name="CuadroTexto 207">
+            <a:extLst>
+              <a:ext uri="{FF2B5EF4-FFF2-40B4-BE49-F238E27FC236}">
+                <a16:creationId xmlns:a16="http://schemas.microsoft.com/office/drawing/2014/main" id="{E9A9C022-ABBC-1947-A226-AB79CBEC2A87}"/>
               </a:ext>
             </a:extLst>
           </p:cNvPr>
@@ -8429,85 +8387,7 @@
         </p:nvSpPr>
         <p:spPr>
           <a:xfrm>
-            <a:off x="13695213" y="2111849"/>
-            <a:ext cx="324128" cy="184666"/>
-          </a:xfrm>
-          <a:prstGeom prst="rect">
-            <a:avLst/>
-          </a:prstGeom>
-          <a:noFill/>
-        </p:spPr>
-        <p:txBody>
-          <a:bodyPr wrap="none" rtlCol="0">
-            <a:spAutoFit/>
-          </a:bodyPr>
-          <a:lstStyle/>
-          <a:p>
-            <a:r>
-              <a:rPr lang="es-ES_tradnl" sz="600" dirty="0" err="1"/>
-              <a:t>limit</a:t>
-            </a:r>
-            <a:endParaRPr lang="es-ES" sz="600" dirty="0"/>
-          </a:p>
-        </p:txBody>
-      </p:sp>
-      <p:cxnSp>
-        <p:nvCxnSpPr>
-          <p:cNvPr id="207" name="Conector recto de flecha 206">
-            <a:extLst>
-              <a:ext uri="{FF2B5EF4-FFF2-40B4-BE49-F238E27FC236}">
-                <a16:creationId xmlns:a16="http://schemas.microsoft.com/office/drawing/2014/main" id="{5C5B6FB1-ED8B-B344-A53E-918564D13161}"/>
-              </a:ext>
-            </a:extLst>
-          </p:cNvPr>
-          <p:cNvCxnSpPr>
-            <a:cxnSpLocks/>
-            <a:stCxn id="204" idx="0"/>
-          </p:cNvCxnSpPr>
-          <p:nvPr/>
-        </p:nvCxnSpPr>
-        <p:spPr>
-          <a:xfrm flipH="1" flipV="1">
-            <a:off x="14597115" y="1897900"/>
-            <a:ext cx="765056" cy="265430"/>
-          </a:xfrm>
-          <a:prstGeom prst="straightConnector1">
-            <a:avLst/>
-          </a:prstGeom>
-          <a:ln>
-            <a:tailEnd type="triangle"/>
-          </a:ln>
-        </p:spPr>
-        <p:style>
-          <a:lnRef idx="1">
-            <a:schemeClr val="accent1"/>
-          </a:lnRef>
-          <a:fillRef idx="0">
-            <a:schemeClr val="accent1"/>
-          </a:fillRef>
-          <a:effectRef idx="0">
-            <a:schemeClr val="accent1"/>
-          </a:effectRef>
-          <a:fontRef idx="minor">
-            <a:schemeClr val="tx1"/>
-          </a:fontRef>
-        </p:style>
-      </p:cxnSp>
-      <p:sp>
-        <p:nvSpPr>
-          <p:cNvPr id="208" name="CuadroTexto 207">
-            <a:extLst>
-              <a:ext uri="{FF2B5EF4-FFF2-40B4-BE49-F238E27FC236}">
-                <a16:creationId xmlns:a16="http://schemas.microsoft.com/office/drawing/2014/main" id="{E9A9C022-ABBC-1947-A226-AB79CBEC2A87}"/>
-              </a:ext>
-            </a:extLst>
-          </p:cNvPr>
-          <p:cNvSpPr txBox="1"/>
-          <p:nvPr/>
-        </p:nvSpPr>
-        <p:spPr>
-          <a:xfrm>
-            <a:off x="14978351" y="1889503"/>
+            <a:off x="4911709" y="3364214"/>
             <a:ext cx="367408" cy="184666"/>
           </a:xfrm>
           <a:prstGeom prst="rect">
@@ -8546,8 +8426,8 @@
         </p:nvCxnSpPr>
         <p:spPr>
           <a:xfrm flipH="1">
-            <a:off x="13006242" y="1882716"/>
-            <a:ext cx="1271258" cy="276599"/>
+            <a:off x="2679668" y="3230817"/>
+            <a:ext cx="1271527" cy="342377"/>
           </a:xfrm>
           <a:prstGeom prst="straightConnector1">
             <a:avLst/>
@@ -8588,8 +8468,8 @@
         </p:nvCxnSpPr>
         <p:spPr>
           <a:xfrm>
-            <a:off x="14277500" y="1882716"/>
-            <a:ext cx="201522" cy="229135"/>
+            <a:off x="3951195" y="3230817"/>
+            <a:ext cx="348599" cy="418563"/>
           </a:xfrm>
           <a:prstGeom prst="straightConnector1">
             <a:avLst/>
@@ -8629,7 +8509,7 @@
         </p:nvCxnSpPr>
         <p:spPr>
           <a:xfrm rot="16200000" flipH="1" flipV="1">
-            <a:off x="11446868" y="1686369"/>
+            <a:off x="1120565" y="3189216"/>
             <a:ext cx="123111" cy="1030090"/>
           </a:xfrm>
           <a:prstGeom prst="bentConnector4">
@@ -8671,7 +8551,7 @@
         </p:nvSpPr>
         <p:spPr>
           <a:xfrm>
-            <a:off x="10971186" y="2131932"/>
+            <a:off x="644881" y="3634781"/>
             <a:ext cx="2767104" cy="246221"/>
           </a:xfrm>
           <a:prstGeom prst="rect">
@@ -8708,7 +8588,7 @@
         </p:nvSpPr>
         <p:spPr>
           <a:xfrm>
-            <a:off x="13039821" y="1636495"/>
+            <a:off x="2713516" y="2984596"/>
             <a:ext cx="2475358" cy="246221"/>
           </a:xfrm>
           <a:prstGeom prst="rect">
@@ -8742,13 +8622,14 @@
           <p:cNvCxnSpPr>
             <a:cxnSpLocks/>
             <a:stCxn id="65" idx="2"/>
+            <a:endCxn id="213" idx="3"/>
           </p:cNvCxnSpPr>
           <p:nvPr/>
         </p:nvCxnSpPr>
         <p:spPr>
-          <a:xfrm>
-            <a:off x="9715914" y="957500"/>
-            <a:ext cx="3250985" cy="667756"/>
+          <a:xfrm flipH="1">
+            <a:off x="5188874" y="2066445"/>
+            <a:ext cx="3626087" cy="1041262"/>
           </a:xfrm>
           <a:prstGeom prst="straightConnector1">
             <a:avLst/>
@@ -8783,13 +8664,14 @@
           </p:cNvPr>
           <p:cNvCxnSpPr>
             <a:cxnSpLocks/>
+            <a:stCxn id="213" idx="0"/>
           </p:cNvCxnSpPr>
           <p:nvPr/>
         </p:nvCxnSpPr>
         <p:spPr>
-          <a:xfrm flipH="1" flipV="1">
-            <a:off x="10458533" y="945648"/>
-            <a:ext cx="4086219" cy="706032"/>
+          <a:xfrm flipV="1">
+            <a:off x="3951195" y="2066445"/>
+            <a:ext cx="4092561" cy="918151"/>
           </a:xfrm>
           <a:prstGeom prst="straightConnector1">
             <a:avLst/>
@@ -8827,7 +8709,7 @@
         </p:nvSpPr>
         <p:spPr>
           <a:xfrm>
-            <a:off x="13881255" y="1329769"/>
+            <a:off x="4076614" y="2537189"/>
             <a:ext cx="692818" cy="184666"/>
           </a:xfrm>
           <a:prstGeom prst="rect">
@@ -8860,14 +8742,13 @@
           </p:cNvPr>
           <p:cNvCxnSpPr>
             <a:cxnSpLocks/>
-            <a:stCxn id="212" idx="2"/>
           </p:cNvCxnSpPr>
           <p:nvPr/>
         </p:nvCxnSpPr>
         <p:spPr>
           <a:xfrm>
-            <a:off x="12354738" y="2378151"/>
-            <a:ext cx="867316" cy="676314"/>
+            <a:off x="3072653" y="3875162"/>
+            <a:ext cx="225568" cy="404466"/>
           </a:xfrm>
           <a:prstGeom prst="straightConnector1">
             <a:avLst/>
@@ -8902,14 +8783,13 @@
           </p:cNvPr>
           <p:cNvCxnSpPr>
             <a:cxnSpLocks/>
-            <a:endCxn id="196" idx="0"/>
           </p:cNvCxnSpPr>
           <p:nvPr/>
         </p:nvCxnSpPr>
         <p:spPr>
-          <a:xfrm flipH="1">
-            <a:off x="9327455" y="2878120"/>
-            <a:ext cx="523588" cy="403121"/>
+          <a:xfrm>
+            <a:off x="8471321" y="3950469"/>
+            <a:ext cx="0" cy="457125"/>
           </a:xfrm>
           <a:prstGeom prst="straightConnector1">
             <a:avLst/>
@@ -8947,7 +8827,7 @@
         </p:nvSpPr>
         <p:spPr>
           <a:xfrm>
-            <a:off x="9780636" y="3006728"/>
+            <a:off x="9497565" y="4112827"/>
             <a:ext cx="692818" cy="184666"/>
           </a:xfrm>
           <a:prstGeom prst="rect">
@@ -8985,8 +8865,8 @@
         </p:nvCxnSpPr>
         <p:spPr>
           <a:xfrm flipV="1">
-            <a:off x="10315705" y="2890261"/>
-            <a:ext cx="235982" cy="386498"/>
+            <a:off x="9516282" y="3982531"/>
+            <a:ext cx="0" cy="447814"/>
           </a:xfrm>
           <a:prstGeom prst="straightConnector1">
             <a:avLst/>
@@ -9027,7 +8907,7 @@
         </p:nvCxnSpPr>
         <p:spPr>
           <a:xfrm>
-            <a:off x="9715910" y="957500"/>
+            <a:off x="8814961" y="2066441"/>
             <a:ext cx="786376" cy="1681552"/>
           </a:xfrm>
           <a:prstGeom prst="straightConnector1">
@@ -9066,7 +8946,7 @@
         </p:nvSpPr>
         <p:spPr>
           <a:xfrm>
-            <a:off x="14262216" y="6286462"/>
+            <a:off x="14289736" y="7395405"/>
             <a:ext cx="2845651" cy="246221"/>
           </a:xfrm>
           <a:prstGeom prst="rect">
@@ -9103,7 +8983,7 @@
         </p:nvSpPr>
         <p:spPr>
           <a:xfrm>
-            <a:off x="15919969" y="6713387"/>
+            <a:off x="15947487" y="7822328"/>
             <a:ext cx="473206" cy="184666"/>
           </a:xfrm>
           <a:prstGeom prst="rect">
@@ -9146,7 +9026,7 @@
         </p:nvCxnSpPr>
         <p:spPr>
           <a:xfrm flipH="1" flipV="1">
-            <a:off x="13021614" y="5832321"/>
+            <a:off x="13049132" y="6941264"/>
             <a:ext cx="1960024" cy="1217907"/>
           </a:xfrm>
           <a:prstGeom prst="straightConnector1">
@@ -9185,7 +9065,7 @@
         </p:nvSpPr>
         <p:spPr>
           <a:xfrm>
-            <a:off x="14586415" y="6756864"/>
+            <a:off x="14613933" y="7865805"/>
             <a:ext cx="421910" cy="184666"/>
           </a:xfrm>
           <a:prstGeom prst="rect">
@@ -9221,7 +9101,7 @@
         </p:nvSpPr>
         <p:spPr>
           <a:xfrm>
-            <a:off x="14593028" y="5639929"/>
+            <a:off x="14620548" y="6748872"/>
             <a:ext cx="2730235" cy="246221"/>
           </a:xfrm>
           <a:prstGeom prst="rect">
@@ -9259,7 +9139,7 @@
         </p:nvCxnSpPr>
         <p:spPr>
           <a:xfrm flipH="1" flipV="1">
-            <a:off x="14776212" y="4402849"/>
+            <a:off x="14803732" y="5511790"/>
             <a:ext cx="404151" cy="647402"/>
           </a:xfrm>
           <a:prstGeom prst="straightConnector1">
@@ -9300,7 +9180,7 @@
         </p:nvCxnSpPr>
         <p:spPr>
           <a:xfrm flipV="1">
-            <a:off x="15005767" y="5917535"/>
+            <a:off x="15033287" y="7026478"/>
             <a:ext cx="11241" cy="391925"/>
           </a:xfrm>
           <a:prstGeom prst="straightConnector1">
@@ -9339,7 +9219,7 @@
         </p:nvSpPr>
         <p:spPr>
           <a:xfrm>
-            <a:off x="14983417" y="6040936"/>
+            <a:off x="15010935" y="7149877"/>
             <a:ext cx="324128" cy="184666"/>
           </a:xfrm>
           <a:prstGeom prst="rect">
@@ -9375,7 +9255,7 @@
         </p:nvSpPr>
         <p:spPr>
           <a:xfrm>
-            <a:off x="14776212" y="5029642"/>
+            <a:off x="14803730" y="6138585"/>
             <a:ext cx="3025188" cy="246221"/>
           </a:xfrm>
           <a:prstGeom prst="rect">
@@ -9414,7 +9294,7 @@
         </p:nvCxnSpPr>
         <p:spPr>
           <a:xfrm flipV="1">
-            <a:off x="10808733" y="3427564"/>
+            <a:off x="10836253" y="4536507"/>
             <a:ext cx="6040435" cy="6541"/>
           </a:xfrm>
           <a:prstGeom prst="straightConnector1">
@@ -9455,7 +9335,7 @@
         </p:nvCxnSpPr>
         <p:spPr>
           <a:xfrm flipV="1">
-            <a:off x="15128906" y="5267406"/>
+            <a:off x="15156426" y="6376347"/>
             <a:ext cx="1" cy="382674"/>
           </a:xfrm>
           <a:prstGeom prst="straightConnector1">
@@ -9494,7 +9374,7 @@
         </p:nvSpPr>
         <p:spPr>
           <a:xfrm>
-            <a:off x="15101634" y="5370118"/>
+            <a:off x="15129152" y="6479059"/>
             <a:ext cx="367408" cy="184666"/>
           </a:xfrm>
           <a:prstGeom prst="rect">
@@ -9530,7 +9410,7 @@
         </p:nvSpPr>
         <p:spPr>
           <a:xfrm>
-            <a:off x="14894938" y="4598104"/>
+            <a:off x="14922456" y="5707045"/>
             <a:ext cx="421910" cy="184666"/>
           </a:xfrm>
           <a:prstGeom prst="rect">
@@ -9566,7 +9446,7 @@
         </p:nvSpPr>
         <p:spPr>
           <a:xfrm>
-            <a:off x="10350754" y="7573604"/>
+            <a:off x="10378272" y="8682547"/>
             <a:ext cx="2871300" cy="246221"/>
           </a:xfrm>
           <a:prstGeom prst="rect">
@@ -9603,7 +9483,7 @@
         </p:nvSpPr>
         <p:spPr>
           <a:xfrm>
-            <a:off x="14981638" y="6927117"/>
+            <a:off x="15009156" y="8036060"/>
             <a:ext cx="2848858" cy="246221"/>
           </a:xfrm>
           <a:prstGeom prst="rect">
@@ -9642,7 +9522,7 @@
         </p:nvCxnSpPr>
         <p:spPr>
           <a:xfrm>
-            <a:off x="15932220" y="6587523"/>
+            <a:off x="15959738" y="7696466"/>
             <a:ext cx="0" cy="403417"/>
           </a:xfrm>
           <a:prstGeom prst="straightConnector1">
@@ -9681,7 +9561,7 @@
         </p:nvCxnSpPr>
         <p:spPr>
           <a:xfrm flipH="1">
-            <a:off x="16538509" y="7042961"/>
+            <a:off x="16566027" y="8151902"/>
             <a:ext cx="1216038" cy="123110"/>
           </a:xfrm>
           <a:prstGeom prst="bentConnector4">
@@ -9723,7 +9603,7 @@
         </p:nvSpPr>
         <p:spPr>
           <a:xfrm>
-            <a:off x="17131748" y="7190565"/>
+            <a:off x="17159266" y="8299506"/>
             <a:ext cx="473206" cy="184666"/>
           </a:xfrm>
           <a:prstGeom prst="rect">
@@ -9765,7 +9645,7 @@
         </p:nvCxnSpPr>
         <p:spPr>
           <a:xfrm flipV="1">
-            <a:off x="17075863" y="5908117"/>
+            <a:off x="17103381" y="7017058"/>
             <a:ext cx="0" cy="1010942"/>
           </a:xfrm>
           <a:prstGeom prst="straightConnector1">
@@ -9804,7 +9684,7 @@
         </p:nvSpPr>
         <p:spPr>
           <a:xfrm>
-            <a:off x="17053517" y="6650536"/>
+            <a:off x="17081035" y="7759477"/>
             <a:ext cx="324128" cy="184666"/>
           </a:xfrm>
           <a:prstGeom prst="rect">
@@ -9842,7 +9722,7 @@
         </p:nvCxnSpPr>
         <p:spPr>
           <a:xfrm>
-            <a:off x="16835716" y="3446772"/>
+            <a:off x="16863234" y="4555713"/>
             <a:ext cx="0" cy="3544166"/>
           </a:xfrm>
           <a:prstGeom prst="straightConnector1">
@@ -9883,7 +9763,7 @@
         </p:nvCxnSpPr>
         <p:spPr>
           <a:xfrm>
-            <a:off x="15808065" y="3431132"/>
+            <a:off x="15835583" y="4540073"/>
             <a:ext cx="0" cy="1645652"/>
           </a:xfrm>
           <a:prstGeom prst="straightConnector1">
@@ -9924,7 +9804,7 @@
         </p:nvCxnSpPr>
         <p:spPr>
           <a:xfrm>
-            <a:off x="16082645" y="3435198"/>
+            <a:off x="16110163" y="4544141"/>
             <a:ext cx="0" cy="2212457"/>
           </a:xfrm>
           <a:prstGeom prst="straightConnector1">
@@ -9965,7 +9845,7 @@
         </p:nvCxnSpPr>
         <p:spPr>
           <a:xfrm>
-            <a:off x="16376017" y="3425997"/>
+            <a:off x="16403535" y="4534940"/>
             <a:ext cx="0" cy="2876991"/>
           </a:xfrm>
           <a:prstGeom prst="straightConnector1">
@@ -10004,7 +9884,7 @@
         </p:nvSpPr>
         <p:spPr>
           <a:xfrm>
-            <a:off x="11434790" y="5548855"/>
+            <a:off x="11462310" y="6657798"/>
             <a:ext cx="2749471" cy="246221"/>
           </a:xfrm>
           <a:prstGeom prst="rect">
@@ -10042,7 +9922,7 @@
         </p:nvCxnSpPr>
         <p:spPr>
           <a:xfrm flipH="1" flipV="1">
-            <a:off x="12862173" y="5558153"/>
+            <a:off x="12889693" y="6667096"/>
             <a:ext cx="1211229" cy="123111"/>
           </a:xfrm>
           <a:prstGeom prst="bentConnector4">
@@ -10084,7 +9964,7 @@
         </p:nvSpPr>
         <p:spPr>
           <a:xfrm>
-            <a:off x="13672404" y="5165753"/>
+            <a:off x="13699922" y="6274694"/>
             <a:ext cx="404278" cy="184666"/>
           </a:xfrm>
           <a:prstGeom prst="rect">
@@ -10122,7 +10002,7 @@
         </p:nvCxnSpPr>
         <p:spPr>
           <a:xfrm>
-            <a:off x="10487115" y="3547112"/>
+            <a:off x="10514635" y="4656055"/>
             <a:ext cx="1778007" cy="2066931"/>
           </a:xfrm>
           <a:prstGeom prst="straightConnector1">
@@ -10161,7 +10041,7 @@
         </p:nvSpPr>
         <p:spPr>
           <a:xfrm>
-            <a:off x="11187060" y="4149837"/>
+            <a:off x="11214578" y="5258780"/>
             <a:ext cx="3927678" cy="246221"/>
           </a:xfrm>
           <a:prstGeom prst="rect">
@@ -10201,7 +10081,7 @@
         </p:nvCxnSpPr>
         <p:spPr>
           <a:xfrm>
-            <a:off x="10791160" y="3505561"/>
+            <a:off x="10818680" y="4614502"/>
             <a:ext cx="2359739" cy="644276"/>
           </a:xfrm>
           <a:prstGeom prst="straightConnector1">
@@ -10242,7 +10122,7 @@
         </p:nvCxnSpPr>
         <p:spPr>
           <a:xfrm flipH="1" flipV="1">
-            <a:off x="13960996" y="4402850"/>
+            <a:off x="13988514" y="5511791"/>
             <a:ext cx="815216" cy="1270150"/>
           </a:xfrm>
           <a:prstGeom prst="straightConnector1">
@@ -10281,7 +10161,7 @@
         </p:nvSpPr>
         <p:spPr>
           <a:xfrm>
-            <a:off x="14363118" y="4973316"/>
+            <a:off x="14390636" y="6082257"/>
             <a:ext cx="421910" cy="184666"/>
           </a:xfrm>
           <a:prstGeom prst="rect">
@@ -10320,7 +10200,7 @@
         </p:nvCxnSpPr>
         <p:spPr>
           <a:xfrm flipH="1" flipV="1">
-            <a:off x="11425214" y="5200008"/>
+            <a:off x="11452732" y="6308949"/>
             <a:ext cx="284624" cy="400546"/>
           </a:xfrm>
           <a:prstGeom prst="straightConnector1">
@@ -10359,7 +10239,7 @@
         </p:nvSpPr>
         <p:spPr>
           <a:xfrm>
-            <a:off x="11263149" y="5332884"/>
+            <a:off x="11290667" y="6441825"/>
             <a:ext cx="324128" cy="184666"/>
           </a:xfrm>
           <a:prstGeom prst="rect">
@@ -10381,6 +10261,231 @@
           </a:p>
         </p:txBody>
       </p:sp>
+      <p:sp>
+        <p:nvSpPr>
+          <p:cNvPr id="16" name="Estrella de 5 puntas 15">
+            <a:extLst>
+              <a:ext uri="{FF2B5EF4-FFF2-40B4-BE49-F238E27FC236}">
+                <a16:creationId xmlns:a16="http://schemas.microsoft.com/office/drawing/2014/main" id="{67E44379-0784-0B49-8217-161119CA2EDB}"/>
+              </a:ext>
+            </a:extLst>
+          </p:cNvPr>
+          <p:cNvSpPr/>
+          <p:nvPr/>
+        </p:nvSpPr>
+        <p:spPr>
+          <a:xfrm>
+            <a:off x="667166" y="7534725"/>
+            <a:ext cx="537005" cy="421952"/>
+          </a:xfrm>
+          <a:prstGeom prst="star5">
+            <a:avLst/>
+          </a:prstGeom>
+        </p:spPr>
+        <p:style>
+          <a:lnRef idx="2">
+            <a:schemeClr val="accent1">
+              <a:shade val="50000"/>
+            </a:schemeClr>
+          </a:lnRef>
+          <a:fillRef idx="1">
+            <a:schemeClr val="accent1"/>
+          </a:fillRef>
+          <a:effectRef idx="0">
+            <a:schemeClr val="accent1"/>
+          </a:effectRef>
+          <a:fontRef idx="minor">
+            <a:schemeClr val="lt1"/>
+          </a:fontRef>
+        </p:style>
+        <p:txBody>
+          <a:bodyPr rtlCol="0" anchor="ctr"/>
+          <a:lstStyle/>
+          <a:p>
+            <a:pPr algn="ctr"/>
+            <a:endParaRPr lang="es-ES"/>
+          </a:p>
+        </p:txBody>
+      </p:sp>
+      <p:sp>
+        <p:nvSpPr>
+          <p:cNvPr id="221" name="Estrella de 5 puntas 220">
+            <a:extLst>
+              <a:ext uri="{FF2B5EF4-FFF2-40B4-BE49-F238E27FC236}">
+                <a16:creationId xmlns:a16="http://schemas.microsoft.com/office/drawing/2014/main" id="{BC2814BB-675E-0C43-8596-34ECC560699D}"/>
+              </a:ext>
+            </a:extLst>
+          </p:cNvPr>
+          <p:cNvSpPr/>
+          <p:nvPr/>
+        </p:nvSpPr>
+        <p:spPr>
+          <a:xfrm>
+            <a:off x="2302478" y="11000340"/>
+            <a:ext cx="537005" cy="421952"/>
+          </a:xfrm>
+          <a:prstGeom prst="star5">
+            <a:avLst/>
+          </a:prstGeom>
+        </p:spPr>
+        <p:style>
+          <a:lnRef idx="2">
+            <a:schemeClr val="accent1">
+              <a:shade val="50000"/>
+            </a:schemeClr>
+          </a:lnRef>
+          <a:fillRef idx="1">
+            <a:schemeClr val="accent1"/>
+          </a:fillRef>
+          <a:effectRef idx="0">
+            <a:schemeClr val="accent1"/>
+          </a:effectRef>
+          <a:fontRef idx="minor">
+            <a:schemeClr val="lt1"/>
+          </a:fontRef>
+        </p:style>
+        <p:txBody>
+          <a:bodyPr rtlCol="0" anchor="ctr"/>
+          <a:lstStyle/>
+          <a:p>
+            <a:pPr algn="ctr"/>
+            <a:endParaRPr lang="es-ES"/>
+          </a:p>
+        </p:txBody>
+      </p:sp>
+      <p:sp>
+        <p:nvSpPr>
+          <p:cNvPr id="222" name="Estrella de 5 puntas 221">
+            <a:extLst>
+              <a:ext uri="{FF2B5EF4-FFF2-40B4-BE49-F238E27FC236}">
+                <a16:creationId xmlns:a16="http://schemas.microsoft.com/office/drawing/2014/main" id="{21DF5F9C-638E-1343-8DED-E79104514A32}"/>
+              </a:ext>
+            </a:extLst>
+          </p:cNvPr>
+          <p:cNvSpPr/>
+          <p:nvPr/>
+        </p:nvSpPr>
+        <p:spPr>
+          <a:xfrm>
+            <a:off x="700232" y="11428944"/>
+            <a:ext cx="537005" cy="421952"/>
+          </a:xfrm>
+          <a:prstGeom prst="star5">
+            <a:avLst/>
+          </a:prstGeom>
+        </p:spPr>
+        <p:style>
+          <a:lnRef idx="2">
+            <a:schemeClr val="accent1">
+              <a:shade val="50000"/>
+            </a:schemeClr>
+          </a:lnRef>
+          <a:fillRef idx="1">
+            <a:schemeClr val="accent1"/>
+          </a:fillRef>
+          <a:effectRef idx="0">
+            <a:schemeClr val="accent1"/>
+          </a:effectRef>
+          <a:fontRef idx="minor">
+            <a:schemeClr val="lt1"/>
+          </a:fontRef>
+        </p:style>
+        <p:txBody>
+          <a:bodyPr rtlCol="0" anchor="ctr"/>
+          <a:lstStyle/>
+          <a:p>
+            <a:pPr algn="ctr"/>
+            <a:endParaRPr lang="es-ES"/>
+          </a:p>
+        </p:txBody>
+      </p:sp>
+      <p:cxnSp>
+        <p:nvCxnSpPr>
+          <p:cNvPr id="224" name="Conector recto de flecha 98">
+            <a:extLst>
+              <a:ext uri="{FF2B5EF4-FFF2-40B4-BE49-F238E27FC236}">
+                <a16:creationId xmlns:a16="http://schemas.microsoft.com/office/drawing/2014/main" id="{4CE749E2-6772-7847-980C-65EE84E6C410}"/>
+              </a:ext>
+            </a:extLst>
+          </p:cNvPr>
+          <p:cNvCxnSpPr>
+            <a:cxnSpLocks/>
+          </p:cNvCxnSpPr>
+          <p:nvPr/>
+        </p:nvCxnSpPr>
+        <p:spPr>
+          <a:xfrm rot="10800000" flipH="1" flipV="1">
+            <a:off x="2469497" y="4444159"/>
+            <a:ext cx="686865" cy="123110"/>
+          </a:xfrm>
+          <a:prstGeom prst="bentConnector4">
+            <a:avLst>
+              <a:gd name="adj1" fmla="val -33282"/>
+              <a:gd name="adj2" fmla="val 285688"/>
+            </a:avLst>
+          </a:prstGeom>
+          <a:ln>
+            <a:tailEnd type="triangle"/>
+          </a:ln>
+        </p:spPr>
+        <p:style>
+          <a:lnRef idx="1">
+            <a:schemeClr val="accent1"/>
+          </a:lnRef>
+          <a:fillRef idx="0">
+            <a:schemeClr val="accent1"/>
+          </a:fillRef>
+          <a:effectRef idx="0">
+            <a:schemeClr val="accent1"/>
+          </a:effectRef>
+          <a:fontRef idx="minor">
+            <a:schemeClr val="tx1"/>
+          </a:fontRef>
+        </p:style>
+      </p:cxnSp>
+      <p:cxnSp>
+        <p:nvCxnSpPr>
+          <p:cNvPr id="229" name="Conector recto de flecha 228">
+            <a:extLst>
+              <a:ext uri="{FF2B5EF4-FFF2-40B4-BE49-F238E27FC236}">
+                <a16:creationId xmlns:a16="http://schemas.microsoft.com/office/drawing/2014/main" id="{078674EC-1841-A346-84EE-6B88F6BDA658}"/>
+              </a:ext>
+            </a:extLst>
+          </p:cNvPr>
+          <p:cNvCxnSpPr>
+            <a:cxnSpLocks/>
+            <a:endCxn id="186" idx="0"/>
+          </p:cNvCxnSpPr>
+          <p:nvPr/>
+        </p:nvCxnSpPr>
+        <p:spPr>
+          <a:xfrm flipH="1">
+            <a:off x="2172752" y="7870450"/>
+            <a:ext cx="1349634" cy="969232"/>
+          </a:xfrm>
+          <a:prstGeom prst="straightConnector1">
+            <a:avLst/>
+          </a:prstGeom>
+          <a:ln>
+            <a:headEnd type="none" w="med" len="med"/>
+            <a:tailEnd type="arrow" w="med" len="med"/>
+          </a:ln>
+        </p:spPr>
+        <p:style>
+          <a:lnRef idx="3">
+            <a:schemeClr val="accent2"/>
+          </a:lnRef>
+          <a:fillRef idx="0">
+            <a:schemeClr val="accent2"/>
+          </a:fillRef>
+          <a:effectRef idx="2">
+            <a:schemeClr val="accent2"/>
+          </a:effectRef>
+          <a:fontRef idx="minor">
+            <a:schemeClr val="tx1"/>
+          </a:fontRef>
+        </p:style>
+      </p:cxnSp>
     </p:spTree>
     <p:extLst>
       <p:ext uri="{BB962C8B-B14F-4D97-AF65-F5344CB8AC3E}">

</xml_diff>

<commit_message>
Add support to inline a select query as value for another query
</commit_message>
<xml_diff>
--- a/docs/select.pptx
+++ b/docs/select.pptx
@@ -255,7 +255,7 @@
           <a:p>
             <a:fld id="{064700E2-490F-4419-AC2C-49136718AF20}" type="datetimeFigureOut">
               <a:rPr lang="es-ES" smtClean="0"/>
-              <a:t>22/8/21</a:t>
+              <a:t>9/10/21</a:t>
             </a:fld>
             <a:endParaRPr lang="es-ES"/>
           </a:p>
@@ -425,7 +425,7 @@
           <a:p>
             <a:fld id="{064700E2-490F-4419-AC2C-49136718AF20}" type="datetimeFigureOut">
               <a:rPr lang="es-ES" smtClean="0"/>
-              <a:t>22/8/21</a:t>
+              <a:t>9/10/21</a:t>
             </a:fld>
             <a:endParaRPr lang="es-ES"/>
           </a:p>
@@ -605,7 +605,7 @@
           <a:p>
             <a:fld id="{064700E2-490F-4419-AC2C-49136718AF20}" type="datetimeFigureOut">
               <a:rPr lang="es-ES" smtClean="0"/>
-              <a:t>22/8/21</a:t>
+              <a:t>9/10/21</a:t>
             </a:fld>
             <a:endParaRPr lang="es-ES"/>
           </a:p>
@@ -775,7 +775,7 @@
           <a:p>
             <a:fld id="{064700E2-490F-4419-AC2C-49136718AF20}" type="datetimeFigureOut">
               <a:rPr lang="es-ES" smtClean="0"/>
-              <a:t>22/8/21</a:t>
+              <a:t>9/10/21</a:t>
             </a:fld>
             <a:endParaRPr lang="es-ES"/>
           </a:p>
@@ -1021,7 +1021,7 @@
           <a:p>
             <a:fld id="{064700E2-490F-4419-AC2C-49136718AF20}" type="datetimeFigureOut">
               <a:rPr lang="es-ES" smtClean="0"/>
-              <a:t>22/8/21</a:t>
+              <a:t>9/10/21</a:t>
             </a:fld>
             <a:endParaRPr lang="es-ES"/>
           </a:p>
@@ -1253,7 +1253,7 @@
           <a:p>
             <a:fld id="{064700E2-490F-4419-AC2C-49136718AF20}" type="datetimeFigureOut">
               <a:rPr lang="es-ES" smtClean="0"/>
-              <a:t>22/8/21</a:t>
+              <a:t>9/10/21</a:t>
             </a:fld>
             <a:endParaRPr lang="es-ES"/>
           </a:p>
@@ -1620,7 +1620,7 @@
           <a:p>
             <a:fld id="{064700E2-490F-4419-AC2C-49136718AF20}" type="datetimeFigureOut">
               <a:rPr lang="es-ES" smtClean="0"/>
-              <a:t>22/8/21</a:t>
+              <a:t>9/10/21</a:t>
             </a:fld>
             <a:endParaRPr lang="es-ES"/>
           </a:p>
@@ -1738,7 +1738,7 @@
           <a:p>
             <a:fld id="{064700E2-490F-4419-AC2C-49136718AF20}" type="datetimeFigureOut">
               <a:rPr lang="es-ES" smtClean="0"/>
-              <a:t>22/8/21</a:t>
+              <a:t>9/10/21</a:t>
             </a:fld>
             <a:endParaRPr lang="es-ES"/>
           </a:p>
@@ -1833,7 +1833,7 @@
           <a:p>
             <a:fld id="{064700E2-490F-4419-AC2C-49136718AF20}" type="datetimeFigureOut">
               <a:rPr lang="es-ES" smtClean="0"/>
-              <a:t>22/8/21</a:t>
+              <a:t>9/10/21</a:t>
             </a:fld>
             <a:endParaRPr lang="es-ES"/>
           </a:p>
@@ -2110,7 +2110,7 @@
           <a:p>
             <a:fld id="{064700E2-490F-4419-AC2C-49136718AF20}" type="datetimeFigureOut">
               <a:rPr lang="es-ES" smtClean="0"/>
-              <a:t>22/8/21</a:t>
+              <a:t>9/10/21</a:t>
             </a:fld>
             <a:endParaRPr lang="es-ES"/>
           </a:p>
@@ -2367,7 +2367,7 @@
           <a:p>
             <a:fld id="{064700E2-490F-4419-AC2C-49136718AF20}" type="datetimeFigureOut">
               <a:rPr lang="es-ES" smtClean="0"/>
-              <a:t>22/8/21</a:t>
+              <a:t>9/10/21</a:t>
             </a:fld>
             <a:endParaRPr lang="es-ES"/>
           </a:p>
@@ -2580,7 +2580,7 @@
           <a:p>
             <a:fld id="{064700E2-490F-4419-AC2C-49136718AF20}" type="datetimeFigureOut">
               <a:rPr lang="es-ES" smtClean="0"/>
-              <a:t>22/8/21</a:t>
+              <a:t>9/10/21</a:t>
             </a:fld>
             <a:endParaRPr lang="es-ES"/>
           </a:p>
@@ -6777,7 +6777,7 @@
         <p:spPr>
           <a:xfrm>
             <a:off x="7117203" y="1858543"/>
-            <a:ext cx="721672" cy="184666"/>
+            <a:ext cx="433132" cy="184666"/>
           </a:xfrm>
           <a:prstGeom prst="rect">
             <a:avLst/>
@@ -6792,9 +6792,12 @@
           <a:p>
             <a:r>
               <a:rPr lang="es-ES" sz="600" dirty="0" err="1"/>
-              <a:t>forUseInQueryAs</a:t>
-            </a:r>
-            <a:endParaRPr lang="es-ES" sz="600" dirty="0"/>
+              <a:t>forUse</a:t>
+            </a:r>
+            <a:r>
+              <a:rPr lang="es-ES" sz="600" dirty="0"/>
+              <a:t>*</a:t>
+            </a:r>
           </a:p>
         </p:txBody>
       </p:sp>
@@ -10936,7 +10939,7 @@
         <p:spPr>
           <a:xfrm>
             <a:off x="19431123" y="2001700"/>
-            <a:ext cx="721672" cy="184666"/>
+            <a:ext cx="433132" cy="184666"/>
           </a:xfrm>
           <a:prstGeom prst="rect">
             <a:avLst/>
@@ -10951,9 +10954,12 @@
           <a:p>
             <a:r>
               <a:rPr lang="es-ES" sz="600" dirty="0" err="1"/>
-              <a:t>forUseInQueryAs</a:t>
-            </a:r>
-            <a:endParaRPr lang="es-ES" sz="600" dirty="0"/>
+              <a:t>forUse</a:t>
+            </a:r>
+            <a:r>
+              <a:rPr lang="es-ES" sz="600" dirty="0"/>
+              <a:t>*</a:t>
+            </a:r>
           </a:p>
         </p:txBody>
       </p:sp>

</xml_diff>

<commit_message>
Detect invalid queries in SqlServer, Oracle and MariaDB when an outer reference is used to create a query that is not supported by the database because no outer references are allowed in inner with, or, in MariaDB, no outer references are allowed in inner from
</commit_message>
<xml_diff>
--- a/docs/select.pptx
+++ b/docs/select.pptx
@@ -255,7 +255,7 @@
           <a:p>
             <a:fld id="{064700E2-490F-4419-AC2C-49136718AF20}" type="datetimeFigureOut">
               <a:rPr lang="es-ES" smtClean="0"/>
-              <a:t>9/10/21</a:t>
+              <a:t>1/1/22</a:t>
             </a:fld>
             <a:endParaRPr lang="es-ES"/>
           </a:p>
@@ -425,7 +425,7 @@
           <a:p>
             <a:fld id="{064700E2-490F-4419-AC2C-49136718AF20}" type="datetimeFigureOut">
               <a:rPr lang="es-ES" smtClean="0"/>
-              <a:t>9/10/21</a:t>
+              <a:t>1/1/22</a:t>
             </a:fld>
             <a:endParaRPr lang="es-ES"/>
           </a:p>
@@ -605,7 +605,7 @@
           <a:p>
             <a:fld id="{064700E2-490F-4419-AC2C-49136718AF20}" type="datetimeFigureOut">
               <a:rPr lang="es-ES" smtClean="0"/>
-              <a:t>9/10/21</a:t>
+              <a:t>1/1/22</a:t>
             </a:fld>
             <a:endParaRPr lang="es-ES"/>
           </a:p>
@@ -775,7 +775,7 @@
           <a:p>
             <a:fld id="{064700E2-490F-4419-AC2C-49136718AF20}" type="datetimeFigureOut">
               <a:rPr lang="es-ES" smtClean="0"/>
-              <a:t>9/10/21</a:t>
+              <a:t>1/1/22</a:t>
             </a:fld>
             <a:endParaRPr lang="es-ES"/>
           </a:p>
@@ -1021,7 +1021,7 @@
           <a:p>
             <a:fld id="{064700E2-490F-4419-AC2C-49136718AF20}" type="datetimeFigureOut">
               <a:rPr lang="es-ES" smtClean="0"/>
-              <a:t>9/10/21</a:t>
+              <a:t>1/1/22</a:t>
             </a:fld>
             <a:endParaRPr lang="es-ES"/>
           </a:p>
@@ -1253,7 +1253,7 @@
           <a:p>
             <a:fld id="{064700E2-490F-4419-AC2C-49136718AF20}" type="datetimeFigureOut">
               <a:rPr lang="es-ES" smtClean="0"/>
-              <a:t>9/10/21</a:t>
+              <a:t>1/1/22</a:t>
             </a:fld>
             <a:endParaRPr lang="es-ES"/>
           </a:p>
@@ -1620,7 +1620,7 @@
           <a:p>
             <a:fld id="{064700E2-490F-4419-AC2C-49136718AF20}" type="datetimeFigureOut">
               <a:rPr lang="es-ES" smtClean="0"/>
-              <a:t>9/10/21</a:t>
+              <a:t>1/1/22</a:t>
             </a:fld>
             <a:endParaRPr lang="es-ES"/>
           </a:p>
@@ -1738,7 +1738,7 @@
           <a:p>
             <a:fld id="{064700E2-490F-4419-AC2C-49136718AF20}" type="datetimeFigureOut">
               <a:rPr lang="es-ES" smtClean="0"/>
-              <a:t>9/10/21</a:t>
+              <a:t>1/1/22</a:t>
             </a:fld>
             <a:endParaRPr lang="es-ES"/>
           </a:p>
@@ -1833,7 +1833,7 @@
           <a:p>
             <a:fld id="{064700E2-490F-4419-AC2C-49136718AF20}" type="datetimeFigureOut">
               <a:rPr lang="es-ES" smtClean="0"/>
-              <a:t>9/10/21</a:t>
+              <a:t>1/1/22</a:t>
             </a:fld>
             <a:endParaRPr lang="es-ES"/>
           </a:p>
@@ -2110,7 +2110,7 @@
           <a:p>
             <a:fld id="{064700E2-490F-4419-AC2C-49136718AF20}" type="datetimeFigureOut">
               <a:rPr lang="es-ES" smtClean="0"/>
-              <a:t>9/10/21</a:t>
+              <a:t>1/1/22</a:t>
             </a:fld>
             <a:endParaRPr lang="es-ES"/>
           </a:p>
@@ -2367,7 +2367,7 @@
           <a:p>
             <a:fld id="{064700E2-490F-4419-AC2C-49136718AF20}" type="datetimeFigureOut">
               <a:rPr lang="es-ES" smtClean="0"/>
-              <a:t>9/10/21</a:t>
+              <a:t>1/1/22</a:t>
             </a:fld>
             <a:endParaRPr lang="es-ES"/>
           </a:p>
@@ -2580,7 +2580,7 @@
           <a:p>
             <a:fld id="{064700E2-490F-4419-AC2C-49136718AF20}" type="datetimeFigureOut">
               <a:rPr lang="es-ES" smtClean="0"/>
-              <a:t>9/10/21</a:t>
+              <a:t>1/1/22</a:t>
             </a:fld>
             <a:endParaRPr lang="es-ES"/>
           </a:p>
@@ -5662,8 +5662,8 @@
         </p:nvSpPr>
         <p:spPr>
           <a:xfrm>
-            <a:off x="13837081" y="8393276"/>
-            <a:ext cx="405880" cy="184666"/>
+            <a:off x="13120608" y="8406885"/>
+            <a:ext cx="445956" cy="184666"/>
           </a:xfrm>
           <a:prstGeom prst="rect">
             <a:avLst/>
@@ -5678,7 +5678,7 @@
           <a:p>
             <a:r>
               <a:rPr lang="es-ES_tradnl" sz="600" dirty="0" err="1"/>
-              <a:t>grouBy</a:t>
+              <a:t>groupBy</a:t>
             </a:r>
             <a:endParaRPr lang="es-ES_tradnl" sz="600" dirty="0"/>
           </a:p>

</xml_diff>